<commit_message>
added slides for logging
</commit_message>
<xml_diff>
--- a/doc/intro/slides/lesson_11_ci.pptx
+++ b/doc/intro/slides/lesson_11_ci.pptx
@@ -5,7 +5,7 @@
     <p:sldMasterId id="2147483648" r:id="rId1"/>
   </p:sldMasterIdLst>
   <p:notesMasterIdLst>
-    <p:notesMasterId r:id="rId26"/>
+    <p:notesMasterId r:id="rId33"/>
   </p:notesMasterIdLst>
   <p:sldIdLst>
     <p:sldId id="256" r:id="rId2"/>
@@ -20,18 +20,25 @@
     <p:sldId id="278" r:id="rId11"/>
     <p:sldId id="279" r:id="rId12"/>
     <p:sldId id="280" r:id="rId13"/>
-    <p:sldId id="284" r:id="rId14"/>
-    <p:sldId id="281" r:id="rId15"/>
-    <p:sldId id="285" r:id="rId16"/>
-    <p:sldId id="286" r:id="rId17"/>
-    <p:sldId id="287" r:id="rId18"/>
-    <p:sldId id="288" r:id="rId19"/>
-    <p:sldId id="290" r:id="rId20"/>
-    <p:sldId id="289" r:id="rId21"/>
-    <p:sldId id="291" r:id="rId22"/>
-    <p:sldId id="292" r:id="rId23"/>
-    <p:sldId id="293" r:id="rId24"/>
-    <p:sldId id="271" r:id="rId25"/>
+    <p:sldId id="296" r:id="rId14"/>
+    <p:sldId id="295" r:id="rId15"/>
+    <p:sldId id="297" r:id="rId16"/>
+    <p:sldId id="298" r:id="rId17"/>
+    <p:sldId id="299" r:id="rId18"/>
+    <p:sldId id="300" r:id="rId19"/>
+    <p:sldId id="301" r:id="rId20"/>
+    <p:sldId id="284" r:id="rId21"/>
+    <p:sldId id="281" r:id="rId22"/>
+    <p:sldId id="285" r:id="rId23"/>
+    <p:sldId id="286" r:id="rId24"/>
+    <p:sldId id="287" r:id="rId25"/>
+    <p:sldId id="288" r:id="rId26"/>
+    <p:sldId id="290" r:id="rId27"/>
+    <p:sldId id="289" r:id="rId28"/>
+    <p:sldId id="291" r:id="rId29"/>
+    <p:sldId id="292" r:id="rId30"/>
+    <p:sldId id="293" r:id="rId31"/>
+    <p:sldId id="271" r:id="rId32"/>
   </p:sldIdLst>
   <p:sldSz cx="12192000" cy="6858000"/>
   <p:notesSz cx="6858000" cy="9144000"/>
@@ -220,7 +227,7 @@
           <a:p>
             <a:fld id="{9B5B52BA-3295-0343-9E28-A260A811DD10}" type="datetimeFigureOut">
               <a:rPr lang="en-US" smtClean="0"/>
-              <a:t>25-Feb-19</a:t>
+              <a:t>3/13/19</a:t>
             </a:fld>
             <a:endParaRPr lang="en-US"/>
           </a:p>
@@ -284,38 +291,37 @@
           <a:p>
             <a:pPr lvl="0"/>
             <a:r>
-              <a:rPr lang="en-US" smtClean="0"/>
+              <a:rPr lang="en-US"/>
               <a:t>Click to edit Master text styles</a:t>
             </a:r>
           </a:p>
           <a:p>
             <a:pPr lvl="1"/>
             <a:r>
-              <a:rPr lang="en-US" smtClean="0"/>
+              <a:rPr lang="en-US"/>
               <a:t>Second level</a:t>
             </a:r>
           </a:p>
           <a:p>
             <a:pPr lvl="2"/>
             <a:r>
-              <a:rPr lang="en-US" smtClean="0"/>
+              <a:rPr lang="en-US"/>
               <a:t>Third level</a:t>
             </a:r>
           </a:p>
           <a:p>
             <a:pPr lvl="3"/>
             <a:r>
-              <a:rPr lang="en-US" smtClean="0"/>
+              <a:rPr lang="en-US"/>
               <a:t>Fourth level</a:t>
             </a:r>
           </a:p>
           <a:p>
             <a:pPr lvl="4"/>
             <a:r>
-              <a:rPr lang="en-US" smtClean="0"/>
+              <a:rPr lang="en-US"/>
               <a:t>Fifth level</a:t>
             </a:r>
-            <a:endParaRPr lang="en-US"/>
           </a:p>
         </p:txBody>
       </p:sp>
@@ -530,10 +536,9 @@
           </a:lstStyle>
           <a:p>
             <a:r>
-              <a:rPr lang="en-US" dirty="0" smtClean="0"/>
+              <a:rPr lang="en-US" dirty="0"/>
               <a:t>Click to edit Master title style</a:t>
             </a:r>
-            <a:endParaRPr lang="en-US" dirty="0"/>
           </a:p>
         </p:txBody>
       </p:sp>
@@ -595,10 +600,9 @@
           </a:lstStyle>
           <a:p>
             <a:r>
-              <a:rPr lang="en-US" dirty="0" smtClean="0"/>
+              <a:rPr lang="en-US" dirty="0"/>
               <a:t>Click to edit Master subtitle style</a:t>
             </a:r>
-            <a:endParaRPr lang="en-US" dirty="0"/>
           </a:p>
         </p:txBody>
       </p:sp>
@@ -619,7 +623,7 @@
           <a:p>
             <a:fld id="{04F1D4A2-813C-F741-B481-C92B3A596030}" type="datetimeFigureOut">
               <a:rPr lang="en-US" smtClean="0"/>
-              <a:t>25-Feb-19</a:t>
+              <a:t>3/13/19</a:t>
             </a:fld>
             <a:endParaRPr lang="en-US"/>
           </a:p>
@@ -713,10 +717,9 @@
           <a:lstStyle/>
           <a:p>
             <a:r>
-              <a:rPr lang="en-US" smtClean="0"/>
+              <a:rPr lang="en-US"/>
               <a:t>Click to edit Master title style</a:t>
             </a:r>
-            <a:endParaRPr lang="en-US"/>
           </a:p>
         </p:txBody>
       </p:sp>
@@ -737,38 +740,37 @@
           <a:p>
             <a:pPr lvl="0"/>
             <a:r>
-              <a:rPr lang="en-US" smtClean="0"/>
+              <a:rPr lang="en-US"/>
               <a:t>Click to edit Master text styles</a:t>
             </a:r>
           </a:p>
           <a:p>
             <a:pPr lvl="1"/>
             <a:r>
-              <a:rPr lang="en-US" smtClean="0"/>
+              <a:rPr lang="en-US"/>
               <a:t>Second level</a:t>
             </a:r>
           </a:p>
           <a:p>
             <a:pPr lvl="2"/>
             <a:r>
-              <a:rPr lang="en-US" smtClean="0"/>
+              <a:rPr lang="en-US"/>
               <a:t>Third level</a:t>
             </a:r>
           </a:p>
           <a:p>
             <a:pPr lvl="3"/>
             <a:r>
-              <a:rPr lang="en-US" smtClean="0"/>
+              <a:rPr lang="en-US"/>
               <a:t>Fourth level</a:t>
             </a:r>
           </a:p>
           <a:p>
             <a:pPr lvl="4"/>
             <a:r>
-              <a:rPr lang="en-US" smtClean="0"/>
+              <a:rPr lang="en-US"/>
               <a:t>Fifth level</a:t>
             </a:r>
-            <a:endParaRPr lang="en-US"/>
           </a:p>
         </p:txBody>
       </p:sp>
@@ -789,7 +791,7 @@
           <a:p>
             <a:fld id="{04F1D4A2-813C-F741-B481-C92B3A596030}" type="datetimeFigureOut">
               <a:rPr lang="en-US" smtClean="0"/>
-              <a:t>25-Feb-19</a:t>
+              <a:t>3/13/19</a:t>
             </a:fld>
             <a:endParaRPr lang="en-US"/>
           </a:p>
@@ -888,10 +890,9 @@
           <a:lstStyle/>
           <a:p>
             <a:r>
-              <a:rPr lang="en-US" smtClean="0"/>
+              <a:rPr lang="en-US"/>
               <a:t>Click to edit Master title style</a:t>
             </a:r>
-            <a:endParaRPr lang="en-US"/>
           </a:p>
         </p:txBody>
       </p:sp>
@@ -917,38 +918,37 @@
           <a:p>
             <a:pPr lvl="0"/>
             <a:r>
-              <a:rPr lang="en-US" smtClean="0"/>
+              <a:rPr lang="en-US"/>
               <a:t>Click to edit Master text styles</a:t>
             </a:r>
           </a:p>
           <a:p>
             <a:pPr lvl="1"/>
             <a:r>
-              <a:rPr lang="en-US" smtClean="0"/>
+              <a:rPr lang="en-US"/>
               <a:t>Second level</a:t>
             </a:r>
           </a:p>
           <a:p>
             <a:pPr lvl="2"/>
             <a:r>
-              <a:rPr lang="en-US" smtClean="0"/>
+              <a:rPr lang="en-US"/>
               <a:t>Third level</a:t>
             </a:r>
           </a:p>
           <a:p>
             <a:pPr lvl="3"/>
             <a:r>
-              <a:rPr lang="en-US" smtClean="0"/>
+              <a:rPr lang="en-US"/>
               <a:t>Fourth level</a:t>
             </a:r>
           </a:p>
           <a:p>
             <a:pPr lvl="4"/>
             <a:r>
-              <a:rPr lang="en-US" smtClean="0"/>
+              <a:rPr lang="en-US"/>
               <a:t>Fifth level</a:t>
             </a:r>
-            <a:endParaRPr lang="en-US"/>
           </a:p>
         </p:txBody>
       </p:sp>
@@ -969,7 +969,7 @@
           <a:p>
             <a:fld id="{04F1D4A2-813C-F741-B481-C92B3A596030}" type="datetimeFigureOut">
               <a:rPr lang="en-US" smtClean="0"/>
-              <a:t>25-Feb-19</a:t>
+              <a:t>3/13/19</a:t>
             </a:fld>
             <a:endParaRPr lang="en-US"/>
           </a:p>
@@ -1067,10 +1067,9 @@
           </a:lstStyle>
           <a:p>
             <a:r>
-              <a:rPr lang="en-US" dirty="0" smtClean="0"/>
+              <a:rPr lang="en-US" dirty="0"/>
               <a:t>Click to edit Master title style</a:t>
             </a:r>
-            <a:endParaRPr lang="en-US" dirty="0"/>
           </a:p>
         </p:txBody>
       </p:sp>
@@ -1098,38 +1097,37 @@
           <a:p>
             <a:pPr lvl="0"/>
             <a:r>
-              <a:rPr lang="en-US" dirty="0" smtClean="0"/>
+              <a:rPr lang="en-US" dirty="0"/>
               <a:t>Click to edit Master text styles</a:t>
             </a:r>
           </a:p>
           <a:p>
             <a:pPr lvl="1"/>
             <a:r>
-              <a:rPr lang="en-US" dirty="0" smtClean="0"/>
+              <a:rPr lang="en-US" dirty="0"/>
               <a:t>Second level</a:t>
             </a:r>
           </a:p>
           <a:p>
             <a:pPr lvl="2"/>
             <a:r>
-              <a:rPr lang="en-US" dirty="0" smtClean="0"/>
+              <a:rPr lang="en-US" dirty="0"/>
               <a:t>Third level</a:t>
             </a:r>
           </a:p>
           <a:p>
             <a:pPr lvl="3"/>
             <a:r>
-              <a:rPr lang="en-US" dirty="0" smtClean="0"/>
+              <a:rPr lang="en-US" dirty="0"/>
               <a:t>Fourth level</a:t>
             </a:r>
           </a:p>
           <a:p>
             <a:pPr lvl="4"/>
             <a:r>
-              <a:rPr lang="en-US" dirty="0" smtClean="0"/>
+              <a:rPr lang="en-US" dirty="0"/>
               <a:t>Fifth level</a:t>
             </a:r>
-            <a:endParaRPr lang="en-US" dirty="0"/>
           </a:p>
         </p:txBody>
       </p:sp>
@@ -1150,7 +1148,7 @@
           <a:p>
             <a:fld id="{04F1D4A2-813C-F741-B481-C92B3A596030}" type="datetimeFigureOut">
               <a:rPr lang="en-US" smtClean="0"/>
-              <a:t>25-Feb-19</a:t>
+              <a:t>3/13/19</a:t>
             </a:fld>
             <a:endParaRPr lang="en-US"/>
           </a:p>
@@ -1253,10 +1251,9 @@
           </a:lstStyle>
           <a:p>
             <a:r>
-              <a:rPr lang="en-US" smtClean="0"/>
+              <a:rPr lang="en-US"/>
               <a:t>Click to edit Master title style</a:t>
             </a:r>
-            <a:endParaRPr lang="en-US"/>
           </a:p>
         </p:txBody>
       </p:sp>
@@ -1373,7 +1370,7 @@
           <a:p>
             <a:pPr lvl="0"/>
             <a:r>
-              <a:rPr lang="en-US" smtClean="0"/>
+              <a:rPr lang="en-US"/>
               <a:t>Click to edit Master text styles</a:t>
             </a:r>
           </a:p>
@@ -1396,7 +1393,7 @@
           <a:p>
             <a:fld id="{04F1D4A2-813C-F741-B481-C92B3A596030}" type="datetimeFigureOut">
               <a:rPr lang="en-US" smtClean="0"/>
-              <a:t>25-Feb-19</a:t>
+              <a:t>3/13/19</a:t>
             </a:fld>
             <a:endParaRPr lang="en-US"/>
           </a:p>
@@ -1490,10 +1487,9 @@
           <a:lstStyle/>
           <a:p>
             <a:r>
-              <a:rPr lang="en-US" smtClean="0"/>
+              <a:rPr lang="en-US"/>
               <a:t>Click to edit Master title style</a:t>
             </a:r>
-            <a:endParaRPr lang="en-US"/>
           </a:p>
         </p:txBody>
       </p:sp>
@@ -1519,38 +1515,37 @@
           <a:p>
             <a:pPr lvl="0"/>
             <a:r>
-              <a:rPr lang="en-US" smtClean="0"/>
+              <a:rPr lang="en-US"/>
               <a:t>Click to edit Master text styles</a:t>
             </a:r>
           </a:p>
           <a:p>
             <a:pPr lvl="1"/>
             <a:r>
-              <a:rPr lang="en-US" smtClean="0"/>
+              <a:rPr lang="en-US"/>
               <a:t>Second level</a:t>
             </a:r>
           </a:p>
           <a:p>
             <a:pPr lvl="2"/>
             <a:r>
-              <a:rPr lang="en-US" smtClean="0"/>
+              <a:rPr lang="en-US"/>
               <a:t>Third level</a:t>
             </a:r>
           </a:p>
           <a:p>
             <a:pPr lvl="3"/>
             <a:r>
-              <a:rPr lang="en-US" smtClean="0"/>
+              <a:rPr lang="en-US"/>
               <a:t>Fourth level</a:t>
             </a:r>
           </a:p>
           <a:p>
             <a:pPr lvl="4"/>
             <a:r>
-              <a:rPr lang="en-US" smtClean="0"/>
+              <a:rPr lang="en-US"/>
               <a:t>Fifth level</a:t>
             </a:r>
-            <a:endParaRPr lang="en-US"/>
           </a:p>
         </p:txBody>
       </p:sp>
@@ -1576,38 +1571,37 @@
           <a:p>
             <a:pPr lvl="0"/>
             <a:r>
-              <a:rPr lang="en-US" smtClean="0"/>
+              <a:rPr lang="en-US"/>
               <a:t>Click to edit Master text styles</a:t>
             </a:r>
           </a:p>
           <a:p>
             <a:pPr lvl="1"/>
             <a:r>
-              <a:rPr lang="en-US" smtClean="0"/>
+              <a:rPr lang="en-US"/>
               <a:t>Second level</a:t>
             </a:r>
           </a:p>
           <a:p>
             <a:pPr lvl="2"/>
             <a:r>
-              <a:rPr lang="en-US" smtClean="0"/>
+              <a:rPr lang="en-US"/>
               <a:t>Third level</a:t>
             </a:r>
           </a:p>
           <a:p>
             <a:pPr lvl="3"/>
             <a:r>
-              <a:rPr lang="en-US" smtClean="0"/>
+              <a:rPr lang="en-US"/>
               <a:t>Fourth level</a:t>
             </a:r>
           </a:p>
           <a:p>
             <a:pPr lvl="4"/>
             <a:r>
-              <a:rPr lang="en-US" smtClean="0"/>
+              <a:rPr lang="en-US"/>
               <a:t>Fifth level</a:t>
             </a:r>
-            <a:endParaRPr lang="en-US"/>
           </a:p>
         </p:txBody>
       </p:sp>
@@ -1628,7 +1622,7 @@
           <a:p>
             <a:fld id="{04F1D4A2-813C-F741-B481-C92B3A596030}" type="datetimeFigureOut">
               <a:rPr lang="en-US" smtClean="0"/>
-              <a:t>25-Feb-19</a:t>
+              <a:t>3/13/19</a:t>
             </a:fld>
             <a:endParaRPr lang="en-US"/>
           </a:p>
@@ -1727,10 +1721,9 @@
           <a:lstStyle/>
           <a:p>
             <a:r>
-              <a:rPr lang="en-US" smtClean="0"/>
+              <a:rPr lang="en-US"/>
               <a:t>Click to edit Master title style</a:t>
             </a:r>
-            <a:endParaRPr lang="en-US"/>
           </a:p>
         </p:txBody>
       </p:sp>
@@ -1793,7 +1786,7 @@
           <a:p>
             <a:pPr lvl="0"/>
             <a:r>
-              <a:rPr lang="en-US" smtClean="0"/>
+              <a:rPr lang="en-US"/>
               <a:t>Click to edit Master text styles</a:t>
             </a:r>
           </a:p>
@@ -1821,38 +1814,37 @@
           <a:p>
             <a:pPr lvl="0"/>
             <a:r>
-              <a:rPr lang="en-US" smtClean="0"/>
+              <a:rPr lang="en-US"/>
               <a:t>Click to edit Master text styles</a:t>
             </a:r>
           </a:p>
           <a:p>
             <a:pPr lvl="1"/>
             <a:r>
-              <a:rPr lang="en-US" smtClean="0"/>
+              <a:rPr lang="en-US"/>
               <a:t>Second level</a:t>
             </a:r>
           </a:p>
           <a:p>
             <a:pPr lvl="2"/>
             <a:r>
-              <a:rPr lang="en-US" smtClean="0"/>
+              <a:rPr lang="en-US"/>
               <a:t>Third level</a:t>
             </a:r>
           </a:p>
           <a:p>
             <a:pPr lvl="3"/>
             <a:r>
-              <a:rPr lang="en-US" smtClean="0"/>
+              <a:rPr lang="en-US"/>
               <a:t>Fourth level</a:t>
             </a:r>
           </a:p>
           <a:p>
             <a:pPr lvl="4"/>
             <a:r>
-              <a:rPr lang="en-US" smtClean="0"/>
+              <a:rPr lang="en-US"/>
               <a:t>Fifth level</a:t>
             </a:r>
-            <a:endParaRPr lang="en-US"/>
           </a:p>
         </p:txBody>
       </p:sp>
@@ -1915,7 +1907,7 @@
           <a:p>
             <a:pPr lvl="0"/>
             <a:r>
-              <a:rPr lang="en-US" smtClean="0"/>
+              <a:rPr lang="en-US"/>
               <a:t>Click to edit Master text styles</a:t>
             </a:r>
           </a:p>
@@ -1943,38 +1935,37 @@
           <a:p>
             <a:pPr lvl="0"/>
             <a:r>
-              <a:rPr lang="en-US" smtClean="0"/>
+              <a:rPr lang="en-US"/>
               <a:t>Click to edit Master text styles</a:t>
             </a:r>
           </a:p>
           <a:p>
             <a:pPr lvl="1"/>
             <a:r>
-              <a:rPr lang="en-US" smtClean="0"/>
+              <a:rPr lang="en-US"/>
               <a:t>Second level</a:t>
             </a:r>
           </a:p>
           <a:p>
             <a:pPr lvl="2"/>
             <a:r>
-              <a:rPr lang="en-US" smtClean="0"/>
+              <a:rPr lang="en-US"/>
               <a:t>Third level</a:t>
             </a:r>
           </a:p>
           <a:p>
             <a:pPr lvl="3"/>
             <a:r>
-              <a:rPr lang="en-US" smtClean="0"/>
+              <a:rPr lang="en-US"/>
               <a:t>Fourth level</a:t>
             </a:r>
           </a:p>
           <a:p>
             <a:pPr lvl="4"/>
             <a:r>
-              <a:rPr lang="en-US" smtClean="0"/>
+              <a:rPr lang="en-US"/>
               <a:t>Fifth level</a:t>
             </a:r>
-            <a:endParaRPr lang="en-US"/>
           </a:p>
         </p:txBody>
       </p:sp>
@@ -1995,7 +1986,7 @@
           <a:p>
             <a:fld id="{04F1D4A2-813C-F741-B481-C92B3A596030}" type="datetimeFigureOut">
               <a:rPr lang="en-US" smtClean="0"/>
-              <a:t>25-Feb-19</a:t>
+              <a:t>3/13/19</a:t>
             </a:fld>
             <a:endParaRPr lang="en-US"/>
           </a:p>
@@ -2089,10 +2080,9 @@
           <a:lstStyle/>
           <a:p>
             <a:r>
-              <a:rPr lang="en-US" smtClean="0"/>
+              <a:rPr lang="en-US"/>
               <a:t>Click to edit Master title style</a:t>
             </a:r>
-            <a:endParaRPr lang="en-US"/>
           </a:p>
         </p:txBody>
       </p:sp>
@@ -2113,7 +2103,7 @@
           <a:p>
             <a:fld id="{04F1D4A2-813C-F741-B481-C92B3A596030}" type="datetimeFigureOut">
               <a:rPr lang="en-US" smtClean="0"/>
-              <a:t>25-Feb-19</a:t>
+              <a:t>3/13/19</a:t>
             </a:fld>
             <a:endParaRPr lang="en-US"/>
           </a:p>
@@ -2208,7 +2198,7 @@
           <a:p>
             <a:fld id="{04F1D4A2-813C-F741-B481-C92B3A596030}" type="datetimeFigureOut">
               <a:rPr lang="en-US" smtClean="0"/>
-              <a:t>25-Feb-19</a:t>
+              <a:t>3/13/19</a:t>
             </a:fld>
             <a:endParaRPr lang="en-US"/>
           </a:p>
@@ -2311,10 +2301,9 @@
           </a:lstStyle>
           <a:p>
             <a:r>
-              <a:rPr lang="en-US" smtClean="0"/>
+              <a:rPr lang="en-US"/>
               <a:t>Click to edit Master title style</a:t>
             </a:r>
-            <a:endParaRPr lang="en-US"/>
           </a:p>
         </p:txBody>
       </p:sp>
@@ -2368,38 +2357,37 @@
           <a:p>
             <a:pPr lvl="0"/>
             <a:r>
-              <a:rPr lang="en-US" smtClean="0"/>
+              <a:rPr lang="en-US"/>
               <a:t>Click to edit Master text styles</a:t>
             </a:r>
           </a:p>
           <a:p>
             <a:pPr lvl="1"/>
             <a:r>
-              <a:rPr lang="en-US" smtClean="0"/>
+              <a:rPr lang="en-US"/>
               <a:t>Second level</a:t>
             </a:r>
           </a:p>
           <a:p>
             <a:pPr lvl="2"/>
             <a:r>
-              <a:rPr lang="en-US" smtClean="0"/>
+              <a:rPr lang="en-US"/>
               <a:t>Third level</a:t>
             </a:r>
           </a:p>
           <a:p>
             <a:pPr lvl="3"/>
             <a:r>
-              <a:rPr lang="en-US" smtClean="0"/>
+              <a:rPr lang="en-US"/>
               <a:t>Fourth level</a:t>
             </a:r>
           </a:p>
           <a:p>
             <a:pPr lvl="4"/>
             <a:r>
-              <a:rPr lang="en-US" smtClean="0"/>
+              <a:rPr lang="en-US"/>
               <a:t>Fifth level</a:t>
             </a:r>
-            <a:endParaRPr lang="en-US"/>
           </a:p>
         </p:txBody>
       </p:sp>
@@ -2462,7 +2450,7 @@
           <a:p>
             <a:pPr lvl="0"/>
             <a:r>
-              <a:rPr lang="en-US" smtClean="0"/>
+              <a:rPr lang="en-US"/>
               <a:t>Click to edit Master text styles</a:t>
             </a:r>
           </a:p>
@@ -2485,7 +2473,7 @@
           <a:p>
             <a:fld id="{04F1D4A2-813C-F741-B481-C92B3A596030}" type="datetimeFigureOut">
               <a:rPr lang="en-US" smtClean="0"/>
-              <a:t>25-Feb-19</a:t>
+              <a:t>3/13/19</a:t>
             </a:fld>
             <a:endParaRPr lang="en-US"/>
           </a:p>
@@ -2588,10 +2576,9 @@
           </a:lstStyle>
           <a:p>
             <a:r>
-              <a:rPr lang="en-US" smtClean="0"/>
+              <a:rPr lang="en-US"/>
               <a:t>Click to edit Master title style</a:t>
             </a:r>
-            <a:endParaRPr lang="en-US"/>
           </a:p>
         </p:txBody>
       </p:sp>
@@ -2715,7 +2702,7 @@
           <a:p>
             <a:pPr lvl="0"/>
             <a:r>
-              <a:rPr lang="en-US" smtClean="0"/>
+              <a:rPr lang="en-US"/>
               <a:t>Click to edit Master text styles</a:t>
             </a:r>
           </a:p>
@@ -2738,7 +2725,7 @@
           <a:p>
             <a:fld id="{04F1D4A2-813C-F741-B481-C92B3A596030}" type="datetimeFigureOut">
               <a:rPr lang="en-US" smtClean="0"/>
-              <a:t>25-Feb-19</a:t>
+              <a:t>3/13/19</a:t>
             </a:fld>
             <a:endParaRPr lang="en-US"/>
           </a:p>
@@ -2847,10 +2834,9 @@
           <a:lstStyle/>
           <a:p>
             <a:r>
-              <a:rPr lang="en-US" dirty="0" smtClean="0"/>
+              <a:rPr lang="en-US" dirty="0"/>
               <a:t>Click to edit Master title style</a:t>
             </a:r>
-            <a:endParaRPr lang="en-US" dirty="0"/>
           </a:p>
         </p:txBody>
       </p:sp>
@@ -2881,38 +2867,37 @@
           <a:p>
             <a:pPr lvl="0"/>
             <a:r>
-              <a:rPr lang="en-US" smtClean="0"/>
+              <a:rPr lang="en-US"/>
               <a:t>Click to edit Master text styles</a:t>
             </a:r>
           </a:p>
           <a:p>
             <a:pPr lvl="1"/>
             <a:r>
-              <a:rPr lang="en-US" smtClean="0"/>
+              <a:rPr lang="en-US"/>
               <a:t>Second level</a:t>
             </a:r>
           </a:p>
           <a:p>
             <a:pPr lvl="2"/>
             <a:r>
-              <a:rPr lang="en-US" smtClean="0"/>
+              <a:rPr lang="en-US"/>
               <a:t>Third level</a:t>
             </a:r>
           </a:p>
           <a:p>
             <a:pPr lvl="3"/>
             <a:r>
-              <a:rPr lang="en-US" smtClean="0"/>
+              <a:rPr lang="en-US"/>
               <a:t>Fourth level</a:t>
             </a:r>
           </a:p>
           <a:p>
             <a:pPr lvl="4"/>
             <a:r>
-              <a:rPr lang="en-US" smtClean="0"/>
+              <a:rPr lang="en-US"/>
               <a:t>Fifth level</a:t>
             </a:r>
-            <a:endParaRPr lang="en-US"/>
           </a:p>
         </p:txBody>
       </p:sp>
@@ -2951,7 +2936,7 @@
           <a:p>
             <a:fld id="{04F1D4A2-813C-F741-B481-C92B3A596030}" type="datetimeFigureOut">
               <a:rPr lang="en-US" smtClean="0"/>
-              <a:t>25-Feb-19</a:t>
+              <a:t>3/13/19</a:t>
             </a:fld>
             <a:endParaRPr lang="en-US"/>
           </a:p>
@@ -3380,32 +3365,27 @@
           <a:p>
             <a:pPr algn="l"/>
             <a:r>
-              <a:rPr lang="en-US" dirty="0" smtClean="0"/>
+              <a:rPr lang="en-US" dirty="0"/>
               <a:t>Enterprise </a:t>
             </a:r>
             <a:r>
-              <a:rPr lang="en-US" dirty="0" err="1" smtClean="0"/>
+              <a:rPr lang="en-US" dirty="0" err="1"/>
               <a:t>Programmering</a:t>
             </a:r>
             <a:r>
-              <a:rPr lang="en-US" dirty="0" smtClean="0"/>
+              <a:rPr lang="en-US" dirty="0"/>
               <a:t> 1</a:t>
             </a:r>
             <a:br>
-              <a:rPr lang="en-US" dirty="0" smtClean="0"/>
+              <a:rPr lang="en-US" dirty="0"/>
             </a:br>
-            <a:r>
-              <a:rPr lang="en-US" dirty="0" smtClean="0"/>
-              <a:t/>
-            </a:r>
             <a:br>
-              <a:rPr lang="en-US" dirty="0" smtClean="0"/>
+              <a:rPr lang="en-US" dirty="0"/>
             </a:br>
             <a:r>
-              <a:rPr lang="en-US" dirty="0" smtClean="0"/>
+              <a:rPr lang="en-US" dirty="0"/>
               <a:t>Lesson 11: CI and Deployment</a:t>
             </a:r>
-            <a:endParaRPr lang="en-US" dirty="0"/>
           </a:p>
         </p:txBody>
       </p:sp>
@@ -3433,11 +3413,11 @@
           <a:p>
             <a:pPr algn="r"/>
             <a:r>
-              <a:rPr lang="en-US" smtClean="0"/>
+              <a:rPr lang="en-US"/>
               <a:t>Prof. </a:t>
             </a:r>
             <a:r>
-              <a:rPr lang="en-US" dirty="0" smtClean="0"/>
+              <a:rPr lang="en-US" dirty="0"/>
               <a:t>Andrea Arcuri</a:t>
             </a:r>
           </a:p>
@@ -3489,10 +3469,9 @@
           <a:lstStyle/>
           <a:p>
             <a:r>
-              <a:rPr lang="en-US" dirty="0" smtClean="0"/>
+              <a:rPr lang="en-US" dirty="0"/>
               <a:t>Issues with “update”</a:t>
             </a:r>
-            <a:endParaRPr lang="en-US" dirty="0"/>
           </a:p>
         </p:txBody>
       </p:sp>
@@ -3517,70 +3496,54 @@
           <a:lstStyle/>
           <a:p>
             <a:r>
-              <a:rPr lang="en-US" dirty="0" smtClean="0"/>
+              <a:rPr lang="en-US" dirty="0"/>
               <a:t>What if you are adding a new column in a </a:t>
             </a:r>
             <a:r>
-              <a:rPr lang="en-US" i="1" dirty="0" smtClean="0"/>
+              <a:rPr lang="en-US" i="1" dirty="0"/>
               <a:t>@Entity</a:t>
             </a:r>
             <a:r>
-              <a:rPr lang="en-US" dirty="0" smtClean="0"/>
+              <a:rPr lang="en-US" dirty="0"/>
               <a:t>?</a:t>
             </a:r>
           </a:p>
           <a:p>
             <a:r>
-              <a:rPr lang="en-US" dirty="0" smtClean="0"/>
+              <a:rPr lang="en-US" dirty="0"/>
               <a:t>What if you are changing the schema by refactoring some </a:t>
             </a:r>
             <a:r>
-              <a:rPr lang="en-US" i="1" dirty="0" smtClean="0"/>
+              <a:rPr lang="en-US" i="1" dirty="0"/>
               <a:t>@Entity</a:t>
             </a:r>
             <a:r>
-              <a:rPr lang="en-US" dirty="0" smtClean="0"/>
+              <a:rPr lang="en-US" dirty="0"/>
               <a:t> classes (e.g., split one in two)?</a:t>
             </a:r>
           </a:p>
           <a:p>
             <a:r>
-              <a:rPr lang="en-US" dirty="0" smtClean="0"/>
+              <a:rPr lang="en-US" dirty="0"/>
               <a:t>What if by mistake/bug some </a:t>
             </a:r>
             <a:r>
-              <a:rPr lang="en-US" i="1" dirty="0" smtClean="0"/>
+              <a:rPr lang="en-US" i="1" dirty="0"/>
               <a:t>@Entity</a:t>
             </a:r>
             <a:r>
-              <a:rPr lang="en-US" dirty="0" smtClean="0"/>
+              <a:rPr lang="en-US" dirty="0"/>
               <a:t> classes are deleted?</a:t>
             </a:r>
           </a:p>
           <a:p>
             <a:r>
-              <a:rPr lang="en-US" i="1" dirty="0" smtClean="0"/>
-              <a:t>What </a:t>
-            </a:r>
-            <a:r>
               <a:rPr lang="en-US" i="1" dirty="0"/>
-              <a:t>will happen to the current rows in such </a:t>
-            </a:r>
-            <a:r>
-              <a:rPr lang="en-US" i="1" dirty="0" smtClean="0"/>
-              <a:t>tables </a:t>
-            </a:r>
-            <a:r>
-              <a:rPr lang="en-US" i="1" dirty="0"/>
-              <a:t>in </a:t>
-            </a:r>
-            <a:r>
-              <a:rPr lang="en-US" i="1" dirty="0" smtClean="0"/>
-              <a:t>the database?</a:t>
-            </a:r>
-          </a:p>
-          <a:p>
-            <a:endParaRPr lang="en-US" dirty="0" smtClean="0"/>
+              <a:t>What will happen to the current rows in such tables in the database?</a:t>
+            </a:r>
+          </a:p>
+          <a:p>
+            <a:endParaRPr lang="en-US" dirty="0"/>
           </a:p>
           <a:p>
             <a:endParaRPr lang="en-US" dirty="0"/>
@@ -3633,10 +3596,9 @@
           <a:lstStyle/>
           <a:p>
             <a:r>
-              <a:rPr lang="en-US" dirty="0" smtClean="0"/>
+              <a:rPr lang="en-US" dirty="0"/>
               <a:t>Solution</a:t>
             </a:r>
-            <a:endParaRPr lang="en-US" dirty="0"/>
           </a:p>
         </p:txBody>
       </p:sp>
@@ -3667,11 +3629,11 @@
           </a:p>
           <a:p>
             <a:r>
-              <a:rPr lang="en-US" i="1" dirty="0" smtClean="0"/>
+              <a:rPr lang="en-US" i="1" dirty="0"/>
               <a:t>@Entity </a:t>
             </a:r>
             <a:r>
-              <a:rPr lang="en-US" dirty="0" smtClean="0"/>
+              <a:rPr lang="en-US" dirty="0"/>
               <a:t>classes should just map what is currently in the database, not driving its schema creation/update</a:t>
             </a:r>
           </a:p>
@@ -3679,65 +3641,61 @@
             <a:pPr lvl="1"/>
             <a:r>
               <a:rPr lang="en-US" dirty="0"/>
-              <a:t>a</a:t>
-            </a:r>
-            <a:r>
-              <a:rPr lang="en-US" dirty="0" smtClean="0"/>
-              <a:t>part from the very beginning before doing a first production release</a:t>
-            </a:r>
-          </a:p>
-          <a:p>
-            <a:r>
-              <a:rPr lang="en-US" dirty="0" smtClean="0"/>
+              <a:t>apart from the very beginning before doing a first production release</a:t>
+            </a:r>
+          </a:p>
+          <a:p>
+            <a:r>
+              <a:rPr lang="en-US" dirty="0"/>
               <a:t>No “</a:t>
             </a:r>
             <a:r>
-              <a:rPr lang="en-US" i="1" dirty="0" smtClean="0"/>
+              <a:rPr lang="en-US" i="1" dirty="0"/>
               <a:t>create-drop</a:t>
             </a:r>
             <a:r>
-              <a:rPr lang="en-US" dirty="0" smtClean="0"/>
+              <a:rPr lang="en-US" dirty="0"/>
               <a:t>”, nor “</a:t>
             </a:r>
             <a:r>
-              <a:rPr lang="en-US" i="1" dirty="0" smtClean="0"/>
+              <a:rPr lang="en-US" i="1" dirty="0"/>
               <a:t>update</a:t>
             </a:r>
             <a:r>
-              <a:rPr lang="en-US" dirty="0" smtClean="0"/>
+              <a:rPr lang="en-US" dirty="0"/>
               <a:t>”, but rather “</a:t>
             </a:r>
             <a:r>
-              <a:rPr lang="en-US" b="1" dirty="0" smtClean="0"/>
+              <a:rPr lang="en-US" b="1" dirty="0"/>
               <a:t>validate</a:t>
             </a:r>
             <a:r>
-              <a:rPr lang="en-US" dirty="0" smtClean="0"/>
+              <a:rPr lang="en-US" dirty="0"/>
               <a:t>”</a:t>
             </a:r>
           </a:p>
           <a:p>
             <a:pPr lvl="1"/>
             <a:r>
-              <a:rPr lang="en-US" dirty="0" smtClean="0"/>
+              <a:rPr lang="en-US" dirty="0"/>
               <a:t>throw exception if @Entity classes do not match what in database schema</a:t>
             </a:r>
           </a:p>
           <a:p>
             <a:r>
-              <a:rPr lang="en-US" dirty="0" smtClean="0"/>
+              <a:rPr lang="en-US" dirty="0"/>
               <a:t>Tools to use: </a:t>
             </a:r>
             <a:r>
-              <a:rPr lang="en-US" i="1" dirty="0" smtClean="0"/>
+              <a:rPr lang="en-US" i="1" dirty="0"/>
               <a:t>Flyway</a:t>
             </a:r>
             <a:r>
-              <a:rPr lang="en-US" dirty="0" smtClean="0"/>
+              <a:rPr lang="en-US" dirty="0"/>
               <a:t> or </a:t>
             </a:r>
             <a:r>
-              <a:rPr lang="en-US" i="1" dirty="0" err="1" smtClean="0"/>
+              <a:rPr lang="en-US" i="1" dirty="0" err="1"/>
               <a:t>Liquibase</a:t>
             </a:r>
             <a:endParaRPr lang="en-US" i="1" dirty="0"/>
@@ -3790,10 +3748,9 @@
           <a:lstStyle/>
           <a:p>
             <a:r>
-              <a:rPr lang="en-US" dirty="0" smtClean="0"/>
+              <a:rPr lang="en-US" dirty="0"/>
               <a:t>Flyway</a:t>
             </a:r>
-            <a:endParaRPr lang="en-US" dirty="0"/>
           </a:p>
         </p:txBody>
       </p:sp>
@@ -3818,51 +3775,51 @@
           <a:lstStyle/>
           <a:p>
             <a:r>
-              <a:rPr lang="en-US" dirty="0" smtClean="0"/>
+              <a:rPr lang="en-US" dirty="0"/>
               <a:t>All operations are done on SQL files, by writing SQL commands</a:t>
             </a:r>
           </a:p>
           <a:p>
             <a:r>
-              <a:rPr lang="en-US" dirty="0" smtClean="0"/>
+              <a:rPr lang="en-US" dirty="0"/>
               <a:t>Each migration file has a version number, in increasing order</a:t>
             </a:r>
           </a:p>
           <a:p>
             <a:r>
-              <a:rPr lang="en-US" dirty="0" smtClean="0"/>
+              <a:rPr lang="en-US" dirty="0"/>
               <a:t>Flyway will check if any new migration has not been applied yet, and apply them otherwise, just </a:t>
             </a:r>
             <a:r>
-              <a:rPr lang="en-US" i="1" dirty="0" smtClean="0"/>
+              <a:rPr lang="en-US" i="1" dirty="0"/>
               <a:t>once</a:t>
             </a:r>
           </a:p>
           <a:p>
             <a:r>
-              <a:rPr lang="en-US" dirty="0" smtClean="0"/>
+              <a:rPr lang="en-US" dirty="0"/>
               <a:t>It creates its own table to keep track of which migrations have been applied so far on a database</a:t>
             </a:r>
           </a:p>
           <a:p>
             <a:r>
-              <a:rPr lang="en-US" dirty="0" err="1" smtClean="0"/>
+              <a:rPr lang="en-US" dirty="0" err="1"/>
               <a:t>SpringBoot</a:t>
             </a:r>
             <a:r>
-              <a:rPr lang="en-US" dirty="0" smtClean="0"/>
+              <a:rPr lang="en-US" dirty="0"/>
               <a:t> </a:t>
             </a:r>
             <a:r>
-              <a:rPr lang="en-US" i="1" dirty="0" smtClean="0"/>
+              <a:rPr lang="en-US" i="1" dirty="0"/>
               <a:t>automatically</a:t>
             </a:r>
             <a:r>
-              <a:rPr lang="en-US" dirty="0" smtClean="0"/>
+              <a:rPr lang="en-US" dirty="0"/>
               <a:t> runs Flyway if found on </a:t>
             </a:r>
             <a:r>
-              <a:rPr lang="en-US" dirty="0" err="1" smtClean="0"/>
+              <a:rPr lang="en-US" dirty="0" err="1"/>
               <a:t>classpath</a:t>
             </a:r>
             <a:endParaRPr lang="en-US" dirty="0"/>
@@ -3901,7 +3858,13 @@
       </p:grpSpPr>
       <p:sp>
         <p:nvSpPr>
-          <p:cNvPr id="4" name="Title 3"/>
+          <p:cNvPr id="2" name="Title 1">
+            <a:extLst>
+              <a:ext uri="{FF2B5EF4-FFF2-40B4-BE49-F238E27FC236}">
+                <a16:creationId xmlns:a16="http://schemas.microsoft.com/office/drawing/2014/main" id="{B4D6E163-79C8-974B-8F60-5FE2196AD815}"/>
+              </a:ext>
+            </a:extLst>
+          </p:cNvPr>
           <p:cNvSpPr>
             <a:spLocks noGrp="1"/>
           </p:cNvSpPr>
@@ -3915,36 +3878,16 @@
           <a:lstStyle/>
           <a:p>
             <a:r>
-              <a:rPr lang="en-US" dirty="0" smtClean="0"/>
-              <a:t>Cloud Deployment</a:t>
-            </a:r>
-            <a:endParaRPr lang="en-US" dirty="0"/>
-          </a:p>
-        </p:txBody>
-      </p:sp>
-      <p:sp>
-        <p:nvSpPr>
-          <p:cNvPr id="5" name="Text Placeholder 4"/>
-          <p:cNvSpPr>
-            <a:spLocks noGrp="1"/>
-          </p:cNvSpPr>
-          <p:nvPr>
-            <p:ph type="body" idx="1"/>
-          </p:nvPr>
-        </p:nvSpPr>
-        <p:spPr/>
-        <p:txBody>
-          <a:bodyPr/>
-          <a:lstStyle/>
-          <a:p>
-            <a:endParaRPr lang="en-US"/>
+              <a:rPr lang="en-US" dirty="0"/>
+              <a:t>Logging</a:t>
+            </a:r>
           </a:p>
         </p:txBody>
       </p:sp>
     </p:spTree>
     <p:extLst>
       <p:ext uri="{BB962C8B-B14F-4D97-AF65-F5344CB8AC3E}">
-        <p14:creationId xmlns:p14="http://schemas.microsoft.com/office/powerpoint/2010/main" val="2329627873"/>
+        <p14:creationId xmlns:p14="http://schemas.microsoft.com/office/powerpoint/2010/main" val="2266761520"/>
       </p:ext>
     </p:extLst>
   </p:cSld>
@@ -3973,41 +3916,24 @@
       </p:grpSpPr>
       <p:sp>
         <p:nvSpPr>
-          <p:cNvPr id="2" name="Title 1"/>
+          <p:cNvPr id="2" name="Title 1">
+            <a:extLst>
+              <a:ext uri="{FF2B5EF4-FFF2-40B4-BE49-F238E27FC236}">
+                <a16:creationId xmlns:a16="http://schemas.microsoft.com/office/drawing/2014/main" id="{948D2D41-5B69-224D-827E-A126080E8408}"/>
+              </a:ext>
+            </a:extLst>
+          </p:cNvPr>
           <p:cNvSpPr>
             <a:spLocks noGrp="1"/>
           </p:cNvSpPr>
           <p:nvPr>
             <p:ph type="title"/>
-          </p:nvPr>
-        </p:nvSpPr>
-        <p:spPr/>
-        <p:txBody>
-          <a:bodyPr/>
-          <a:lstStyle/>
-          <a:p>
-            <a:r>
-              <a:rPr lang="en-US" dirty="0" smtClean="0"/>
-              <a:t>Deployment</a:t>
-            </a:r>
-            <a:endParaRPr lang="en-US" dirty="0"/>
-          </a:p>
-        </p:txBody>
-      </p:sp>
-      <p:sp>
-        <p:nvSpPr>
-          <p:cNvPr id="3" name="Content Placeholder 2"/>
-          <p:cNvSpPr>
-            <a:spLocks noGrp="1"/>
-          </p:cNvSpPr>
-          <p:nvPr>
-            <p:ph idx="1"/>
           </p:nvPr>
         </p:nvSpPr>
         <p:spPr>
           <a:xfrm>
-            <a:off x="282804" y="1825625"/>
-            <a:ext cx="11070996" cy="4914540"/>
+            <a:off x="224725" y="365125"/>
+            <a:ext cx="11801959" cy="1325563"/>
           </a:xfrm>
         </p:spPr>
         <p:txBody>
@@ -4015,41 +3941,69 @@
           <a:lstStyle/>
           <a:p>
             <a:r>
-              <a:rPr lang="en-US" dirty="0" smtClean="0"/>
-              <a:t>When your application is ready, you need to </a:t>
-            </a:r>
-            <a:r>
-              <a:rPr lang="en-US" i="1" dirty="0" smtClean="0"/>
-              <a:t>deploy</a:t>
-            </a:r>
-            <a:r>
-              <a:rPr lang="en-US" dirty="0" smtClean="0"/>
-              <a:t> it</a:t>
-            </a:r>
-          </a:p>
-          <a:p>
-            <a:r>
-              <a:rPr lang="en-US" dirty="0" smtClean="0"/>
-              <a:t>But where?</a:t>
-            </a:r>
-          </a:p>
-          <a:p>
-            <a:r>
-              <a:rPr lang="en-US" dirty="0" smtClean="0"/>
-              <a:t>You can host your own servers, but then you need to handle everything by yourself</a:t>
+              <a:rPr lang="en-US" dirty="0"/>
+              <a:t>Log Statements</a:t>
+            </a:r>
+          </a:p>
+        </p:txBody>
+      </p:sp>
+      <p:sp>
+        <p:nvSpPr>
+          <p:cNvPr id="3" name="Content Placeholder 2">
+            <a:extLst>
+              <a:ext uri="{FF2B5EF4-FFF2-40B4-BE49-F238E27FC236}">
+                <a16:creationId xmlns:a16="http://schemas.microsoft.com/office/drawing/2014/main" id="{C70C83C6-23F2-D447-9A7C-6B61AC308188}"/>
+              </a:ext>
+            </a:extLst>
+          </p:cNvPr>
+          <p:cNvSpPr>
+            <a:spLocks noGrp="1"/>
+          </p:cNvSpPr>
+          <p:nvPr>
+            <p:ph idx="1"/>
+          </p:nvPr>
+        </p:nvSpPr>
+        <p:spPr>
+          <a:xfrm>
+            <a:off x="224725" y="1825625"/>
+            <a:ext cx="11801960" cy="4900640"/>
+          </a:xfrm>
+        </p:spPr>
+        <p:txBody>
+          <a:bodyPr>
+            <a:normAutofit lnSpcReduction="10000"/>
+          </a:bodyPr>
+          <a:lstStyle/>
+          <a:p>
+            <a:r>
+              <a:rPr lang="en-US" dirty="0"/>
+              <a:t>It is important to keep track of what is going on in an application</a:t>
+            </a:r>
+          </a:p>
+          <a:p>
+            <a:r>
+              <a:rPr lang="en-US" dirty="0"/>
+              <a:t>Especially important when there are bugs, and you want to save the stack-trace of the exceptions</a:t>
             </a:r>
           </a:p>
           <a:p>
             <a:pPr lvl="1"/>
             <a:r>
-              <a:rPr lang="en-US" dirty="0" smtClean="0"/>
-              <a:t>hardware (purchasing and maintenance), backups, DNS, etc.</a:t>
-            </a:r>
-          </a:p>
-          <a:p>
-            <a:r>
-              <a:rPr lang="en-US" dirty="0" smtClean="0"/>
-              <a:t>Many companies do it, but can be difficult for startups and private individuals</a:t>
+              <a:rPr lang="en-US" dirty="0"/>
+              <a:t>needed for example to help debugging such possible bugs</a:t>
+            </a:r>
+          </a:p>
+          <a:p>
+            <a:r>
+              <a:rPr lang="en-US" dirty="0"/>
+              <a:t>Logging is a bit tricky, and so there are several libraries that help doing it</a:t>
+            </a:r>
+          </a:p>
+          <a:p>
+            <a:pPr lvl="1"/>
+            <a:r>
+              <a:rPr lang="en-US" dirty="0"/>
+              <a:t>e.g., because doing I/O, it can impact the JIT compiler… and you could have optimizations in which a logging framework writes on a buffer, and then another thread reads from it to do the I/O…</a:t>
             </a:r>
           </a:p>
         </p:txBody>
@@ -4057,7 +4011,7 @@
     </p:spTree>
     <p:extLst>
       <p:ext uri="{BB962C8B-B14F-4D97-AF65-F5344CB8AC3E}">
-        <p14:creationId xmlns:p14="http://schemas.microsoft.com/office/powerpoint/2010/main" val="892869614"/>
+        <p14:creationId xmlns:p14="http://schemas.microsoft.com/office/powerpoint/2010/main" val="3575741525"/>
       </p:ext>
     </p:extLst>
   </p:cSld>
@@ -4086,7 +4040,13 @@
       </p:grpSpPr>
       <p:sp>
         <p:nvSpPr>
-          <p:cNvPr id="2" name="Title 1"/>
+          <p:cNvPr id="2" name="Title 1">
+            <a:extLst>
+              <a:ext uri="{FF2B5EF4-FFF2-40B4-BE49-F238E27FC236}">
+                <a16:creationId xmlns:a16="http://schemas.microsoft.com/office/drawing/2014/main" id="{34ADBF1B-B757-364C-960A-0F97509EDCC6}"/>
+              </a:ext>
+            </a:extLst>
+          </p:cNvPr>
           <p:cNvSpPr>
             <a:spLocks noGrp="1"/>
           </p:cNvSpPr>
@@ -4100,8 +4060,12 @@
           <a:lstStyle/>
           <a:p>
             <a:r>
-              <a:rPr lang="en-US" dirty="0" smtClean="0"/>
-              <a:t>Cloud Deployment</a:t>
+              <a:rPr lang="en-US" dirty="0"/>
+              <a:t>SLF4J and </a:t>
+            </a:r>
+            <a:r>
+              <a:rPr lang="en-US" dirty="0" err="1"/>
+              <a:t>Logback</a:t>
             </a:r>
             <a:endParaRPr lang="en-US" dirty="0"/>
           </a:p>
@@ -4109,7 +4073,13 @@
       </p:sp>
       <p:sp>
         <p:nvSpPr>
-          <p:cNvPr id="3" name="Content Placeholder 2"/>
+          <p:cNvPr id="3" name="Content Placeholder 2">
+            <a:extLst>
+              <a:ext uri="{FF2B5EF4-FFF2-40B4-BE49-F238E27FC236}">
+                <a16:creationId xmlns:a16="http://schemas.microsoft.com/office/drawing/2014/main" id="{92BFC660-58ED-844C-ABEB-D022ABA06FDF}"/>
+              </a:ext>
+            </a:extLst>
+          </p:cNvPr>
           <p:cNvSpPr>
             <a:spLocks noGrp="1"/>
           </p:cNvSpPr>
@@ -4119,94 +4089,122 @@
         </p:nvSpPr>
         <p:spPr>
           <a:xfrm>
-            <a:off x="245097" y="1825624"/>
-            <a:ext cx="11726944" cy="4905113"/>
+            <a:off x="263471" y="1825625"/>
+            <a:ext cx="11724468" cy="4916138"/>
           </a:xfrm>
         </p:spPr>
         <p:txBody>
           <a:bodyPr>
-            <a:normAutofit lnSpcReduction="10000"/>
+            <a:normAutofit fontScale="92500" lnSpcReduction="10000"/>
           </a:bodyPr>
           <a:lstStyle/>
           <a:p>
             <a:r>
-              <a:rPr lang="en-US" dirty="0" smtClean="0"/>
-              <a:t>Different companies provide cloud hosting solutions for your applications, which frees you from hardware issues, but for a price</a:t>
-            </a:r>
-          </a:p>
-          <a:p>
-            <a:r>
               <a:rPr lang="en-US" i="1" dirty="0"/>
-              <a:t>Amazon Web Services‎ </a:t>
-            </a:r>
-            <a:r>
-              <a:rPr lang="en-US" dirty="0" smtClean="0"/>
-              <a:t>(AWS)</a:t>
-            </a:r>
-            <a:r>
-              <a:rPr lang="en-US" i="1" dirty="0" smtClean="0"/>
-              <a:t> </a:t>
-            </a:r>
-            <a:r>
-              <a:rPr lang="en-US" dirty="0" smtClean="0"/>
-              <a:t>is perhaps the most famous/used one</a:t>
+              <a:t>SLF4J</a:t>
+            </a:r>
+            <a:r>
+              <a:rPr lang="en-US" dirty="0"/>
+              <a:t> is the most common library for logging in Java</a:t>
+            </a:r>
+          </a:p>
+          <a:p>
+            <a:r>
+              <a:rPr lang="en-US" dirty="0"/>
+              <a:t>It is a “</a:t>
+            </a:r>
+            <a:r>
+              <a:rPr lang="en-US" i="1" dirty="0"/>
+              <a:t>facade</a:t>
+            </a:r>
+            <a:r>
+              <a:rPr lang="en-US" dirty="0"/>
+              <a:t>”, i.e., set of base classes/interfaces, where the actual implementation is in a different library, and it is abstracted away</a:t>
             </a:r>
           </a:p>
           <a:p>
             <a:pPr lvl="1"/>
             <a:r>
-              <a:rPr lang="en-US" dirty="0" err="1"/>
-              <a:t>e</a:t>
-            </a:r>
-            <a:r>
-              <a:rPr lang="en-US" dirty="0" err="1" smtClean="0"/>
-              <a:t>g</a:t>
-            </a:r>
-            <a:r>
-              <a:rPr lang="en-US" dirty="0" smtClean="0"/>
-              <a:t>, </a:t>
-            </a:r>
-            <a:r>
-              <a:rPr lang="en-US" i="1" dirty="0" smtClean="0"/>
-              <a:t>Netflix</a:t>
-            </a:r>
-            <a:r>
-              <a:rPr lang="en-US" dirty="0" smtClean="0"/>
-              <a:t> runs on AWS </a:t>
-            </a:r>
-          </a:p>
-          <a:p>
-            <a:r>
-              <a:rPr lang="en-US" i="1" dirty="0" smtClean="0"/>
-              <a:t>Automated scaling</a:t>
-            </a:r>
-            <a:r>
-              <a:rPr lang="en-US" dirty="0" smtClean="0"/>
-              <a:t>: if you need more load, automatically rent more nodes, and automatically scale down if less load</a:t>
+              <a:rPr lang="en-US" dirty="0"/>
+              <a:t>i.e., you only import classes from SLF4J in your code</a:t>
+            </a:r>
+          </a:p>
+          <a:p>
+            <a:r>
+              <a:rPr lang="en-US" dirty="0"/>
+              <a:t>Can use different logging framework bindings for SLF4J, where </a:t>
+            </a:r>
+            <a:r>
+              <a:rPr lang="en-US" i="1" dirty="0" err="1"/>
+              <a:t>Logback</a:t>
+            </a:r>
+            <a:r>
+              <a:rPr lang="en-US" dirty="0"/>
+              <a:t> is the most popular</a:t>
             </a:r>
           </a:p>
           <a:p>
             <a:pPr lvl="1"/>
             <a:r>
-              <a:rPr lang="en-US" dirty="0" smtClean="0"/>
-              <a:t>this is also good for applications targeting a specific country (</a:t>
-            </a:r>
-            <a:r>
-              <a:rPr lang="en-US" dirty="0" err="1" smtClean="0"/>
-              <a:t>eg</a:t>
-            </a:r>
-            <a:r>
-              <a:rPr lang="en-US" dirty="0" smtClean="0"/>
-              <a:t> Norway), in which you will not get much load during the night  </a:t>
-            </a:r>
-            <a:endParaRPr lang="en-US" dirty="0"/>
+              <a:rPr lang="en-US" dirty="0"/>
+              <a:t>for example, think of </a:t>
+            </a:r>
+            <a:r>
+              <a:rPr lang="en-US" i="1" dirty="0"/>
+              <a:t>SLF4J</a:t>
+            </a:r>
+            <a:r>
+              <a:rPr lang="en-US" dirty="0"/>
+              <a:t> as </a:t>
+            </a:r>
+            <a:r>
+              <a:rPr lang="en-US" i="1" dirty="0"/>
+              <a:t>JPA</a:t>
+            </a:r>
+            <a:r>
+              <a:rPr lang="en-US" dirty="0"/>
+              <a:t>, and </a:t>
+            </a:r>
+            <a:r>
+              <a:rPr lang="en-US" i="1" dirty="0" err="1"/>
+              <a:t>Logback</a:t>
+            </a:r>
+            <a:r>
+              <a:rPr lang="en-US" dirty="0"/>
+              <a:t> as </a:t>
+            </a:r>
+            <a:r>
+              <a:rPr lang="en-US" i="1" dirty="0"/>
+              <a:t>Hibernate</a:t>
+            </a:r>
+          </a:p>
+          <a:p>
+            <a:r>
+              <a:rPr lang="en-US" dirty="0"/>
+              <a:t>Many third-party libraries use SLF4J, but will not provide a binding</a:t>
+            </a:r>
+          </a:p>
+          <a:p>
+            <a:pPr lvl="1"/>
+            <a:r>
+              <a:rPr lang="en-US" dirty="0"/>
+              <a:t>this enables you to have a single binding for your whole app, including the 3</a:t>
+            </a:r>
+            <a:r>
+              <a:rPr lang="en-US" baseline="30000" dirty="0"/>
+              <a:t>rd</a:t>
+            </a:r>
+            <a:r>
+              <a:rPr lang="en-US" dirty="0"/>
+              <a:t>-party libraries</a:t>
+            </a:r>
           </a:p>
         </p:txBody>
       </p:sp>
     </p:spTree>
     <p:extLst>
       <p:ext uri="{BB962C8B-B14F-4D97-AF65-F5344CB8AC3E}">
-        <p14:creationId xmlns:p14="http://schemas.microsoft.com/office/powerpoint/2010/main" val="345121760"/>
+        <p14:creationId xmlns:p14="http://schemas.microsoft.com/office/powerpoint/2010/main" val="363991301"/>
       </p:ext>
     </p:extLst>
   </p:cSld>
@@ -4235,6 +4233,1088 @@
       </p:grpSpPr>
       <p:sp>
         <p:nvSpPr>
+          <p:cNvPr id="2" name="Title 1">
+            <a:extLst>
+              <a:ext uri="{FF2B5EF4-FFF2-40B4-BE49-F238E27FC236}">
+                <a16:creationId xmlns:a16="http://schemas.microsoft.com/office/drawing/2014/main" id="{10CA7A48-80D2-8B42-92D9-B8EFC68667CC}"/>
+              </a:ext>
+            </a:extLst>
+          </p:cNvPr>
+          <p:cNvSpPr>
+            <a:spLocks noGrp="1"/>
+          </p:cNvSpPr>
+          <p:nvPr>
+            <p:ph type="title"/>
+          </p:nvPr>
+        </p:nvSpPr>
+        <p:spPr/>
+        <p:txBody>
+          <a:bodyPr/>
+          <a:lstStyle/>
+          <a:p>
+            <a:r>
+              <a:rPr lang="en-US" dirty="0"/>
+              <a:t>Loggers</a:t>
+            </a:r>
+          </a:p>
+        </p:txBody>
+      </p:sp>
+      <p:sp>
+        <p:nvSpPr>
+          <p:cNvPr id="3" name="Content Placeholder 2">
+            <a:extLst>
+              <a:ext uri="{FF2B5EF4-FFF2-40B4-BE49-F238E27FC236}">
+                <a16:creationId xmlns:a16="http://schemas.microsoft.com/office/drawing/2014/main" id="{B3A74718-5FB4-9040-98BD-DD16870BFB07}"/>
+              </a:ext>
+            </a:extLst>
+          </p:cNvPr>
+          <p:cNvSpPr>
+            <a:spLocks noGrp="1"/>
+          </p:cNvSpPr>
+          <p:nvPr>
+            <p:ph idx="1"/>
+          </p:nvPr>
+        </p:nvSpPr>
+        <p:spPr>
+          <a:xfrm>
+            <a:off x="193729" y="1825624"/>
+            <a:ext cx="11770963" cy="4885142"/>
+          </a:xfrm>
+        </p:spPr>
+        <p:txBody>
+          <a:bodyPr>
+            <a:normAutofit lnSpcReduction="10000"/>
+          </a:bodyPr>
+          <a:lstStyle/>
+          <a:p>
+            <a:r>
+              <a:rPr lang="en-US" dirty="0"/>
+              <a:t>Usually creating one logger per class, named with the full name of the class itself (including the package)</a:t>
+            </a:r>
+          </a:p>
+          <a:p>
+            <a:pPr lvl="1"/>
+            <a:r>
+              <a:rPr lang="en-US" dirty="0"/>
+              <a:t>created using </a:t>
+            </a:r>
+            <a:r>
+              <a:rPr lang="en-US" i="1" dirty="0" err="1"/>
+              <a:t>LoggerFactory.getLogger</a:t>
+            </a:r>
+            <a:r>
+              <a:rPr lang="en-US" i="1" dirty="0"/>
+              <a:t>(name)</a:t>
+            </a:r>
+            <a:r>
+              <a:rPr lang="en-US" dirty="0"/>
+              <a:t>, and typically stored in a final static variable</a:t>
+            </a:r>
+          </a:p>
+          <a:p>
+            <a:r>
+              <a:rPr lang="en-US" dirty="0"/>
+              <a:t>Configurations will be in a </a:t>
+            </a:r>
+            <a:r>
+              <a:rPr lang="en-US" i="1" dirty="0" err="1"/>
+              <a:t>logback.xml</a:t>
+            </a:r>
+            <a:r>
+              <a:rPr lang="en-US" i="1" dirty="0"/>
+              <a:t> </a:t>
+            </a:r>
+            <a:r>
+              <a:rPr lang="en-US" dirty="0"/>
+              <a:t>file</a:t>
+            </a:r>
+          </a:p>
+          <a:p>
+            <a:r>
+              <a:rPr lang="en-US" dirty="0"/>
+              <a:t>For testing, can have a different </a:t>
+            </a:r>
+            <a:r>
+              <a:rPr lang="en-US" i="1" dirty="0" err="1"/>
+              <a:t>logback-test.xml</a:t>
+            </a:r>
+            <a:r>
+              <a:rPr lang="en-US" i="1" dirty="0"/>
+              <a:t> </a:t>
+            </a:r>
+            <a:r>
+              <a:rPr lang="en-US" dirty="0"/>
+              <a:t>file which will have precedence</a:t>
+            </a:r>
+          </a:p>
+          <a:p>
+            <a:r>
+              <a:rPr lang="en-US" dirty="0"/>
+              <a:t>Many possible configurations</a:t>
+            </a:r>
+          </a:p>
+          <a:p>
+            <a:pPr lvl="1"/>
+            <a:r>
+              <a:rPr lang="en-US" dirty="0" err="1"/>
+              <a:t>eg</a:t>
+            </a:r>
+            <a:r>
+              <a:rPr lang="en-US" dirty="0"/>
+              <a:t>, what to do with the logs? Should just be on the console? Should be written to a file? Should be sent to a remote server? Etc. </a:t>
+            </a:r>
+          </a:p>
+        </p:txBody>
+      </p:sp>
+    </p:spTree>
+    <p:extLst>
+      <p:ext uri="{BB962C8B-B14F-4D97-AF65-F5344CB8AC3E}">
+        <p14:creationId xmlns:p14="http://schemas.microsoft.com/office/powerpoint/2010/main" val="3372328965"/>
+      </p:ext>
+    </p:extLst>
+  </p:cSld>
+  <p:clrMapOvr>
+    <a:masterClrMapping/>
+  </p:clrMapOvr>
+</p:sld>
+</file>
+
+<file path=ppt/slides/slide17.xml><?xml version="1.0" encoding="utf-8"?>
+<p:sld xmlns:a="http://schemas.openxmlformats.org/drawingml/2006/main" xmlns:r="http://schemas.openxmlformats.org/officeDocument/2006/relationships" xmlns:p="http://schemas.openxmlformats.org/presentationml/2006/main">
+  <p:cSld>
+    <p:spTree>
+      <p:nvGrpSpPr>
+        <p:cNvPr id="1" name=""/>
+        <p:cNvGrpSpPr/>
+        <p:nvPr/>
+      </p:nvGrpSpPr>
+      <p:grpSpPr>
+        <a:xfrm>
+          <a:off x="0" y="0"/>
+          <a:ext cx="0" cy="0"/>
+          <a:chOff x="0" y="0"/>
+          <a:chExt cx="0" cy="0"/>
+        </a:xfrm>
+      </p:grpSpPr>
+      <p:sp>
+        <p:nvSpPr>
+          <p:cNvPr id="2" name="Title 1">
+            <a:extLst>
+              <a:ext uri="{FF2B5EF4-FFF2-40B4-BE49-F238E27FC236}">
+                <a16:creationId xmlns:a16="http://schemas.microsoft.com/office/drawing/2014/main" id="{0DFB71F8-9C0F-4944-950A-5571AC221882}"/>
+              </a:ext>
+            </a:extLst>
+          </p:cNvPr>
+          <p:cNvSpPr>
+            <a:spLocks noGrp="1"/>
+          </p:cNvSpPr>
+          <p:nvPr>
+            <p:ph type="title"/>
+          </p:nvPr>
+        </p:nvSpPr>
+        <p:spPr/>
+        <p:txBody>
+          <a:bodyPr/>
+          <a:lstStyle/>
+          <a:p>
+            <a:r>
+              <a:rPr lang="en-US" dirty="0"/>
+              <a:t>Log Statements and Levels</a:t>
+            </a:r>
+          </a:p>
+        </p:txBody>
+      </p:sp>
+      <p:sp>
+        <p:nvSpPr>
+          <p:cNvPr id="3" name="Content Placeholder 2">
+            <a:extLst>
+              <a:ext uri="{FF2B5EF4-FFF2-40B4-BE49-F238E27FC236}">
+                <a16:creationId xmlns:a16="http://schemas.microsoft.com/office/drawing/2014/main" id="{5AE60A25-FF38-4741-A038-58CB2C530281}"/>
+              </a:ext>
+            </a:extLst>
+          </p:cNvPr>
+          <p:cNvSpPr>
+            <a:spLocks noGrp="1"/>
+          </p:cNvSpPr>
+          <p:nvPr>
+            <p:ph idx="1"/>
+          </p:nvPr>
+        </p:nvSpPr>
+        <p:spPr>
+          <a:xfrm>
+            <a:off x="241515" y="1690687"/>
+            <a:ext cx="11792919" cy="5027827"/>
+          </a:xfrm>
+        </p:spPr>
+        <p:txBody>
+          <a:bodyPr/>
+          <a:lstStyle/>
+          <a:p>
+            <a:r>
+              <a:rPr lang="en-US" dirty="0"/>
+              <a:t>Different methods: </a:t>
+            </a:r>
+            <a:r>
+              <a:rPr lang="en-US" dirty="0" err="1"/>
+              <a:t>eg</a:t>
+            </a:r>
+            <a:r>
+              <a:rPr lang="en-US" dirty="0"/>
+              <a:t>, </a:t>
+            </a:r>
+            <a:r>
+              <a:rPr lang="en-US" b="1" dirty="0" err="1"/>
+              <a:t>log.debug</a:t>
+            </a:r>
+            <a:r>
+              <a:rPr lang="en-US" b="1" dirty="0"/>
+              <a:t>(</a:t>
+            </a:r>
+            <a:r>
+              <a:rPr lang="en-US" b="1" dirty="0" err="1"/>
+              <a:t>msg</a:t>
+            </a:r>
+            <a:r>
+              <a:rPr lang="en-US" b="1" dirty="0"/>
+              <a:t>) </a:t>
+            </a:r>
+            <a:r>
+              <a:rPr lang="en-US" dirty="0"/>
+              <a:t>and </a:t>
+            </a:r>
+            <a:r>
+              <a:rPr lang="en-US" b="1" dirty="0" err="1"/>
+              <a:t>log.error</a:t>
+            </a:r>
+            <a:r>
+              <a:rPr lang="en-US" b="1" dirty="0"/>
+              <a:t>(</a:t>
+            </a:r>
+            <a:r>
+              <a:rPr lang="en-US" b="1" dirty="0" err="1"/>
+              <a:t>msg</a:t>
+            </a:r>
+            <a:r>
+              <a:rPr lang="en-US" b="1" dirty="0"/>
+              <a:t>)</a:t>
+            </a:r>
+          </a:p>
+          <a:p>
+            <a:r>
+              <a:rPr lang="en-US" dirty="0"/>
+              <a:t>Based on the LEVEL of logging, some messages can be discarded</a:t>
+            </a:r>
+          </a:p>
+          <a:p>
+            <a:pPr lvl="1"/>
+            <a:r>
+              <a:rPr lang="en-US" dirty="0"/>
+              <a:t>for example, you could tell the system to discard DEBUG logs, have WARN only on console, and ERROR on console and also saved on a file</a:t>
+            </a:r>
+          </a:p>
+          <a:p>
+            <a:r>
+              <a:rPr lang="en-US" dirty="0"/>
+              <a:t>Levels: </a:t>
+            </a:r>
+            <a:r>
+              <a:rPr lang="en-US" b="1" dirty="0"/>
+              <a:t>TRACE</a:t>
+            </a:r>
+            <a:r>
+              <a:rPr lang="en-US" dirty="0"/>
+              <a:t>, </a:t>
+            </a:r>
+            <a:r>
+              <a:rPr lang="en-US" b="1" dirty="0"/>
+              <a:t>DEBUG</a:t>
+            </a:r>
+            <a:r>
+              <a:rPr lang="en-US" dirty="0"/>
+              <a:t>, </a:t>
+            </a:r>
+            <a:r>
+              <a:rPr lang="en-US" b="1" dirty="0"/>
+              <a:t>INFO</a:t>
+            </a:r>
+            <a:r>
+              <a:rPr lang="en-US" dirty="0"/>
+              <a:t>, </a:t>
+            </a:r>
+            <a:r>
+              <a:rPr lang="en-US" b="1" dirty="0"/>
+              <a:t>WARN</a:t>
+            </a:r>
+            <a:r>
+              <a:rPr lang="en-US" dirty="0"/>
+              <a:t> and </a:t>
+            </a:r>
+            <a:r>
+              <a:rPr lang="en-US" b="1" dirty="0"/>
+              <a:t>ERROR</a:t>
+            </a:r>
+          </a:p>
+          <a:p>
+            <a:r>
+              <a:rPr lang="en-US" dirty="0"/>
+              <a:t>Those are in order: when you activate a level, all levels above it are activated as well</a:t>
+            </a:r>
+          </a:p>
+          <a:p>
+            <a:pPr lvl="1"/>
+            <a:r>
+              <a:rPr lang="en-US" dirty="0" err="1"/>
+              <a:t>eg</a:t>
+            </a:r>
+            <a:r>
+              <a:rPr lang="en-US" dirty="0"/>
+              <a:t>, activating DEBUG does activate everything but TRACE</a:t>
+            </a:r>
+          </a:p>
+        </p:txBody>
+      </p:sp>
+    </p:spTree>
+    <p:extLst>
+      <p:ext uri="{BB962C8B-B14F-4D97-AF65-F5344CB8AC3E}">
+        <p14:creationId xmlns:p14="http://schemas.microsoft.com/office/powerpoint/2010/main" val="1474049871"/>
+      </p:ext>
+    </p:extLst>
+  </p:cSld>
+  <p:clrMapOvr>
+    <a:masterClrMapping/>
+  </p:clrMapOvr>
+</p:sld>
+</file>
+
+<file path=ppt/slides/slide18.xml><?xml version="1.0" encoding="utf-8"?>
+<p:sld xmlns:a="http://schemas.openxmlformats.org/drawingml/2006/main" xmlns:r="http://schemas.openxmlformats.org/officeDocument/2006/relationships" xmlns:p="http://schemas.openxmlformats.org/presentationml/2006/main">
+  <p:cSld>
+    <p:spTree>
+      <p:nvGrpSpPr>
+        <p:cNvPr id="1" name=""/>
+        <p:cNvGrpSpPr/>
+        <p:nvPr/>
+      </p:nvGrpSpPr>
+      <p:grpSpPr>
+        <a:xfrm>
+          <a:off x="0" y="0"/>
+          <a:ext cx="0" cy="0"/>
+          <a:chOff x="0" y="0"/>
+          <a:chExt cx="0" cy="0"/>
+        </a:xfrm>
+      </p:grpSpPr>
+      <p:sp>
+        <p:nvSpPr>
+          <p:cNvPr id="2" name="Title 1">
+            <a:extLst>
+              <a:ext uri="{FF2B5EF4-FFF2-40B4-BE49-F238E27FC236}">
+                <a16:creationId xmlns:a16="http://schemas.microsoft.com/office/drawing/2014/main" id="{DE7DA950-C40B-2845-92CA-BE408B38CC44}"/>
+              </a:ext>
+            </a:extLst>
+          </p:cNvPr>
+          <p:cNvSpPr>
+            <a:spLocks noGrp="1"/>
+          </p:cNvSpPr>
+          <p:nvPr>
+            <p:ph type="title"/>
+          </p:nvPr>
+        </p:nvSpPr>
+        <p:spPr/>
+        <p:txBody>
+          <a:bodyPr/>
+          <a:lstStyle/>
+          <a:p>
+            <a:r>
+              <a:rPr lang="en-US" dirty="0"/>
+              <a:t>Setting Log Levels</a:t>
+            </a:r>
+          </a:p>
+        </p:txBody>
+      </p:sp>
+      <p:sp>
+        <p:nvSpPr>
+          <p:cNvPr id="3" name="Content Placeholder 2">
+            <a:extLst>
+              <a:ext uri="{FF2B5EF4-FFF2-40B4-BE49-F238E27FC236}">
+                <a16:creationId xmlns:a16="http://schemas.microsoft.com/office/drawing/2014/main" id="{589855C8-2A1B-384B-9B83-C2E3393DD0C1}"/>
+              </a:ext>
+            </a:extLst>
+          </p:cNvPr>
+          <p:cNvSpPr>
+            <a:spLocks noGrp="1"/>
+          </p:cNvSpPr>
+          <p:nvPr>
+            <p:ph idx="1"/>
+          </p:nvPr>
+        </p:nvSpPr>
+        <p:spPr>
+          <a:xfrm>
+            <a:off x="317715" y="1825624"/>
+            <a:ext cx="11639227" cy="4830898"/>
+          </a:xfrm>
+        </p:spPr>
+        <p:txBody>
+          <a:bodyPr/>
+          <a:lstStyle/>
+          <a:p>
+            <a:r>
+              <a:rPr lang="en-US" dirty="0"/>
+              <a:t>Levels can be fine-tuned</a:t>
+            </a:r>
+          </a:p>
+          <a:p>
+            <a:r>
+              <a:rPr lang="en-US" dirty="0"/>
+              <a:t>You can a have a log-level for the whole application, e.g. typically WARN or ERROR</a:t>
+            </a:r>
+          </a:p>
+          <a:p>
+            <a:r>
+              <a:rPr lang="en-US" dirty="0"/>
+              <a:t>Then, can override the level for some specific loggers</a:t>
+            </a:r>
+          </a:p>
+          <a:p>
+            <a:pPr lvl="1"/>
+            <a:r>
+              <a:rPr lang="en-US" dirty="0"/>
+              <a:t>e.g., you could put it to INFO for your classes, but not the ones of the 3</a:t>
+            </a:r>
+            <a:r>
+              <a:rPr lang="en-US" baseline="30000" dirty="0"/>
+              <a:t>rd</a:t>
+            </a:r>
+            <a:r>
+              <a:rPr lang="en-US" dirty="0"/>
+              <a:t>-party libraries</a:t>
+            </a:r>
+          </a:p>
+          <a:p>
+            <a:r>
+              <a:rPr lang="en-US" dirty="0"/>
+              <a:t>When testing/debugging some classes, you could put DEBUG for just those </a:t>
+            </a:r>
+          </a:p>
+        </p:txBody>
+      </p:sp>
+    </p:spTree>
+    <p:extLst>
+      <p:ext uri="{BB962C8B-B14F-4D97-AF65-F5344CB8AC3E}">
+        <p14:creationId xmlns:p14="http://schemas.microsoft.com/office/powerpoint/2010/main" val="2411363819"/>
+      </p:ext>
+    </p:extLst>
+  </p:cSld>
+  <p:clrMapOvr>
+    <a:masterClrMapping/>
+  </p:clrMapOvr>
+</p:sld>
+</file>
+
+<file path=ppt/slides/slide19.xml><?xml version="1.0" encoding="utf-8"?>
+<p:sld xmlns:a="http://schemas.openxmlformats.org/drawingml/2006/main" xmlns:r="http://schemas.openxmlformats.org/officeDocument/2006/relationships" xmlns:p="http://schemas.openxmlformats.org/presentationml/2006/main">
+  <p:cSld>
+    <p:spTree>
+      <p:nvGrpSpPr>
+        <p:cNvPr id="1" name=""/>
+        <p:cNvGrpSpPr/>
+        <p:nvPr/>
+      </p:nvGrpSpPr>
+      <p:grpSpPr>
+        <a:xfrm>
+          <a:off x="0" y="0"/>
+          <a:ext cx="0" cy="0"/>
+          <a:chOff x="0" y="0"/>
+          <a:chExt cx="0" cy="0"/>
+        </a:xfrm>
+      </p:grpSpPr>
+      <p:sp>
+        <p:nvSpPr>
+          <p:cNvPr id="2" name="Title 1">
+            <a:extLst>
+              <a:ext uri="{FF2B5EF4-FFF2-40B4-BE49-F238E27FC236}">
+                <a16:creationId xmlns:a16="http://schemas.microsoft.com/office/drawing/2014/main" id="{44081350-3FFE-B740-855A-B01F10E17AEB}"/>
+              </a:ext>
+            </a:extLst>
+          </p:cNvPr>
+          <p:cNvSpPr>
+            <a:spLocks noGrp="1"/>
+          </p:cNvSpPr>
+          <p:nvPr>
+            <p:ph type="title"/>
+          </p:nvPr>
+        </p:nvSpPr>
+        <p:spPr/>
+        <p:txBody>
+          <a:bodyPr/>
+          <a:lstStyle/>
+          <a:p>
+            <a:r>
+              <a:rPr lang="en-US" dirty="0"/>
+              <a:t>String Concatenation</a:t>
+            </a:r>
+          </a:p>
+        </p:txBody>
+      </p:sp>
+      <p:sp>
+        <p:nvSpPr>
+          <p:cNvPr id="3" name="Content Placeholder 2">
+            <a:extLst>
+              <a:ext uri="{FF2B5EF4-FFF2-40B4-BE49-F238E27FC236}">
+                <a16:creationId xmlns:a16="http://schemas.microsoft.com/office/drawing/2014/main" id="{0E44CBFF-5F88-C340-B2C6-3755F9D691B0}"/>
+              </a:ext>
+            </a:extLst>
+          </p:cNvPr>
+          <p:cNvSpPr>
+            <a:spLocks noGrp="1"/>
+          </p:cNvSpPr>
+          <p:nvPr>
+            <p:ph idx="1"/>
+          </p:nvPr>
+        </p:nvSpPr>
+        <p:spPr>
+          <a:xfrm>
+            <a:off x="255721" y="1825625"/>
+            <a:ext cx="11677973" cy="4861894"/>
+          </a:xfrm>
+        </p:spPr>
+        <p:txBody>
+          <a:bodyPr>
+            <a:normAutofit fontScale="92500" lnSpcReduction="10000"/>
+          </a:bodyPr>
+          <a:lstStyle/>
+          <a:p>
+            <a:r>
+              <a:rPr lang="en-US" dirty="0"/>
+              <a:t>Consider: </a:t>
+            </a:r>
+            <a:r>
+              <a:rPr lang="en-US" i="1" dirty="0" err="1"/>
+              <a:t>log.debug</a:t>
+            </a:r>
+            <a:r>
+              <a:rPr lang="en-US" i="1" dirty="0"/>
+              <a:t>(“” + x + “=” + y)</a:t>
+            </a:r>
+          </a:p>
+          <a:p>
+            <a:r>
+              <a:rPr lang="en-US" dirty="0"/>
+              <a:t>That would be bad: often debug-level logs are ignored (especially in production), and so computing </a:t>
+            </a:r>
+            <a:r>
+              <a:rPr lang="en-US" b="1" i="1" dirty="0"/>
+              <a:t>“” + x + “=” + y </a:t>
+            </a:r>
+            <a:r>
+              <a:rPr lang="en-US" i="1" dirty="0"/>
+              <a:t> </a:t>
+            </a:r>
+            <a:r>
+              <a:rPr lang="en-US" dirty="0"/>
+              <a:t>would be a total waste of CPU cycles</a:t>
+            </a:r>
+          </a:p>
+          <a:p>
+            <a:r>
+              <a:rPr lang="en-US" dirty="0"/>
+              <a:t>String concatenation is </a:t>
+            </a:r>
+            <a:r>
+              <a:rPr lang="en-US" b="1" dirty="0"/>
+              <a:t>expensive</a:t>
+            </a:r>
+            <a:r>
+              <a:rPr lang="en-US" dirty="0"/>
+              <a:t>: recall that Strings are immutable, and at each + we create a completely new String object</a:t>
+            </a:r>
+          </a:p>
+          <a:p>
+            <a:r>
+              <a:rPr lang="en-US" dirty="0"/>
+              <a:t>Solution: </a:t>
+            </a:r>
+            <a:r>
+              <a:rPr lang="en-US" i="1" dirty="0" err="1"/>
+              <a:t>log.debug</a:t>
+            </a:r>
+            <a:r>
+              <a:rPr lang="en-US" i="1" dirty="0"/>
+              <a:t>(“{}={}”, x, y)</a:t>
+            </a:r>
+          </a:p>
+          <a:p>
+            <a:pPr lvl="1"/>
+            <a:r>
+              <a:rPr lang="en-US" dirty="0"/>
+              <a:t>log statements allow string interpolation, with {} as placeholder</a:t>
+            </a:r>
+          </a:p>
+          <a:p>
+            <a:pPr lvl="1"/>
+            <a:r>
+              <a:rPr lang="en-US" dirty="0"/>
+              <a:t>if a log is ignored (</a:t>
+            </a:r>
+            <a:r>
+              <a:rPr lang="en-US" dirty="0" err="1"/>
+              <a:t>eg</a:t>
+            </a:r>
+            <a:r>
+              <a:rPr lang="en-US" dirty="0"/>
+              <a:t> level WARN), then the string is discarded without the need to interpolate it</a:t>
+            </a:r>
+          </a:p>
+          <a:p>
+            <a:endParaRPr lang="en-US" dirty="0"/>
+          </a:p>
+        </p:txBody>
+      </p:sp>
+    </p:spTree>
+    <p:extLst>
+      <p:ext uri="{BB962C8B-B14F-4D97-AF65-F5344CB8AC3E}">
+        <p14:creationId xmlns:p14="http://schemas.microsoft.com/office/powerpoint/2010/main" val="1345937559"/>
+      </p:ext>
+    </p:extLst>
+  </p:cSld>
+  <p:clrMapOvr>
+    <a:masterClrMapping/>
+  </p:clrMapOvr>
+</p:sld>
+</file>
+
+<file path=ppt/slides/slide2.xml><?xml version="1.0" encoding="utf-8"?>
+<p:sld xmlns:a="http://schemas.openxmlformats.org/drawingml/2006/main" xmlns:r="http://schemas.openxmlformats.org/officeDocument/2006/relationships" xmlns:p="http://schemas.openxmlformats.org/presentationml/2006/main">
+  <p:cSld>
+    <p:spTree>
+      <p:nvGrpSpPr>
+        <p:cNvPr id="1" name=""/>
+        <p:cNvGrpSpPr/>
+        <p:nvPr/>
+      </p:nvGrpSpPr>
+      <p:grpSpPr>
+        <a:xfrm>
+          <a:off x="0" y="0"/>
+          <a:ext cx="0" cy="0"/>
+          <a:chOff x="0" y="0"/>
+          <a:chExt cx="0" cy="0"/>
+        </a:xfrm>
+      </p:grpSpPr>
+      <p:sp>
+        <p:nvSpPr>
+          <p:cNvPr id="2" name="Title 1"/>
+          <p:cNvSpPr>
+            <a:spLocks noGrp="1"/>
+          </p:cNvSpPr>
+          <p:nvPr>
+            <p:ph type="title"/>
+          </p:nvPr>
+        </p:nvSpPr>
+        <p:spPr/>
+        <p:txBody>
+          <a:bodyPr/>
+          <a:lstStyle/>
+          <a:p>
+            <a:r>
+              <a:rPr lang="en-US" dirty="0"/>
+              <a:t>About these slides</a:t>
+            </a:r>
+          </a:p>
+        </p:txBody>
+      </p:sp>
+      <p:sp>
+        <p:nvSpPr>
+          <p:cNvPr id="3" name="Content Placeholder 2"/>
+          <p:cNvSpPr>
+            <a:spLocks noGrp="1"/>
+          </p:cNvSpPr>
+          <p:nvPr>
+            <p:ph idx="1"/>
+          </p:nvPr>
+        </p:nvSpPr>
+        <p:spPr/>
+        <p:txBody>
+          <a:bodyPr/>
+          <a:lstStyle/>
+          <a:p>
+            <a:r>
+              <a:rPr lang="en-US" dirty="0"/>
+              <a:t>These slides are just high level overviews of the topics covered in class</a:t>
+            </a:r>
+          </a:p>
+          <a:p>
+            <a:r>
+              <a:rPr lang="en-US" dirty="0"/>
+              <a:t>The details are directly in the code comments on the </a:t>
+            </a:r>
+            <a:r>
+              <a:rPr lang="en-US" dirty="0" err="1"/>
+              <a:t>Git</a:t>
+            </a:r>
+            <a:r>
+              <a:rPr lang="en-US" dirty="0"/>
+              <a:t> repository</a:t>
+            </a:r>
+          </a:p>
+        </p:txBody>
+      </p:sp>
+    </p:spTree>
+    <p:extLst>
+      <p:ext uri="{BB962C8B-B14F-4D97-AF65-F5344CB8AC3E}">
+        <p14:creationId xmlns:p14="http://schemas.microsoft.com/office/powerpoint/2010/main" val="3824110728"/>
+      </p:ext>
+    </p:extLst>
+  </p:cSld>
+  <p:clrMapOvr>
+    <a:masterClrMapping/>
+  </p:clrMapOvr>
+</p:sld>
+</file>
+
+<file path=ppt/slides/slide20.xml><?xml version="1.0" encoding="utf-8"?>
+<p:sld xmlns:a="http://schemas.openxmlformats.org/drawingml/2006/main" xmlns:r="http://schemas.openxmlformats.org/officeDocument/2006/relationships" xmlns:p="http://schemas.openxmlformats.org/presentationml/2006/main">
+  <p:cSld>
+    <p:spTree>
+      <p:nvGrpSpPr>
+        <p:cNvPr id="1" name=""/>
+        <p:cNvGrpSpPr/>
+        <p:nvPr/>
+      </p:nvGrpSpPr>
+      <p:grpSpPr>
+        <a:xfrm>
+          <a:off x="0" y="0"/>
+          <a:ext cx="0" cy="0"/>
+          <a:chOff x="0" y="0"/>
+          <a:chExt cx="0" cy="0"/>
+        </a:xfrm>
+      </p:grpSpPr>
+      <p:sp>
+        <p:nvSpPr>
+          <p:cNvPr id="4" name="Title 3"/>
+          <p:cNvSpPr>
+            <a:spLocks noGrp="1"/>
+          </p:cNvSpPr>
+          <p:nvPr>
+            <p:ph type="title"/>
+          </p:nvPr>
+        </p:nvSpPr>
+        <p:spPr/>
+        <p:txBody>
+          <a:bodyPr/>
+          <a:lstStyle/>
+          <a:p>
+            <a:r>
+              <a:rPr lang="en-US" dirty="0"/>
+              <a:t>Cloud Deployment</a:t>
+            </a:r>
+          </a:p>
+        </p:txBody>
+      </p:sp>
+      <p:sp>
+        <p:nvSpPr>
+          <p:cNvPr id="5" name="Text Placeholder 4"/>
+          <p:cNvSpPr>
+            <a:spLocks noGrp="1"/>
+          </p:cNvSpPr>
+          <p:nvPr>
+            <p:ph type="body" idx="1"/>
+          </p:nvPr>
+        </p:nvSpPr>
+        <p:spPr/>
+        <p:txBody>
+          <a:bodyPr/>
+          <a:lstStyle/>
+          <a:p>
+            <a:endParaRPr lang="en-US"/>
+          </a:p>
+        </p:txBody>
+      </p:sp>
+    </p:spTree>
+    <p:extLst>
+      <p:ext uri="{BB962C8B-B14F-4D97-AF65-F5344CB8AC3E}">
+        <p14:creationId xmlns:p14="http://schemas.microsoft.com/office/powerpoint/2010/main" val="2329627873"/>
+      </p:ext>
+    </p:extLst>
+  </p:cSld>
+  <p:clrMapOvr>
+    <a:masterClrMapping/>
+  </p:clrMapOvr>
+</p:sld>
+</file>
+
+<file path=ppt/slides/slide21.xml><?xml version="1.0" encoding="utf-8"?>
+<p:sld xmlns:a="http://schemas.openxmlformats.org/drawingml/2006/main" xmlns:r="http://schemas.openxmlformats.org/officeDocument/2006/relationships" xmlns:p="http://schemas.openxmlformats.org/presentationml/2006/main">
+  <p:cSld>
+    <p:spTree>
+      <p:nvGrpSpPr>
+        <p:cNvPr id="1" name=""/>
+        <p:cNvGrpSpPr/>
+        <p:nvPr/>
+      </p:nvGrpSpPr>
+      <p:grpSpPr>
+        <a:xfrm>
+          <a:off x="0" y="0"/>
+          <a:ext cx="0" cy="0"/>
+          <a:chOff x="0" y="0"/>
+          <a:chExt cx="0" cy="0"/>
+        </a:xfrm>
+      </p:grpSpPr>
+      <p:sp>
+        <p:nvSpPr>
+          <p:cNvPr id="2" name="Title 1"/>
+          <p:cNvSpPr>
+            <a:spLocks noGrp="1"/>
+          </p:cNvSpPr>
+          <p:nvPr>
+            <p:ph type="title"/>
+          </p:nvPr>
+        </p:nvSpPr>
+        <p:spPr/>
+        <p:txBody>
+          <a:bodyPr/>
+          <a:lstStyle/>
+          <a:p>
+            <a:r>
+              <a:rPr lang="en-US" dirty="0"/>
+              <a:t>Deployment</a:t>
+            </a:r>
+          </a:p>
+        </p:txBody>
+      </p:sp>
+      <p:sp>
+        <p:nvSpPr>
+          <p:cNvPr id="3" name="Content Placeholder 2"/>
+          <p:cNvSpPr>
+            <a:spLocks noGrp="1"/>
+          </p:cNvSpPr>
+          <p:nvPr>
+            <p:ph idx="1"/>
+          </p:nvPr>
+        </p:nvSpPr>
+        <p:spPr>
+          <a:xfrm>
+            <a:off x="282804" y="1825625"/>
+            <a:ext cx="11070996" cy="4914540"/>
+          </a:xfrm>
+        </p:spPr>
+        <p:txBody>
+          <a:bodyPr/>
+          <a:lstStyle/>
+          <a:p>
+            <a:r>
+              <a:rPr lang="en-US" dirty="0"/>
+              <a:t>When your application is ready, you need to </a:t>
+            </a:r>
+            <a:r>
+              <a:rPr lang="en-US" i="1" dirty="0"/>
+              <a:t>deploy</a:t>
+            </a:r>
+            <a:r>
+              <a:rPr lang="en-US" dirty="0"/>
+              <a:t> it</a:t>
+            </a:r>
+          </a:p>
+          <a:p>
+            <a:r>
+              <a:rPr lang="en-US" dirty="0"/>
+              <a:t>But where?</a:t>
+            </a:r>
+          </a:p>
+          <a:p>
+            <a:r>
+              <a:rPr lang="en-US" dirty="0"/>
+              <a:t>You can host your own servers, but then you need to handle everything by yourself</a:t>
+            </a:r>
+          </a:p>
+          <a:p>
+            <a:pPr lvl="1"/>
+            <a:r>
+              <a:rPr lang="en-US" dirty="0"/>
+              <a:t>hardware (purchasing and maintenance), backups, DNS, etc.</a:t>
+            </a:r>
+          </a:p>
+          <a:p>
+            <a:r>
+              <a:rPr lang="en-US" dirty="0"/>
+              <a:t>Many companies do it, but can be difficult for startups and private individuals</a:t>
+            </a:r>
+          </a:p>
+        </p:txBody>
+      </p:sp>
+    </p:spTree>
+    <p:extLst>
+      <p:ext uri="{BB962C8B-B14F-4D97-AF65-F5344CB8AC3E}">
+        <p14:creationId xmlns:p14="http://schemas.microsoft.com/office/powerpoint/2010/main" val="892869614"/>
+      </p:ext>
+    </p:extLst>
+  </p:cSld>
+  <p:clrMapOvr>
+    <a:masterClrMapping/>
+  </p:clrMapOvr>
+</p:sld>
+</file>
+
+<file path=ppt/slides/slide22.xml><?xml version="1.0" encoding="utf-8"?>
+<p:sld xmlns:a="http://schemas.openxmlformats.org/drawingml/2006/main" xmlns:r="http://schemas.openxmlformats.org/officeDocument/2006/relationships" xmlns:p="http://schemas.openxmlformats.org/presentationml/2006/main">
+  <p:cSld>
+    <p:spTree>
+      <p:nvGrpSpPr>
+        <p:cNvPr id="1" name=""/>
+        <p:cNvGrpSpPr/>
+        <p:nvPr/>
+      </p:nvGrpSpPr>
+      <p:grpSpPr>
+        <a:xfrm>
+          <a:off x="0" y="0"/>
+          <a:ext cx="0" cy="0"/>
+          <a:chOff x="0" y="0"/>
+          <a:chExt cx="0" cy="0"/>
+        </a:xfrm>
+      </p:grpSpPr>
+      <p:sp>
+        <p:nvSpPr>
+          <p:cNvPr id="2" name="Title 1"/>
+          <p:cNvSpPr>
+            <a:spLocks noGrp="1"/>
+          </p:cNvSpPr>
+          <p:nvPr>
+            <p:ph type="title"/>
+          </p:nvPr>
+        </p:nvSpPr>
+        <p:spPr/>
+        <p:txBody>
+          <a:bodyPr/>
+          <a:lstStyle/>
+          <a:p>
+            <a:r>
+              <a:rPr lang="en-US" dirty="0"/>
+              <a:t>Cloud Deployment</a:t>
+            </a:r>
+          </a:p>
+        </p:txBody>
+      </p:sp>
+      <p:sp>
+        <p:nvSpPr>
+          <p:cNvPr id="3" name="Content Placeholder 2"/>
+          <p:cNvSpPr>
+            <a:spLocks noGrp="1"/>
+          </p:cNvSpPr>
+          <p:nvPr>
+            <p:ph idx="1"/>
+          </p:nvPr>
+        </p:nvSpPr>
+        <p:spPr>
+          <a:xfrm>
+            <a:off x="245097" y="1825624"/>
+            <a:ext cx="11726944" cy="4905113"/>
+          </a:xfrm>
+        </p:spPr>
+        <p:txBody>
+          <a:bodyPr>
+            <a:normAutofit lnSpcReduction="10000"/>
+          </a:bodyPr>
+          <a:lstStyle/>
+          <a:p>
+            <a:r>
+              <a:rPr lang="en-US" dirty="0"/>
+              <a:t>Different companies provide cloud hosting solutions for your applications, which frees you from hardware issues, but for a price</a:t>
+            </a:r>
+          </a:p>
+          <a:p>
+            <a:r>
+              <a:rPr lang="en-US" i="1" dirty="0"/>
+              <a:t>Amazon Web Services‎ </a:t>
+            </a:r>
+            <a:r>
+              <a:rPr lang="en-US" dirty="0"/>
+              <a:t>(AWS)</a:t>
+            </a:r>
+            <a:r>
+              <a:rPr lang="en-US" i="1" dirty="0"/>
+              <a:t> </a:t>
+            </a:r>
+            <a:r>
+              <a:rPr lang="en-US" dirty="0"/>
+              <a:t>is perhaps the most famous/used one</a:t>
+            </a:r>
+          </a:p>
+          <a:p>
+            <a:pPr lvl="1"/>
+            <a:r>
+              <a:rPr lang="en-US" dirty="0" err="1"/>
+              <a:t>eg</a:t>
+            </a:r>
+            <a:r>
+              <a:rPr lang="en-US" dirty="0"/>
+              <a:t>, </a:t>
+            </a:r>
+            <a:r>
+              <a:rPr lang="en-US" i="1" dirty="0"/>
+              <a:t>Netflix</a:t>
+            </a:r>
+            <a:r>
+              <a:rPr lang="en-US" dirty="0"/>
+              <a:t> runs on AWS </a:t>
+            </a:r>
+          </a:p>
+          <a:p>
+            <a:r>
+              <a:rPr lang="en-US" i="1" dirty="0"/>
+              <a:t>Automated scaling</a:t>
+            </a:r>
+            <a:r>
+              <a:rPr lang="en-US" dirty="0"/>
+              <a:t>: if you need more load, automatically rent more nodes, and automatically scale down if less load</a:t>
+            </a:r>
+          </a:p>
+          <a:p>
+            <a:pPr lvl="1"/>
+            <a:r>
+              <a:rPr lang="en-US" dirty="0"/>
+              <a:t>this is also good for applications targeting a specific country (</a:t>
+            </a:r>
+            <a:r>
+              <a:rPr lang="en-US" dirty="0" err="1"/>
+              <a:t>eg</a:t>
+            </a:r>
+            <a:r>
+              <a:rPr lang="en-US" dirty="0"/>
+              <a:t> Norway), in which you will not get much load during the night  </a:t>
+            </a:r>
+          </a:p>
+        </p:txBody>
+      </p:sp>
+    </p:spTree>
+    <p:extLst>
+      <p:ext uri="{BB962C8B-B14F-4D97-AF65-F5344CB8AC3E}">
+        <p14:creationId xmlns:p14="http://schemas.microsoft.com/office/powerpoint/2010/main" val="345121760"/>
+      </p:ext>
+    </p:extLst>
+  </p:cSld>
+  <p:clrMapOvr>
+    <a:masterClrMapping/>
+  </p:clrMapOvr>
+</p:sld>
+</file>
+
+<file path=ppt/slides/slide23.xml><?xml version="1.0" encoding="utf-8"?>
+<p:sld xmlns:a="http://schemas.openxmlformats.org/drawingml/2006/main" xmlns:r="http://schemas.openxmlformats.org/officeDocument/2006/relationships" xmlns:p="http://schemas.openxmlformats.org/presentationml/2006/main">
+  <p:cSld>
+    <p:spTree>
+      <p:nvGrpSpPr>
+        <p:cNvPr id="1" name=""/>
+        <p:cNvGrpSpPr/>
+        <p:nvPr/>
+      </p:nvGrpSpPr>
+      <p:grpSpPr>
+        <a:xfrm>
+          <a:off x="0" y="0"/>
+          <a:ext cx="0" cy="0"/>
+          <a:chOff x="0" y="0"/>
+          <a:chExt cx="0" cy="0"/>
+        </a:xfrm>
+      </p:grpSpPr>
+      <p:sp>
+        <p:nvSpPr>
           <p:cNvPr id="2" name="Title 1"/>
           <p:cNvSpPr>
             <a:spLocks noGrp="1"/>
@@ -4254,10 +5334,9 @@
           <a:lstStyle/>
           <a:p>
             <a:r>
-              <a:rPr lang="en-US" dirty="0" smtClean="0"/>
+              <a:rPr lang="en-US" dirty="0"/>
               <a:t>Definition of “Cloud”</a:t>
             </a:r>
-            <a:endParaRPr lang="en-US" dirty="0"/>
           </a:p>
         </p:txBody>
       </p:sp>
@@ -4315,7 +5394,7 @@
 </p:sld>
 </file>
 
-<file path=ppt/slides/slide17.xml><?xml version="1.0" encoding="utf-8"?>
+<file path=ppt/slides/slide24.xml><?xml version="1.0" encoding="utf-8"?>
 <p:sld xmlns:a="http://schemas.openxmlformats.org/drawingml/2006/main" xmlns:r="http://schemas.openxmlformats.org/officeDocument/2006/relationships" xmlns:p="http://schemas.openxmlformats.org/presentationml/2006/main">
   <p:cSld>
     <p:spTree>
@@ -4348,7 +5427,7 @@
           <a:lstStyle/>
           <a:p>
             <a:r>
-              <a:rPr lang="en-US" dirty="0" err="1" smtClean="0"/>
+              <a:rPr lang="en-US" dirty="0" err="1"/>
               <a:t>Heroku</a:t>
             </a:r>
             <a:endParaRPr lang="en-US" dirty="0"/>
@@ -4378,29 +5457,29 @@
           <a:lstStyle/>
           <a:p>
             <a:r>
-              <a:rPr lang="en-US" dirty="0" smtClean="0"/>
+              <a:rPr lang="en-US" dirty="0"/>
               <a:t>One of the main cloud providers</a:t>
             </a:r>
           </a:p>
           <a:p>
             <a:r>
-              <a:rPr lang="en-US" dirty="0" smtClean="0"/>
+              <a:rPr lang="en-US" dirty="0"/>
               <a:t>Using this one in the examples because, at the time of this writing, it provides </a:t>
             </a:r>
             <a:r>
-              <a:rPr lang="en-US" i="1" dirty="0" smtClean="0"/>
+              <a:rPr lang="en-US" i="1" dirty="0"/>
               <a:t>easy</a:t>
             </a:r>
             <a:r>
-              <a:rPr lang="en-US" dirty="0" smtClean="0"/>
+              <a:rPr lang="en-US" dirty="0"/>
               <a:t> to use </a:t>
             </a:r>
             <a:r>
-              <a:rPr lang="en-US" i="1" dirty="0" smtClean="0"/>
+              <a:rPr lang="en-US" i="1" dirty="0"/>
               <a:t>free</a:t>
             </a:r>
             <a:r>
-              <a:rPr lang="en-US" dirty="0" smtClean="0"/>
+              <a:rPr lang="en-US" dirty="0"/>
               <a:t> hosting</a:t>
             </a:r>
           </a:p>
@@ -4408,51 +5487,46 @@
             <a:pPr lvl="1"/>
             <a:r>
               <a:rPr lang="en-US" dirty="0"/>
-              <a:t>n</a:t>
-            </a:r>
-            <a:r>
-              <a:rPr lang="en-US" dirty="0" smtClean="0"/>
-              <a:t>ote, this might change at any time </a:t>
-            </a:r>
-          </a:p>
-          <a:p>
-            <a:r>
-              <a:rPr lang="en-US" dirty="0" smtClean="0"/>
+              <a:t>note, this might change at any time </a:t>
+            </a:r>
+          </a:p>
+          <a:p>
+            <a:r>
+              <a:rPr lang="en-US" dirty="0"/>
               <a:t>Supporting Java and </a:t>
             </a:r>
             <a:r>
-              <a:rPr lang="en-US" dirty="0" err="1" smtClean="0"/>
+              <a:rPr lang="en-US" dirty="0" err="1"/>
               <a:t>SpringBoot</a:t>
             </a:r>
             <a:r>
-              <a:rPr lang="en-US" dirty="0" smtClean="0"/>
+              <a:rPr lang="en-US" dirty="0"/>
               <a:t> applications</a:t>
             </a:r>
           </a:p>
           <a:p>
             <a:r>
-              <a:rPr lang="en-US" dirty="0" smtClean="0"/>
+              <a:rPr lang="en-US" dirty="0"/>
               <a:t>Maven plugin to deploy your self-executable JAR  by command line</a:t>
             </a:r>
           </a:p>
           <a:p>
             <a:r>
-              <a:rPr lang="en-US" i="1" dirty="0" smtClean="0"/>
+              <a:rPr lang="en-US" i="1" dirty="0"/>
               <a:t>Automatically</a:t>
             </a:r>
             <a:r>
-              <a:rPr lang="en-US" dirty="0" smtClean="0"/>
+              <a:rPr lang="en-US" dirty="0"/>
               <a:t> setting up environment variables to configure Spring to use </a:t>
             </a:r>
             <a:r>
-              <a:rPr lang="en-US" dirty="0" err="1" smtClean="0"/>
+              <a:rPr lang="en-US" dirty="0" err="1"/>
               <a:t>Heroku’s</a:t>
             </a:r>
             <a:r>
-              <a:rPr lang="en-US" dirty="0" smtClean="0"/>
+              <a:rPr lang="en-US" dirty="0"/>
               <a:t> databases</a:t>
             </a:r>
-            <a:endParaRPr lang="en-US" dirty="0"/>
           </a:p>
         </p:txBody>
       </p:sp>
@@ -4469,7 +5543,7 @@
 </p:sld>
 </file>
 
-<file path=ppt/slides/slide18.xml><?xml version="1.0" encoding="utf-8"?>
+<file path=ppt/slides/slide25.xml><?xml version="1.0" encoding="utf-8"?>
 <p:sld xmlns:a="http://schemas.openxmlformats.org/drawingml/2006/main" xmlns:r="http://schemas.openxmlformats.org/officeDocument/2006/relationships" xmlns:p="http://schemas.openxmlformats.org/presentationml/2006/main">
   <p:cSld>
     <p:spTree>
@@ -4502,11 +5576,11 @@
           <a:lstStyle/>
           <a:p>
             <a:r>
-              <a:rPr lang="en-US" dirty="0" smtClean="0"/>
+              <a:rPr lang="en-US" dirty="0"/>
               <a:t>Using </a:t>
             </a:r>
             <a:r>
-              <a:rPr lang="en-US" dirty="0" err="1" smtClean="0"/>
+              <a:rPr lang="en-US" dirty="0" err="1"/>
               <a:t>Heroku</a:t>
             </a:r>
             <a:endParaRPr lang="en-US" dirty="0"/>
@@ -4534,28 +5608,20 @@
           <a:lstStyle/>
           <a:p>
             <a:r>
-              <a:rPr lang="en-US" dirty="0" smtClean="0"/>
-              <a:t>First you need to create </a:t>
-            </a:r>
-            <a:r>
-              <a:rPr lang="en-US" dirty="0"/>
-              <a:t>an </a:t>
-            </a:r>
-            <a:r>
-              <a:rPr lang="en-US" dirty="0" smtClean="0"/>
-              <a:t>account at </a:t>
-            </a:r>
-            <a:r>
-              <a:rPr lang="en-US" dirty="0" smtClean="0">
+              <a:rPr lang="en-US" dirty="0"/>
+              <a:t>First you need to create an account at </a:t>
+            </a:r>
+            <a:r>
+              <a:rPr lang="en-US" dirty="0">
                 <a:hlinkClick r:id="rId2"/>
               </a:rPr>
               <a:t>www.heroku.com</a:t>
             </a:r>
-            <a:endParaRPr lang="en-US" dirty="0" smtClean="0"/>
-          </a:p>
-          <a:p>
-            <a:r>
-              <a:rPr lang="en-US" dirty="0" smtClean="0"/>
+            <a:endParaRPr lang="en-US" dirty="0"/>
+          </a:p>
+          <a:p>
+            <a:r>
+              <a:rPr lang="en-US" dirty="0"/>
               <a:t>Install </a:t>
             </a:r>
             <a:r>
@@ -4564,47 +5630,39 @@
             </a:r>
             <a:r>
               <a:rPr lang="en-US" i="1" dirty="0"/>
-              <a:t> </a:t>
-            </a:r>
-            <a:r>
-              <a:rPr lang="en-US" i="1" dirty="0" smtClean="0"/>
-              <a:t>CLI</a:t>
-            </a:r>
-            <a:r>
-              <a:rPr lang="en-US" dirty="0" smtClean="0"/>
+              <a:t> CLI</a:t>
+            </a:r>
+            <a:r>
+              <a:rPr lang="en-US" dirty="0"/>
               <a:t>, which allows you to interact with </a:t>
             </a:r>
             <a:r>
-              <a:rPr lang="en-US" dirty="0" err="1" smtClean="0"/>
+              <a:rPr lang="en-US" dirty="0" err="1"/>
               <a:t>Heroku</a:t>
             </a:r>
             <a:r>
-              <a:rPr lang="en-US" dirty="0" smtClean="0"/>
+              <a:rPr lang="en-US" dirty="0"/>
               <a:t> from command line</a:t>
             </a:r>
           </a:p>
           <a:p>
             <a:r>
-              <a:rPr lang="en-US" dirty="0" smtClean="0"/>
-              <a:t>On the web interface, create an “app” with a name of your choice. In these slides, I will </a:t>
-            </a:r>
-            <a:r>
-              <a:rPr lang="en-US" dirty="0"/>
-              <a:t>use “</a:t>
+              <a:rPr lang="en-US" dirty="0"/>
+              <a:t>On the web interface, create an “app” with a name of your choice. In these slides, I will use “</a:t>
             </a:r>
             <a:r>
               <a:rPr lang="en-US" i="1" dirty="0"/>
               <a:t>quizgame-pg5100</a:t>
             </a:r>
             <a:r>
-              <a:rPr lang="en-US" dirty="0" smtClean="0"/>
+              <a:rPr lang="en-US" dirty="0"/>
               <a:t>”</a:t>
             </a:r>
           </a:p>
           <a:p>
             <a:pPr lvl="1"/>
             <a:r>
-              <a:rPr lang="en-US" dirty="0" smtClean="0"/>
+              <a:rPr lang="en-US" dirty="0"/>
               <a:t>as names are unique, you will need to choose a different name</a:t>
             </a:r>
           </a:p>
@@ -4629,7 +5687,7 @@
 </p:sld>
 </file>
 
-<file path=ppt/slides/slide19.xml><?xml version="1.0" encoding="utf-8"?>
+<file path=ppt/slides/slide26.xml><?xml version="1.0" encoding="utf-8"?>
 <p:sld xmlns:a="http://schemas.openxmlformats.org/drawingml/2006/main" xmlns:r="http://schemas.openxmlformats.org/officeDocument/2006/relationships" xmlns:p="http://schemas.openxmlformats.org/presentationml/2006/main">
   <p:cSld>
     <p:spTree>
@@ -4662,10 +5720,9 @@
           <a:lstStyle/>
           <a:p>
             <a:r>
-              <a:rPr lang="en-US" dirty="0" smtClean="0"/>
+              <a:rPr lang="en-US" dirty="0"/>
               <a:t>Jar Deployment</a:t>
             </a:r>
-            <a:endParaRPr lang="en-US" dirty="0"/>
           </a:p>
         </p:txBody>
       </p:sp>
@@ -4696,96 +5753,79 @@
               <a:t>Configure the </a:t>
             </a:r>
             <a:r>
-              <a:rPr lang="en-US" sz="3200" i="1" dirty="0" err="1" smtClean="0"/>
+              <a:rPr lang="en-US" sz="3200" i="1" dirty="0" err="1"/>
               <a:t>heroku</a:t>
             </a:r>
             <a:r>
-              <a:rPr lang="en-US" sz="3200" i="1" dirty="0" smtClean="0"/>
+              <a:rPr lang="en-US" sz="3200" i="1" dirty="0"/>
               <a:t>-maven-plugin</a:t>
             </a:r>
           </a:p>
           <a:p>
             <a:r>
-              <a:rPr lang="en-US" sz="3200" dirty="0" smtClean="0"/>
+              <a:rPr lang="en-US" sz="3200" dirty="0"/>
               <a:t>Need to run Maven </a:t>
             </a:r>
           </a:p>
           <a:p>
             <a:r>
-              <a:rPr lang="en-US" sz="3200" b="1" dirty="0" err="1" smtClean="0"/>
+              <a:rPr lang="en-US" sz="3200" b="1" dirty="0" err="1"/>
               <a:t>mvn</a:t>
             </a:r>
             <a:r>
-              <a:rPr lang="en-US" sz="3200" b="1" dirty="0" smtClean="0"/>
-              <a:t> </a:t>
-            </a:r>
-            <a:r>
               <a:rPr lang="en-US" sz="3200" b="1" dirty="0"/>
-              <a:t>clean </a:t>
-            </a:r>
-            <a:r>
-              <a:rPr lang="en-US" sz="3200" b="1" dirty="0" smtClean="0"/>
-              <a:t>package </a:t>
-            </a:r>
-            <a:r>
-              <a:rPr lang="en-US" sz="3200" b="1" dirty="0" err="1" smtClean="0"/>
+              <a:t> clean package </a:t>
+            </a:r>
+            <a:r>
+              <a:rPr lang="en-US" sz="3200" b="1" dirty="0" err="1"/>
               <a:t>heroku:deploy</a:t>
             </a:r>
             <a:r>
-              <a:rPr lang="en-US" sz="3200" b="1" dirty="0" smtClean="0"/>
+              <a:rPr lang="en-US" sz="3200" b="1" dirty="0"/>
               <a:t> -</a:t>
             </a:r>
             <a:r>
-              <a:rPr lang="en-US" sz="3200" b="1" dirty="0" err="1" smtClean="0"/>
+              <a:rPr lang="en-US" sz="3200" b="1" dirty="0" err="1"/>
               <a:t>Dheroku.logProgress</a:t>
             </a:r>
             <a:r>
-              <a:rPr lang="en-US" sz="3200" b="1" dirty="0" smtClean="0"/>
+              <a:rPr lang="en-US" sz="3200" b="1" dirty="0"/>
               <a:t>=true</a:t>
             </a:r>
           </a:p>
           <a:p>
             <a:r>
-              <a:rPr lang="en-US" sz="3200" dirty="0" smtClean="0"/>
-              <a:t>The application will then be </a:t>
-            </a:r>
-            <a:r>
               <a:rPr lang="en-US" sz="3200" dirty="0"/>
-              <a:t>available online </a:t>
-            </a:r>
-            <a:r>
-              <a:rPr lang="en-US" sz="3200" dirty="0" smtClean="0"/>
-              <a:t>at </a:t>
-            </a:r>
-            <a:r>
-              <a:rPr lang="en-US" sz="3200" dirty="0" smtClean="0">
+              <a:t>The application will then be available online at </a:t>
+            </a:r>
+            <a:r>
+              <a:rPr lang="en-US" sz="3200" dirty="0">
                 <a:hlinkClick r:id="rId2"/>
               </a:rPr>
               <a:t>https://quizgame-pg5100.herokuapp.com</a:t>
             </a:r>
-            <a:endParaRPr lang="en-US" sz="3200" dirty="0" smtClean="0"/>
+            <a:endParaRPr lang="en-US" sz="3200" dirty="0"/>
           </a:p>
           <a:p>
             <a:pPr lvl="1"/>
             <a:r>
-              <a:rPr lang="en-US" sz="2400" dirty="0" smtClean="0"/>
+              <a:rPr lang="en-US" sz="2400" dirty="0"/>
               <a:t>Note the HTTPS protocol, </a:t>
             </a:r>
             <a:r>
-              <a:rPr lang="en-US" sz="2400" dirty="0" err="1" smtClean="0"/>
+              <a:rPr lang="en-US" sz="2400" dirty="0" err="1"/>
               <a:t>ie</a:t>
             </a:r>
             <a:r>
-              <a:rPr lang="en-US" sz="2400" dirty="0" smtClean="0"/>
+              <a:rPr lang="en-US" sz="2400" dirty="0"/>
               <a:t> encrypted</a:t>
             </a:r>
           </a:p>
           <a:p>
             <a:r>
-              <a:rPr lang="en-US" sz="3200" dirty="0" smtClean="0"/>
+              <a:rPr lang="en-US" sz="3200" dirty="0"/>
               <a:t>But before accessing it, you need to configure its environment</a:t>
             </a:r>
-            <a:endParaRPr lang="en-US" sz="3200" dirty="0"/>
           </a:p>
         </p:txBody>
       </p:sp>
@@ -4802,7 +5842,7 @@
 </p:sld>
 </file>
 
-<file path=ppt/slides/slide2.xml><?xml version="1.0" encoding="utf-8"?>
+<file path=ppt/slides/slide27.xml><?xml version="1.0" encoding="utf-8"?>
 <p:sld xmlns:a="http://schemas.openxmlformats.org/drawingml/2006/main" xmlns:r="http://schemas.openxmlformats.org/officeDocument/2006/relationships" xmlns:p="http://schemas.openxmlformats.org/presentationml/2006/main">
   <p:cSld>
     <p:spTree>
@@ -4835,104 +5875,9 @@
           <a:lstStyle/>
           <a:p>
             <a:r>
-              <a:rPr lang="en-US" dirty="0" smtClean="0"/>
-              <a:t>About these slides</a:t>
-            </a:r>
-            <a:endParaRPr lang="en-US" dirty="0"/>
-          </a:p>
-        </p:txBody>
-      </p:sp>
-      <p:sp>
-        <p:nvSpPr>
-          <p:cNvPr id="3" name="Content Placeholder 2"/>
-          <p:cNvSpPr>
-            <a:spLocks noGrp="1"/>
-          </p:cNvSpPr>
-          <p:nvPr>
-            <p:ph idx="1"/>
-          </p:nvPr>
-        </p:nvSpPr>
-        <p:spPr/>
-        <p:txBody>
-          <a:bodyPr/>
-          <a:lstStyle/>
-          <a:p>
-            <a:r>
-              <a:rPr lang="en-US" dirty="0" smtClean="0"/>
-              <a:t>These slides are just high level overviews of the topics covered in class</a:t>
-            </a:r>
-          </a:p>
-          <a:p>
-            <a:r>
-              <a:rPr lang="en-US" dirty="0"/>
-              <a:t>T</a:t>
-            </a:r>
-            <a:r>
-              <a:rPr lang="en-US" dirty="0" smtClean="0"/>
-              <a:t>he details are directly in the code comments on the </a:t>
-            </a:r>
-            <a:r>
-              <a:rPr lang="en-US" dirty="0" err="1" smtClean="0"/>
-              <a:t>Git</a:t>
-            </a:r>
-            <a:r>
-              <a:rPr lang="en-US" dirty="0" smtClean="0"/>
-              <a:t> repository</a:t>
-            </a:r>
-            <a:endParaRPr lang="en-US" dirty="0"/>
-          </a:p>
-        </p:txBody>
-      </p:sp>
-    </p:spTree>
-    <p:extLst>
-      <p:ext uri="{BB962C8B-B14F-4D97-AF65-F5344CB8AC3E}">
-        <p14:creationId xmlns:p14="http://schemas.microsoft.com/office/powerpoint/2010/main" val="3824110728"/>
-      </p:ext>
-    </p:extLst>
-  </p:cSld>
-  <p:clrMapOvr>
-    <a:masterClrMapping/>
-  </p:clrMapOvr>
-</p:sld>
-</file>
-
-<file path=ppt/slides/slide20.xml><?xml version="1.0" encoding="utf-8"?>
-<p:sld xmlns:a="http://schemas.openxmlformats.org/drawingml/2006/main" xmlns:r="http://schemas.openxmlformats.org/officeDocument/2006/relationships" xmlns:p="http://schemas.openxmlformats.org/presentationml/2006/main">
-  <p:cSld>
-    <p:spTree>
-      <p:nvGrpSpPr>
-        <p:cNvPr id="1" name=""/>
-        <p:cNvGrpSpPr/>
-        <p:nvPr/>
-      </p:nvGrpSpPr>
-      <p:grpSpPr>
-        <a:xfrm>
-          <a:off x="0" y="0"/>
-          <a:ext cx="0" cy="0"/>
-          <a:chOff x="0" y="0"/>
-          <a:chExt cx="0" cy="0"/>
-        </a:xfrm>
-      </p:grpSpPr>
-      <p:sp>
-        <p:nvSpPr>
-          <p:cNvPr id="2" name="Title 1"/>
-          <p:cNvSpPr>
-            <a:spLocks noGrp="1"/>
-          </p:cNvSpPr>
-          <p:nvPr>
-            <p:ph type="title"/>
-          </p:nvPr>
-        </p:nvSpPr>
-        <p:spPr/>
-        <p:txBody>
-          <a:bodyPr/>
-          <a:lstStyle/>
-          <a:p>
-            <a:r>
-              <a:rPr lang="en-US" dirty="0" smtClean="0"/>
+              <a:rPr lang="en-US" dirty="0"/>
               <a:t>From Command Line (CLI)</a:t>
             </a:r>
-            <a:endParaRPr lang="en-US" dirty="0"/>
           </a:p>
         </p:txBody>
       </p:sp>
@@ -4964,32 +5909,28 @@
             </a:r>
             <a:r>
               <a:rPr lang="en-US" b="1" dirty="0"/>
-              <a:t> </a:t>
-            </a:r>
-            <a:r>
-              <a:rPr lang="en-US" b="1" dirty="0" smtClean="0"/>
-              <a:t>login</a:t>
+              <a:t> login</a:t>
             </a:r>
           </a:p>
           <a:p>
             <a:pPr lvl="1"/>
             <a:r>
-              <a:rPr lang="en-US" dirty="0" smtClean="0"/>
+              <a:rPr lang="en-US" dirty="0"/>
               <a:t>will setup credential for the other commands.</a:t>
             </a:r>
           </a:p>
           <a:p>
             <a:pPr lvl="1"/>
             <a:r>
-              <a:rPr lang="en-US" dirty="0" smtClean="0"/>
+              <a:rPr lang="en-US" dirty="0"/>
               <a:t>note: if using Windows, this does not work on </a:t>
             </a:r>
             <a:r>
-              <a:rPr lang="en-US" dirty="0" err="1" smtClean="0"/>
+              <a:rPr lang="en-US" dirty="0" err="1"/>
               <a:t>GitBash</a:t>
             </a:r>
             <a:r>
-              <a:rPr lang="en-US" dirty="0" smtClean="0"/>
+              <a:rPr lang="en-US" dirty="0"/>
               <a:t>, and need to do this command once from a regular Terminal</a:t>
             </a:r>
           </a:p>
@@ -5008,62 +5949,38 @@
             </a:r>
             <a:r>
               <a:rPr lang="en-US" b="1" dirty="0"/>
-              <a:t> web=1 --app </a:t>
-            </a:r>
-            <a:r>
-              <a:rPr lang="en-US" b="1" dirty="0" smtClean="0"/>
-              <a:t>quizgame-pg5100</a:t>
+              <a:t> web=1 --app quizgame-pg5100</a:t>
             </a:r>
           </a:p>
           <a:p>
             <a:pPr lvl="1"/>
             <a:r>
               <a:rPr lang="en-US" dirty="0"/>
-              <a:t>e</a:t>
-            </a:r>
-            <a:r>
-              <a:rPr lang="en-US" dirty="0" smtClean="0"/>
-              <a:t>nable the node resources needed to run the application</a:t>
+              <a:t>enable the node resources needed to run the application</a:t>
             </a:r>
           </a:p>
           <a:p>
             <a:pPr lvl="1"/>
             <a:r>
-              <a:rPr lang="en-US" dirty="0" smtClean="0"/>
-              <a:t>Note: might get </a:t>
-            </a:r>
-            <a:r>
-              <a:rPr lang="en-US" dirty="0"/>
-              <a:t>an error like “</a:t>
+              <a:rPr lang="en-US" dirty="0"/>
+              <a:t>Note: might get an error like “</a:t>
             </a:r>
             <a:r>
               <a:rPr lang="en-US" i="1" dirty="0"/>
-              <a:t>Scaling dynos... </a:t>
-            </a:r>
-            <a:r>
-              <a:rPr lang="en-US" i="1" dirty="0" smtClean="0"/>
-              <a:t>! Couldn't </a:t>
-            </a:r>
-            <a:r>
-              <a:rPr lang="en-US" i="1" dirty="0"/>
-              <a:t>find that process </a:t>
-            </a:r>
-            <a:r>
-              <a:rPr lang="en-US" i="1" dirty="0" smtClean="0"/>
-              <a:t>type</a:t>
-            </a:r>
-            <a:r>
-              <a:rPr lang="en-US" dirty="0" smtClean="0"/>
+              <a:t>Scaling dynos... ! Couldn't find that process type</a:t>
+            </a:r>
+            <a:r>
+              <a:rPr lang="en-US" dirty="0"/>
               <a:t>” if you haven’t deployed the JAR yet at least once</a:t>
             </a:r>
           </a:p>
           <a:p>
             <a:r>
-              <a:rPr lang="en-US" b="1" dirty="0" err="1" smtClean="0"/>
+              <a:rPr lang="en-US" b="1" dirty="0" err="1"/>
               <a:t>heroku</a:t>
             </a:r>
             <a:r>
-              <a:rPr lang="en-US" b="1" dirty="0" smtClean="0"/>
+              <a:rPr lang="en-US" b="1" dirty="0"/>
               <a:t> </a:t>
             </a:r>
             <a:r>
@@ -5080,25 +5997,21 @@
             </a:r>
             <a:r>
               <a:rPr lang="en-US" b="1" dirty="0"/>
-              <a:t> --app </a:t>
-            </a:r>
-            <a:r>
-              <a:rPr lang="en-US" b="1" dirty="0" smtClean="0"/>
-              <a:t>quizgame-pg5100</a:t>
+              <a:t> --app quizgame-pg5100</a:t>
             </a:r>
           </a:p>
           <a:p>
             <a:pPr lvl="1"/>
             <a:r>
-              <a:rPr lang="en-US" dirty="0" smtClean="0"/>
+              <a:rPr lang="en-US" dirty="0"/>
               <a:t>add a </a:t>
             </a:r>
             <a:r>
-              <a:rPr lang="en-US" dirty="0" err="1" smtClean="0"/>
+              <a:rPr lang="en-US" dirty="0" err="1"/>
               <a:t>Postgres</a:t>
             </a:r>
             <a:r>
-              <a:rPr lang="en-US" dirty="0" smtClean="0"/>
+              <a:rPr lang="en-US" dirty="0"/>
               <a:t> database</a:t>
             </a:r>
           </a:p>
@@ -5117,35 +6030,27 @@
             </a:r>
             <a:r>
               <a:rPr lang="en-US" b="1" dirty="0"/>
-              <a:t> --app </a:t>
-            </a:r>
-            <a:r>
-              <a:rPr lang="en-US" b="1" dirty="0" smtClean="0"/>
-              <a:t>quizgame-pg5100</a:t>
+              <a:t> --app quizgame-pg5100</a:t>
             </a:r>
           </a:p>
           <a:p>
             <a:pPr lvl="1"/>
             <a:r>
               <a:rPr lang="en-US" dirty="0"/>
-              <a:t>s</a:t>
-            </a:r>
-            <a:r>
-              <a:rPr lang="en-US" dirty="0" smtClean="0"/>
-              <a:t>ee current status of </a:t>
-            </a:r>
-            <a:r>
-              <a:rPr lang="en-US" dirty="0" err="1" smtClean="0"/>
+              <a:t>see current status of </a:t>
+            </a:r>
+            <a:r>
+              <a:rPr lang="en-US" dirty="0" err="1"/>
               <a:t>Postgres</a:t>
             </a:r>
             <a:r>
-              <a:rPr lang="en-US" dirty="0" smtClean="0"/>
+              <a:rPr lang="en-US" dirty="0"/>
               <a:t> database</a:t>
             </a:r>
           </a:p>
           <a:p>
             <a:r>
-              <a:rPr lang="en-US" dirty="0" smtClean="0"/>
+              <a:rPr lang="en-US" dirty="0"/>
               <a:t>Note: some  (all?) these commands can also be done from web interface</a:t>
             </a:r>
           </a:p>
@@ -5168,7 +6073,7 @@
 </p:sld>
 </file>
 
-<file path=ppt/slides/slide21.xml><?xml version="1.0" encoding="utf-8"?>
+<file path=ppt/slides/slide28.xml><?xml version="1.0" encoding="utf-8"?>
 <p:sld xmlns:a="http://schemas.openxmlformats.org/drawingml/2006/main" xmlns:r="http://schemas.openxmlformats.org/officeDocument/2006/relationships" xmlns:p="http://schemas.openxmlformats.org/presentationml/2006/main">
   <p:cSld>
     <p:spTree>
@@ -5262,7 +6167,7 @@
 </p:sld>
 </file>
 
-<file path=ppt/slides/slide22.xml><?xml version="1.0" encoding="utf-8"?>
+<file path=ppt/slides/slide29.xml><?xml version="1.0" encoding="utf-8"?>
 <p:sld xmlns:a="http://schemas.openxmlformats.org/drawingml/2006/main" xmlns:r="http://schemas.openxmlformats.org/officeDocument/2006/relationships" xmlns:p="http://schemas.openxmlformats.org/presentationml/2006/main">
   <p:cSld>
     <p:spTree>
@@ -5295,10 +6200,9 @@
           <a:lstStyle/>
           <a:p>
             <a:r>
-              <a:rPr lang="en-US" dirty="0" smtClean="0"/>
+              <a:rPr lang="en-US" dirty="0"/>
               <a:t>Continuous Delivery (CD)</a:t>
             </a:r>
-            <a:endParaRPr lang="en-US" dirty="0"/>
           </a:p>
         </p:txBody>
       </p:sp>
@@ -5323,108 +6227,108 @@
           <a:lstStyle/>
           <a:p>
             <a:r>
-              <a:rPr lang="en-US" dirty="0" smtClean="0"/>
+              <a:rPr lang="en-US" dirty="0"/>
               <a:t>Deployment can be done from Maven, as part of the build</a:t>
             </a:r>
           </a:p>
           <a:p>
             <a:r>
-              <a:rPr lang="en-US" dirty="0" smtClean="0"/>
+              <a:rPr lang="en-US" dirty="0"/>
               <a:t>You could trigger a deployment at each </a:t>
             </a:r>
             <a:r>
-              <a:rPr lang="en-US" dirty="0" err="1" smtClean="0"/>
+              <a:rPr lang="en-US" dirty="0" err="1"/>
               <a:t>Git</a:t>
             </a:r>
             <a:r>
-              <a:rPr lang="en-US" dirty="0" smtClean="0"/>
+              <a:rPr lang="en-US" dirty="0"/>
               <a:t> Push from a CI server (</a:t>
             </a:r>
             <a:r>
-              <a:rPr lang="en-US" dirty="0" err="1" smtClean="0"/>
+              <a:rPr lang="en-US" dirty="0" err="1"/>
               <a:t>eg</a:t>
             </a:r>
             <a:r>
-              <a:rPr lang="en-US" dirty="0" smtClean="0"/>
+              <a:rPr lang="en-US" dirty="0"/>
               <a:t>, Travis or Jenkins)</a:t>
             </a:r>
           </a:p>
           <a:p>
             <a:r>
-              <a:rPr lang="en-US" dirty="0" smtClean="0"/>
+              <a:rPr lang="en-US" dirty="0"/>
               <a:t>Of course, only if code compiles and all tests pass…</a:t>
             </a:r>
           </a:p>
           <a:p>
             <a:r>
-              <a:rPr lang="en-US" dirty="0" smtClean="0"/>
+              <a:rPr lang="en-US" dirty="0"/>
               <a:t>But you might want to have a special </a:t>
             </a:r>
             <a:r>
-              <a:rPr lang="en-US" dirty="0" err="1" smtClean="0"/>
+              <a:rPr lang="en-US" dirty="0" err="1"/>
               <a:t>Git</a:t>
             </a:r>
             <a:r>
-              <a:rPr lang="en-US" dirty="0" smtClean="0"/>
+              <a:rPr lang="en-US" dirty="0"/>
               <a:t> branch for deployment</a:t>
             </a:r>
           </a:p>
           <a:p>
             <a:pPr lvl="1"/>
             <a:r>
-              <a:rPr lang="en-US" dirty="0" err="1" smtClean="0"/>
+              <a:rPr lang="en-US" dirty="0" err="1"/>
               <a:t>eg</a:t>
             </a:r>
             <a:r>
-              <a:rPr lang="en-US" dirty="0" smtClean="0"/>
+              <a:rPr lang="en-US" dirty="0"/>
               <a:t>, development on  a “</a:t>
             </a:r>
             <a:r>
-              <a:rPr lang="en-US" i="1" dirty="0" smtClean="0"/>
+              <a:rPr lang="en-US" i="1" dirty="0"/>
               <a:t>development</a:t>
             </a:r>
             <a:r>
-              <a:rPr lang="en-US" dirty="0" smtClean="0"/>
+              <a:rPr lang="en-US" dirty="0"/>
               <a:t>” </a:t>
             </a:r>
             <a:r>
-              <a:rPr lang="en-US" dirty="0" err="1" smtClean="0"/>
+              <a:rPr lang="en-US" dirty="0" err="1"/>
               <a:t>Git</a:t>
             </a:r>
             <a:r>
-              <a:rPr lang="en-US" dirty="0" smtClean="0"/>
+              <a:rPr lang="en-US" dirty="0"/>
               <a:t> branch and deployment on a “</a:t>
             </a:r>
             <a:r>
-              <a:rPr lang="en-US" i="1" dirty="0" smtClean="0"/>
+              <a:rPr lang="en-US" i="1" dirty="0"/>
               <a:t>deployment</a:t>
             </a:r>
             <a:r>
-              <a:rPr lang="en-US" dirty="0" smtClean="0"/>
+              <a:rPr lang="en-US" dirty="0"/>
               <a:t>” branch, done only when changes in “</a:t>
             </a:r>
             <a:r>
-              <a:rPr lang="en-US" i="1" dirty="0" smtClean="0"/>
+              <a:rPr lang="en-US" i="1" dirty="0"/>
               <a:t>development</a:t>
             </a:r>
             <a:r>
-              <a:rPr lang="en-US" dirty="0" smtClean="0"/>
+              <a:rPr lang="en-US" dirty="0"/>
               <a:t>” are </a:t>
             </a:r>
             <a:r>
-              <a:rPr lang="en-US" i="1" dirty="0" smtClean="0"/>
+              <a:rPr lang="en-US" i="1" dirty="0"/>
               <a:t>merged </a:t>
             </a:r>
             <a:r>
-              <a:rPr lang="en-US" dirty="0" smtClean="0"/>
+              <a:rPr lang="en-US" dirty="0"/>
               <a:t>into the “</a:t>
             </a:r>
             <a:r>
-              <a:rPr lang="en-US" i="1" dirty="0" smtClean="0"/>
+              <a:rPr lang="en-US" i="1" dirty="0"/>
               <a:t>deployment</a:t>
             </a:r>
             <a:r>
-              <a:rPr lang="en-US" dirty="0" smtClean="0"/>
+              <a:rPr lang="en-US" dirty="0"/>
               <a:t>” branch</a:t>
             </a:r>
             <a:endParaRPr lang="en-US" i="1" dirty="0"/>
@@ -5435,313 +6339,6 @@
     <p:extLst>
       <p:ext uri="{BB962C8B-B14F-4D97-AF65-F5344CB8AC3E}">
         <p14:creationId xmlns:p14="http://schemas.microsoft.com/office/powerpoint/2010/main" val="2625160086"/>
-      </p:ext>
-    </p:extLst>
-  </p:cSld>
-  <p:clrMapOvr>
-    <a:masterClrMapping/>
-  </p:clrMapOvr>
-</p:sld>
-</file>
-
-<file path=ppt/slides/slide23.xml><?xml version="1.0" encoding="utf-8"?>
-<p:sld xmlns:a="http://schemas.openxmlformats.org/drawingml/2006/main" xmlns:r="http://schemas.openxmlformats.org/officeDocument/2006/relationships" xmlns:p="http://schemas.openxmlformats.org/presentationml/2006/main">
-  <p:cSld>
-    <p:spTree>
-      <p:nvGrpSpPr>
-        <p:cNvPr id="1" name=""/>
-        <p:cNvGrpSpPr/>
-        <p:nvPr/>
-      </p:nvGrpSpPr>
-      <p:grpSpPr>
-        <a:xfrm>
-          <a:off x="0" y="0"/>
-          <a:ext cx="0" cy="0"/>
-          <a:chOff x="0" y="0"/>
-          <a:chExt cx="0" cy="0"/>
-        </a:xfrm>
-      </p:grpSpPr>
-      <p:sp>
-        <p:nvSpPr>
-          <p:cNvPr id="2" name="Title 1"/>
-          <p:cNvSpPr>
-            <a:spLocks noGrp="1"/>
-          </p:cNvSpPr>
-          <p:nvPr>
-            <p:ph type="title"/>
-          </p:nvPr>
-        </p:nvSpPr>
-        <p:spPr/>
-        <p:txBody>
-          <a:bodyPr/>
-          <a:lstStyle/>
-          <a:p>
-            <a:r>
-              <a:rPr lang="en-US" dirty="0" smtClean="0"/>
-              <a:t>What Next?</a:t>
-            </a:r>
-            <a:endParaRPr lang="en-US" dirty="0"/>
-          </a:p>
-        </p:txBody>
-      </p:sp>
-      <p:sp>
-        <p:nvSpPr>
-          <p:cNvPr id="3" name="Content Placeholder 2"/>
-          <p:cNvSpPr>
-            <a:spLocks noGrp="1"/>
-          </p:cNvSpPr>
-          <p:nvPr>
-            <p:ph idx="1"/>
-          </p:nvPr>
-        </p:nvSpPr>
-        <p:spPr>
-          <a:xfrm>
-            <a:off x="188536" y="1825624"/>
-            <a:ext cx="11745798" cy="4857979"/>
-          </a:xfrm>
-        </p:spPr>
-        <p:txBody>
-          <a:bodyPr/>
-          <a:lstStyle/>
-          <a:p>
-            <a:r>
-              <a:rPr lang="en-US" dirty="0" smtClean="0"/>
-              <a:t>With what learned so far, you can build a whole functional web/enterprise application</a:t>
-            </a:r>
-          </a:p>
-          <a:p>
-            <a:pPr lvl="1"/>
-            <a:r>
-              <a:rPr lang="en-US" dirty="0" smtClean="0"/>
-              <a:t>GUI, security, testing, database, cloud deployment, etc.</a:t>
-            </a:r>
-          </a:p>
-          <a:p>
-            <a:r>
-              <a:rPr lang="en-US" dirty="0" smtClean="0"/>
-              <a:t>But this kind of </a:t>
-            </a:r>
-            <a:r>
-              <a:rPr lang="en-US" i="1" dirty="0" smtClean="0"/>
-              <a:t>monolithic</a:t>
-            </a:r>
-            <a:r>
-              <a:rPr lang="en-US" dirty="0" smtClean="0"/>
-              <a:t> application does not </a:t>
-            </a:r>
-            <a:r>
-              <a:rPr lang="en-US" i="1" dirty="0" smtClean="0"/>
-              <a:t>scale</a:t>
-            </a:r>
-            <a:r>
-              <a:rPr lang="en-US" dirty="0" smtClean="0"/>
-              <a:t> too well for large systems</a:t>
-            </a:r>
-          </a:p>
-          <a:p>
-            <a:r>
-              <a:rPr lang="en-US" dirty="0" smtClean="0"/>
-              <a:t>Enterprise 2 “</a:t>
-            </a:r>
-            <a:r>
-              <a:rPr lang="en-US" i="1" dirty="0" smtClean="0"/>
-              <a:t>advanced</a:t>
-            </a:r>
-            <a:r>
-              <a:rPr lang="en-US" dirty="0" smtClean="0"/>
-              <a:t>” course:</a:t>
-            </a:r>
-          </a:p>
-          <a:p>
-            <a:pPr lvl="1"/>
-            <a:r>
-              <a:rPr lang="en-US" dirty="0" smtClean="0"/>
-              <a:t>Dig into </a:t>
-            </a:r>
-            <a:r>
-              <a:rPr lang="en-US" dirty="0" smtClean="0"/>
-              <a:t>Web </a:t>
-            </a:r>
-            <a:r>
-              <a:rPr lang="en-US" dirty="0" smtClean="0"/>
-              <a:t>Services (</a:t>
-            </a:r>
-            <a:r>
-              <a:rPr lang="en-US" dirty="0" err="1" smtClean="0"/>
-              <a:t>eg</a:t>
-            </a:r>
-            <a:r>
-              <a:rPr lang="en-US" dirty="0" smtClean="0"/>
-              <a:t> REST</a:t>
-            </a:r>
-            <a:r>
-              <a:rPr lang="en-US" smtClean="0"/>
-              <a:t>) </a:t>
-            </a:r>
-            <a:r>
-              <a:rPr lang="en-US" smtClean="0"/>
-              <a:t>and details of HTTP</a:t>
-            </a:r>
-            <a:endParaRPr lang="en-US" dirty="0" smtClean="0"/>
-          </a:p>
-          <a:p>
-            <a:pPr lvl="1"/>
-            <a:r>
-              <a:rPr lang="en-US" dirty="0" smtClean="0"/>
-              <a:t>Distributed systems, in particular</a:t>
-            </a:r>
-            <a:r>
-              <a:rPr lang="en-US" dirty="0" smtClean="0"/>
-              <a:t> </a:t>
-            </a:r>
-            <a:r>
-              <a:rPr lang="en-US" i="1" dirty="0" err="1" smtClean="0"/>
-              <a:t>Microservices</a:t>
-            </a:r>
-            <a:endParaRPr lang="en-US" i="1" dirty="0" smtClean="0"/>
-          </a:p>
-          <a:p>
-            <a:pPr lvl="1"/>
-            <a:r>
-              <a:rPr lang="en-US" dirty="0" smtClean="0"/>
-              <a:t>Integration with frontends using </a:t>
-            </a:r>
-            <a:r>
-              <a:rPr lang="en-US" dirty="0" smtClean="0"/>
-              <a:t>JS + AJAX + </a:t>
-            </a:r>
-            <a:r>
-              <a:rPr lang="en-US" dirty="0" err="1" smtClean="0"/>
-              <a:t>WebSockets</a:t>
-            </a:r>
-            <a:endParaRPr lang="en-US" dirty="0" smtClean="0"/>
-          </a:p>
-          <a:p>
-            <a:pPr lvl="1"/>
-            <a:endParaRPr lang="en-US" i="1" dirty="0"/>
-          </a:p>
-        </p:txBody>
-      </p:sp>
-    </p:spTree>
-    <p:extLst>
-      <p:ext uri="{BB962C8B-B14F-4D97-AF65-F5344CB8AC3E}">
-        <p14:creationId xmlns:p14="http://schemas.microsoft.com/office/powerpoint/2010/main" val="3070012570"/>
-      </p:ext>
-    </p:extLst>
-  </p:cSld>
-  <p:clrMapOvr>
-    <a:masterClrMapping/>
-  </p:clrMapOvr>
-</p:sld>
-</file>
-
-<file path=ppt/slides/slide24.xml><?xml version="1.0" encoding="utf-8"?>
-<p:sld xmlns:a="http://schemas.openxmlformats.org/drawingml/2006/main" xmlns:r="http://schemas.openxmlformats.org/officeDocument/2006/relationships" xmlns:p="http://schemas.openxmlformats.org/presentationml/2006/main">
-  <p:cSld>
-    <p:spTree>
-      <p:nvGrpSpPr>
-        <p:cNvPr id="1" name=""/>
-        <p:cNvGrpSpPr/>
-        <p:nvPr/>
-      </p:nvGrpSpPr>
-      <p:grpSpPr>
-        <a:xfrm>
-          <a:off x="0" y="0"/>
-          <a:ext cx="0" cy="0"/>
-          <a:chOff x="0" y="0"/>
-          <a:chExt cx="0" cy="0"/>
-        </a:xfrm>
-      </p:grpSpPr>
-      <p:sp>
-        <p:nvSpPr>
-          <p:cNvPr id="4" name="Title 3"/>
-          <p:cNvSpPr>
-            <a:spLocks noGrp="1"/>
-          </p:cNvSpPr>
-          <p:nvPr>
-            <p:ph type="title"/>
-          </p:nvPr>
-        </p:nvSpPr>
-        <p:spPr/>
-        <p:txBody>
-          <a:bodyPr/>
-          <a:lstStyle/>
-          <a:p>
-            <a:r>
-              <a:rPr lang="en-US" dirty="0" err="1" smtClean="0"/>
-              <a:t>Git</a:t>
-            </a:r>
-            <a:r>
-              <a:rPr lang="en-US" dirty="0" smtClean="0"/>
-              <a:t> Repository Modules</a:t>
-            </a:r>
-            <a:endParaRPr lang="en-US" dirty="0"/>
-          </a:p>
-        </p:txBody>
-      </p:sp>
-      <p:sp>
-        <p:nvSpPr>
-          <p:cNvPr id="5" name="Content Placeholder 4"/>
-          <p:cNvSpPr>
-            <a:spLocks noGrp="1"/>
-          </p:cNvSpPr>
-          <p:nvPr>
-            <p:ph idx="1"/>
-          </p:nvPr>
-        </p:nvSpPr>
-        <p:spPr>
-          <a:xfrm>
-            <a:off x="838200" y="1825625"/>
-            <a:ext cx="10515600" cy="4972740"/>
-          </a:xfrm>
-        </p:spPr>
-        <p:txBody>
-          <a:bodyPr>
-            <a:normAutofit/>
-          </a:bodyPr>
-          <a:lstStyle/>
-          <a:p>
-            <a:r>
-              <a:rPr lang="en-US" i="1" dirty="0" smtClean="0"/>
-              <a:t>NOTE: most of the explanations will be directly in the code as comments, and not here in the slides</a:t>
-            </a:r>
-          </a:p>
-          <a:p>
-            <a:r>
-              <a:rPr lang="en-US" b="1" dirty="0" smtClean="0"/>
-              <a:t>.</a:t>
-            </a:r>
-            <a:r>
-              <a:rPr lang="en-US" b="1" dirty="0" err="1" smtClean="0"/>
-              <a:t>travis.yml</a:t>
-            </a:r>
-            <a:endParaRPr lang="en-US" b="1" dirty="0" smtClean="0"/>
-          </a:p>
-          <a:p>
-            <a:r>
-              <a:rPr lang="en-US" b="1" dirty="0" smtClean="0"/>
-              <a:t>intro/spring/flyway</a:t>
-            </a:r>
-          </a:p>
-          <a:p>
-            <a:r>
-              <a:rPr lang="en-US" b="1" dirty="0" smtClean="0"/>
-              <a:t>intro/spring/deployment</a:t>
-            </a:r>
-          </a:p>
-          <a:p>
-            <a:r>
-              <a:rPr lang="en-US" dirty="0" smtClean="0"/>
-              <a:t>Exercises for Lesson 11 (see documentation)</a:t>
-            </a:r>
-            <a:endParaRPr lang="en-US" dirty="0"/>
-          </a:p>
-        </p:txBody>
-      </p:sp>
-    </p:spTree>
-    <p:extLst>
-      <p:ext uri="{BB962C8B-B14F-4D97-AF65-F5344CB8AC3E}">
-        <p14:creationId xmlns:p14="http://schemas.microsoft.com/office/powerpoint/2010/main" val="1023732187"/>
       </p:ext>
     </p:extLst>
   </p:cSld>
@@ -5790,29 +6387,294 @@
           </a:p>
         </p:txBody>
       </p:sp>
-      <p:sp>
-        <p:nvSpPr>
-          <p:cNvPr id="5" name="Text Placeholder 4"/>
-          <p:cNvSpPr>
-            <a:spLocks noGrp="1"/>
-          </p:cNvSpPr>
-          <p:nvPr>
-            <p:ph type="body" idx="1"/>
-          </p:nvPr>
-        </p:nvSpPr>
-        <p:spPr/>
-        <p:txBody>
-          <a:bodyPr/>
-          <a:lstStyle/>
-          <a:p>
-            <a:endParaRPr lang="en-US"/>
-          </a:p>
-        </p:txBody>
-      </p:sp>
     </p:spTree>
     <p:extLst>
       <p:ext uri="{BB962C8B-B14F-4D97-AF65-F5344CB8AC3E}">
         <p14:creationId xmlns:p14="http://schemas.microsoft.com/office/powerpoint/2010/main" val="978586533"/>
+      </p:ext>
+    </p:extLst>
+  </p:cSld>
+  <p:clrMapOvr>
+    <a:masterClrMapping/>
+  </p:clrMapOvr>
+</p:sld>
+</file>
+
+<file path=ppt/slides/slide30.xml><?xml version="1.0" encoding="utf-8"?>
+<p:sld xmlns:a="http://schemas.openxmlformats.org/drawingml/2006/main" xmlns:r="http://schemas.openxmlformats.org/officeDocument/2006/relationships" xmlns:p="http://schemas.openxmlformats.org/presentationml/2006/main">
+  <p:cSld>
+    <p:spTree>
+      <p:nvGrpSpPr>
+        <p:cNvPr id="1" name=""/>
+        <p:cNvGrpSpPr/>
+        <p:nvPr/>
+      </p:nvGrpSpPr>
+      <p:grpSpPr>
+        <a:xfrm>
+          <a:off x="0" y="0"/>
+          <a:ext cx="0" cy="0"/>
+          <a:chOff x="0" y="0"/>
+          <a:chExt cx="0" cy="0"/>
+        </a:xfrm>
+      </p:grpSpPr>
+      <p:sp>
+        <p:nvSpPr>
+          <p:cNvPr id="2" name="Title 1"/>
+          <p:cNvSpPr>
+            <a:spLocks noGrp="1"/>
+          </p:cNvSpPr>
+          <p:nvPr>
+            <p:ph type="title"/>
+          </p:nvPr>
+        </p:nvSpPr>
+        <p:spPr/>
+        <p:txBody>
+          <a:bodyPr/>
+          <a:lstStyle/>
+          <a:p>
+            <a:r>
+              <a:rPr lang="en-US" dirty="0"/>
+              <a:t>What Next?</a:t>
+            </a:r>
+          </a:p>
+        </p:txBody>
+      </p:sp>
+      <p:sp>
+        <p:nvSpPr>
+          <p:cNvPr id="3" name="Content Placeholder 2"/>
+          <p:cNvSpPr>
+            <a:spLocks noGrp="1"/>
+          </p:cNvSpPr>
+          <p:nvPr>
+            <p:ph idx="1"/>
+          </p:nvPr>
+        </p:nvSpPr>
+        <p:spPr>
+          <a:xfrm>
+            <a:off x="188536" y="1825624"/>
+            <a:ext cx="11745798" cy="4857979"/>
+          </a:xfrm>
+        </p:spPr>
+        <p:txBody>
+          <a:bodyPr/>
+          <a:lstStyle/>
+          <a:p>
+            <a:r>
+              <a:rPr lang="en-US" dirty="0"/>
+              <a:t>With what learned so far, you can build a whole functional web/enterprise application</a:t>
+            </a:r>
+          </a:p>
+          <a:p>
+            <a:pPr lvl="1"/>
+            <a:r>
+              <a:rPr lang="en-US" dirty="0"/>
+              <a:t>GUI, security, testing, database, cloud deployment, etc.</a:t>
+            </a:r>
+          </a:p>
+          <a:p>
+            <a:r>
+              <a:rPr lang="en-US" dirty="0"/>
+              <a:t>But this kind of </a:t>
+            </a:r>
+            <a:r>
+              <a:rPr lang="en-US" i="1" dirty="0"/>
+              <a:t>monolithic</a:t>
+            </a:r>
+            <a:r>
+              <a:rPr lang="en-US" dirty="0"/>
+              <a:t> application does not </a:t>
+            </a:r>
+            <a:r>
+              <a:rPr lang="en-US" i="1" dirty="0"/>
+              <a:t>scale</a:t>
+            </a:r>
+            <a:r>
+              <a:rPr lang="en-US" dirty="0"/>
+              <a:t> too well for large systems</a:t>
+            </a:r>
+          </a:p>
+          <a:p>
+            <a:r>
+              <a:rPr lang="en-US" dirty="0"/>
+              <a:t>Enterprise 2 “</a:t>
+            </a:r>
+            <a:r>
+              <a:rPr lang="en-US" i="1" dirty="0"/>
+              <a:t>advanced</a:t>
+            </a:r>
+            <a:r>
+              <a:rPr lang="en-US" dirty="0"/>
+              <a:t>” course:</a:t>
+            </a:r>
+          </a:p>
+          <a:p>
+            <a:pPr lvl="1"/>
+            <a:r>
+              <a:rPr lang="en-US" dirty="0"/>
+              <a:t>Dig into Web Services (</a:t>
+            </a:r>
+            <a:r>
+              <a:rPr lang="en-US" dirty="0" err="1"/>
+              <a:t>eg</a:t>
+            </a:r>
+            <a:r>
+              <a:rPr lang="en-US" dirty="0"/>
+              <a:t> REST</a:t>
+            </a:r>
+            <a:r>
+              <a:rPr lang="en-US"/>
+              <a:t>) and details of HTTP</a:t>
+            </a:r>
+            <a:endParaRPr lang="en-US" dirty="0"/>
+          </a:p>
+          <a:p>
+            <a:pPr lvl="1"/>
+            <a:r>
+              <a:rPr lang="en-US" dirty="0"/>
+              <a:t>Distributed systems, in particular </a:t>
+            </a:r>
+            <a:r>
+              <a:rPr lang="en-US" i="1" dirty="0" err="1"/>
+              <a:t>Microservices</a:t>
+            </a:r>
+            <a:endParaRPr lang="en-US" i="1" dirty="0"/>
+          </a:p>
+          <a:p>
+            <a:pPr lvl="1"/>
+            <a:r>
+              <a:rPr lang="en-US" dirty="0"/>
+              <a:t>Integration with frontends using JS + AJAX + </a:t>
+            </a:r>
+            <a:r>
+              <a:rPr lang="en-US" dirty="0" err="1"/>
+              <a:t>WebSockets</a:t>
+            </a:r>
+            <a:endParaRPr lang="en-US" dirty="0"/>
+          </a:p>
+          <a:p>
+            <a:pPr lvl="1"/>
+            <a:endParaRPr lang="en-US" i="1" dirty="0"/>
+          </a:p>
+        </p:txBody>
+      </p:sp>
+    </p:spTree>
+    <p:extLst>
+      <p:ext uri="{BB962C8B-B14F-4D97-AF65-F5344CB8AC3E}">
+        <p14:creationId xmlns:p14="http://schemas.microsoft.com/office/powerpoint/2010/main" val="3070012570"/>
+      </p:ext>
+    </p:extLst>
+  </p:cSld>
+  <p:clrMapOvr>
+    <a:masterClrMapping/>
+  </p:clrMapOvr>
+</p:sld>
+</file>
+
+<file path=ppt/slides/slide31.xml><?xml version="1.0" encoding="utf-8"?>
+<p:sld xmlns:a="http://schemas.openxmlformats.org/drawingml/2006/main" xmlns:r="http://schemas.openxmlformats.org/officeDocument/2006/relationships" xmlns:p="http://schemas.openxmlformats.org/presentationml/2006/main">
+  <p:cSld>
+    <p:spTree>
+      <p:nvGrpSpPr>
+        <p:cNvPr id="1" name=""/>
+        <p:cNvGrpSpPr/>
+        <p:nvPr/>
+      </p:nvGrpSpPr>
+      <p:grpSpPr>
+        <a:xfrm>
+          <a:off x="0" y="0"/>
+          <a:ext cx="0" cy="0"/>
+          <a:chOff x="0" y="0"/>
+          <a:chExt cx="0" cy="0"/>
+        </a:xfrm>
+      </p:grpSpPr>
+      <p:sp>
+        <p:nvSpPr>
+          <p:cNvPr id="4" name="Title 3"/>
+          <p:cNvSpPr>
+            <a:spLocks noGrp="1"/>
+          </p:cNvSpPr>
+          <p:nvPr>
+            <p:ph type="title"/>
+          </p:nvPr>
+        </p:nvSpPr>
+        <p:spPr/>
+        <p:txBody>
+          <a:bodyPr/>
+          <a:lstStyle/>
+          <a:p>
+            <a:r>
+              <a:rPr lang="en-US" dirty="0" err="1"/>
+              <a:t>Git</a:t>
+            </a:r>
+            <a:r>
+              <a:rPr lang="en-US" dirty="0"/>
+              <a:t> Repository Modules</a:t>
+            </a:r>
+          </a:p>
+        </p:txBody>
+      </p:sp>
+      <p:sp>
+        <p:nvSpPr>
+          <p:cNvPr id="5" name="Content Placeholder 4"/>
+          <p:cNvSpPr>
+            <a:spLocks noGrp="1"/>
+          </p:cNvSpPr>
+          <p:nvPr>
+            <p:ph idx="1"/>
+          </p:nvPr>
+        </p:nvSpPr>
+        <p:spPr>
+          <a:xfrm>
+            <a:off x="838200" y="1825625"/>
+            <a:ext cx="10515600" cy="4972740"/>
+          </a:xfrm>
+        </p:spPr>
+        <p:txBody>
+          <a:bodyPr>
+            <a:normAutofit/>
+          </a:bodyPr>
+          <a:lstStyle/>
+          <a:p>
+            <a:r>
+              <a:rPr lang="en-US" i="1" dirty="0"/>
+              <a:t>NOTE: most of the explanations will be directly in the code as comments, and not here in the slides</a:t>
+            </a:r>
+          </a:p>
+          <a:p>
+            <a:r>
+              <a:rPr lang="en-US" b="1" dirty="0"/>
+              <a:t>.</a:t>
+            </a:r>
+            <a:r>
+              <a:rPr lang="en-US" b="1" dirty="0" err="1"/>
+              <a:t>travis.yml</a:t>
+            </a:r>
+            <a:endParaRPr lang="en-US" b="1" dirty="0"/>
+          </a:p>
+          <a:p>
+            <a:r>
+              <a:rPr lang="en-US" b="1" dirty="0"/>
+              <a:t>intro/spring/flyway</a:t>
+            </a:r>
+          </a:p>
+          <a:p>
+            <a:r>
+              <a:rPr lang="en-US" b="1" dirty="0"/>
+              <a:t>intro/spring/deployment</a:t>
+            </a:r>
+          </a:p>
+          <a:p>
+            <a:r>
+              <a:rPr lang="en-US" dirty="0"/>
+              <a:t>Exercises for Lesson 11 (see documentation)</a:t>
+            </a:r>
+          </a:p>
+        </p:txBody>
+      </p:sp>
+    </p:spTree>
+    <p:extLst>
+      <p:ext uri="{BB962C8B-B14F-4D97-AF65-F5344CB8AC3E}">
+        <p14:creationId xmlns:p14="http://schemas.microsoft.com/office/powerpoint/2010/main" val="1023732187"/>
       </p:ext>
     </p:extLst>
   </p:cSld>
@@ -5855,10 +6717,9 @@
           <a:lstStyle/>
           <a:p>
             <a:r>
-              <a:rPr lang="en-US" dirty="0" smtClean="0"/>
+              <a:rPr lang="en-US" dirty="0"/>
               <a:t>Code Evolution</a:t>
             </a:r>
-            <a:endParaRPr lang="en-US" dirty="0"/>
           </a:p>
         </p:txBody>
       </p:sp>
@@ -5885,13 +6746,13 @@
           <a:lstStyle/>
           <a:p>
             <a:r>
-              <a:rPr lang="en-US" dirty="0" smtClean="0"/>
+              <a:rPr lang="en-US" dirty="0"/>
               <a:t>Every time there is a change in the code, you want to know if application is still working fine</a:t>
             </a:r>
           </a:p>
           <a:p>
             <a:r>
-              <a:rPr lang="en-US" dirty="0" smtClean="0"/>
+              <a:rPr lang="en-US" dirty="0"/>
               <a:t>Possible problems:</a:t>
             </a:r>
           </a:p>
@@ -5901,7 +6762,7 @@
               <a:buAutoNum type="arabicPeriod"/>
             </a:pPr>
             <a:r>
-              <a:rPr lang="en-US" dirty="0" smtClean="0"/>
+              <a:rPr lang="en-US" dirty="0"/>
               <a:t>Code does not compile</a:t>
             </a:r>
           </a:p>
@@ -5911,39 +6772,39 @@
               <a:buAutoNum type="arabicPeriod"/>
             </a:pPr>
             <a:r>
-              <a:rPr lang="en-US" dirty="0" smtClean="0"/>
+              <a:rPr lang="en-US" dirty="0"/>
               <a:t>Changes broke some functionalities, and some tests now fail</a:t>
             </a:r>
           </a:p>
           <a:p>
             <a:r>
-              <a:rPr lang="en-US" dirty="0" smtClean="0"/>
+              <a:rPr lang="en-US" dirty="0"/>
               <a:t>When to check? At each </a:t>
             </a:r>
             <a:r>
-              <a:rPr lang="en-US" i="1" dirty="0" err="1" smtClean="0"/>
+              <a:rPr lang="en-US" i="1" dirty="0" err="1"/>
               <a:t>Git</a:t>
             </a:r>
             <a:r>
-              <a:rPr lang="en-US" i="1" dirty="0" smtClean="0"/>
+              <a:rPr lang="en-US" i="1" dirty="0"/>
               <a:t> Push</a:t>
             </a:r>
           </a:p>
           <a:p>
             <a:r>
-              <a:rPr lang="en-US" dirty="0" smtClean="0"/>
+              <a:rPr lang="en-US" dirty="0"/>
               <a:t>Could ask developers to always do a “</a:t>
             </a:r>
             <a:r>
-              <a:rPr lang="en-US" i="1" dirty="0" err="1" smtClean="0"/>
+              <a:rPr lang="en-US" i="1" dirty="0" err="1"/>
               <a:t>mvn</a:t>
             </a:r>
             <a:r>
-              <a:rPr lang="en-US" i="1" dirty="0" smtClean="0"/>
+              <a:rPr lang="en-US" i="1" dirty="0"/>
               <a:t> clean verify</a:t>
             </a:r>
             <a:r>
-              <a:rPr lang="en-US" dirty="0" smtClean="0"/>
+              <a:rPr lang="en-US" dirty="0"/>
               <a:t>” before each commit, but:</a:t>
             </a:r>
           </a:p>
@@ -5953,7 +6814,7 @@
               <a:buAutoNum type="arabicPeriod"/>
             </a:pPr>
             <a:r>
-              <a:rPr lang="en-US" dirty="0" smtClean="0"/>
+              <a:rPr lang="en-US" dirty="0"/>
               <a:t>They might forget</a:t>
             </a:r>
           </a:p>
@@ -5963,18 +6824,17 @@
               <a:buAutoNum type="arabicPeriod"/>
             </a:pPr>
             <a:r>
-              <a:rPr lang="en-US" dirty="0" smtClean="0"/>
+              <a:rPr lang="en-US" dirty="0"/>
               <a:t>Test cases might take </a:t>
             </a:r>
             <a:r>
-              <a:rPr lang="en-US" b="1" dirty="0" smtClean="0"/>
+              <a:rPr lang="en-US" b="1" dirty="0"/>
               <a:t>hours</a:t>
             </a:r>
             <a:r>
-              <a:rPr lang="en-US" dirty="0" smtClean="0"/>
+              <a:rPr lang="en-US" dirty="0"/>
               <a:t> to run</a:t>
             </a:r>
-            <a:endParaRPr lang="en-US" dirty="0"/>
           </a:p>
         </p:txBody>
       </p:sp>
@@ -6024,10 +6884,9 @@
           <a:lstStyle/>
           <a:p>
             <a:r>
-              <a:rPr lang="en-US" dirty="0" smtClean="0"/>
+              <a:rPr lang="en-US" dirty="0"/>
               <a:t>CI Server</a:t>
             </a:r>
-            <a:endParaRPr lang="en-US" dirty="0"/>
           </a:p>
         </p:txBody>
       </p:sp>
@@ -6054,82 +6913,82 @@
           <a:lstStyle/>
           <a:p>
             <a:r>
-              <a:rPr lang="en-US" dirty="0" smtClean="0"/>
+              <a:rPr lang="en-US" dirty="0"/>
               <a:t>A server that automatically pulls from </a:t>
             </a:r>
             <a:r>
-              <a:rPr lang="en-US" dirty="0" err="1" smtClean="0"/>
+              <a:rPr lang="en-US" dirty="0" err="1"/>
               <a:t>Git</a:t>
             </a:r>
             <a:r>
-              <a:rPr lang="en-US" dirty="0" smtClean="0"/>
+              <a:rPr lang="en-US" dirty="0"/>
               <a:t> at each push</a:t>
             </a:r>
           </a:p>
           <a:p>
             <a:r>
-              <a:rPr lang="en-US" dirty="0" smtClean="0"/>
+              <a:rPr lang="en-US" dirty="0"/>
               <a:t>Build your application and run all tests</a:t>
             </a:r>
           </a:p>
           <a:p>
             <a:r>
-              <a:rPr lang="en-US" dirty="0" smtClean="0"/>
+              <a:rPr lang="en-US" dirty="0"/>
               <a:t>Inform developers (</a:t>
             </a:r>
             <a:r>
-              <a:rPr lang="en-US" dirty="0" err="1" smtClean="0"/>
+              <a:rPr lang="en-US" dirty="0" err="1"/>
               <a:t>eg</a:t>
             </a:r>
             <a:r>
-              <a:rPr lang="en-US" dirty="0" smtClean="0"/>
+              <a:rPr lang="en-US" dirty="0"/>
               <a:t> by email) if a build fails</a:t>
             </a:r>
           </a:p>
           <a:p>
             <a:r>
-              <a:rPr lang="en-US" dirty="0" smtClean="0"/>
+              <a:rPr lang="en-US" dirty="0"/>
               <a:t>Can keep track of build history</a:t>
             </a:r>
           </a:p>
           <a:p>
             <a:r>
-              <a:rPr lang="en-US" dirty="0" smtClean="0"/>
+              <a:rPr lang="en-US" dirty="0"/>
               <a:t>Can check a </a:t>
             </a:r>
             <a:r>
-              <a:rPr lang="en-US" dirty="0" err="1" smtClean="0"/>
+              <a:rPr lang="en-US" dirty="0" err="1"/>
               <a:t>Git</a:t>
             </a:r>
             <a:r>
-              <a:rPr lang="en-US" dirty="0" smtClean="0"/>
+              <a:rPr lang="en-US" dirty="0"/>
               <a:t> PR (Pull Request) before merging it</a:t>
             </a:r>
           </a:p>
           <a:p>
             <a:r>
-              <a:rPr lang="en-US" i="1" dirty="0" smtClean="0"/>
+              <a:rPr lang="en-US" i="1" dirty="0"/>
               <a:t>Jenkins</a:t>
             </a:r>
             <a:r>
-              <a:rPr lang="en-US" dirty="0" smtClean="0"/>
+              <a:rPr lang="en-US" dirty="0"/>
               <a:t> is the most used CI server, which you can install on your machines</a:t>
             </a:r>
           </a:p>
           <a:p>
             <a:r>
-              <a:rPr lang="en-US" dirty="0" smtClean="0"/>
+              <a:rPr lang="en-US" dirty="0"/>
               <a:t>Extremely useful when working in teams</a:t>
             </a:r>
           </a:p>
           <a:p>
             <a:pPr lvl="1"/>
             <a:r>
-              <a:rPr lang="en-US" dirty="0" smtClean="0"/>
+              <a:rPr lang="en-US" dirty="0"/>
               <a:t>If you end up working in a company not using CI, </a:t>
             </a:r>
             <a:r>
-              <a:rPr lang="en-US" b="1" dirty="0" smtClean="0"/>
+              <a:rPr lang="en-US" b="1" dirty="0"/>
               <a:t>run away!!!</a:t>
             </a:r>
           </a:p>
@@ -6181,10 +7040,9 @@
           <a:lstStyle/>
           <a:p>
             <a:r>
-              <a:rPr lang="en-US" dirty="0" smtClean="0"/>
+              <a:rPr lang="en-US" dirty="0"/>
               <a:t>Travis CI</a:t>
             </a:r>
-            <a:endParaRPr lang="en-US" dirty="0"/>
           </a:p>
         </p:txBody>
       </p:sp>
@@ -6209,78 +7067,74 @@
           <a:lstStyle/>
           <a:p>
             <a:r>
-              <a:rPr lang="en-US" dirty="0" smtClean="0"/>
-              <a:t>A cloud </a:t>
-            </a:r>
-            <a:r>
-              <a:rPr lang="en-US" dirty="0"/>
-              <a:t>CI provider: </a:t>
-            </a:r>
-            <a:r>
-              <a:rPr lang="en-US" dirty="0" smtClean="0">
+              <a:rPr lang="en-US" dirty="0"/>
+              <a:t>A cloud CI provider: </a:t>
+            </a:r>
+            <a:r>
+              <a:rPr lang="en-US" dirty="0">
                 <a:hlinkClick r:id="rId2"/>
               </a:rPr>
               <a:t>www.travis-ci.org</a:t>
             </a:r>
-            <a:endParaRPr lang="en-US" dirty="0" smtClean="0"/>
-          </a:p>
-          <a:p>
-            <a:r>
-              <a:rPr lang="en-US" dirty="0" smtClean="0"/>
+            <a:endParaRPr lang="en-US" dirty="0"/>
+          </a:p>
+          <a:p>
+            <a:r>
+              <a:rPr lang="en-US" dirty="0"/>
               <a:t>Free for open-source projects</a:t>
             </a:r>
           </a:p>
           <a:p>
             <a:r>
-              <a:rPr lang="en-US" dirty="0" smtClean="0"/>
+              <a:rPr lang="en-US" dirty="0"/>
               <a:t>Supporting many languages, not just Java</a:t>
             </a:r>
           </a:p>
           <a:p>
             <a:r>
-              <a:rPr lang="en-US" dirty="0" smtClean="0"/>
+              <a:rPr lang="en-US" dirty="0"/>
               <a:t>Can be integrated with GitHub, </a:t>
             </a:r>
             <a:r>
-              <a:rPr lang="en-US" dirty="0" err="1" smtClean="0"/>
+              <a:rPr lang="en-US" dirty="0" err="1"/>
               <a:t>eg</a:t>
             </a:r>
             <a:r>
-              <a:rPr lang="en-US" dirty="0" smtClean="0"/>
+              <a:rPr lang="en-US" dirty="0"/>
               <a:t> build at each </a:t>
             </a:r>
             <a:r>
-              <a:rPr lang="en-US" dirty="0" err="1" smtClean="0"/>
+              <a:rPr lang="en-US" dirty="0" err="1"/>
               <a:t>Git</a:t>
             </a:r>
             <a:r>
-              <a:rPr lang="en-US" dirty="0" smtClean="0"/>
+              <a:rPr lang="en-US" dirty="0"/>
               <a:t> Push</a:t>
             </a:r>
           </a:p>
           <a:p>
             <a:r>
-              <a:rPr lang="en-US" dirty="0" smtClean="0"/>
+              <a:rPr lang="en-US" dirty="0"/>
               <a:t>Quite easy to setup: besides creating an account, in project you just need a “</a:t>
             </a:r>
             <a:r>
-              <a:rPr lang="en-US" i="1" dirty="0" smtClean="0"/>
+              <a:rPr lang="en-US" i="1" dirty="0"/>
               <a:t>.</a:t>
             </a:r>
             <a:r>
-              <a:rPr lang="en-US" i="1" dirty="0" err="1" smtClean="0"/>
+              <a:rPr lang="en-US" i="1" dirty="0" err="1"/>
               <a:t>travis.yml</a:t>
             </a:r>
             <a:r>
-              <a:rPr lang="en-US" dirty="0" smtClean="0"/>
+              <a:rPr lang="en-US" dirty="0"/>
               <a:t>” </a:t>
             </a:r>
             <a:r>
-              <a:rPr lang="en-US" dirty="0" err="1" smtClean="0"/>
+              <a:rPr lang="en-US" dirty="0" err="1"/>
               <a:t>config</a:t>
             </a:r>
             <a:r>
-              <a:rPr lang="en-US" dirty="0" smtClean="0"/>
+              <a:rPr lang="en-US" dirty="0"/>
               <a:t> file</a:t>
             </a:r>
           </a:p>
@@ -6453,10 +7307,9 @@
           <a:lstStyle/>
           <a:p>
             <a:r>
-              <a:rPr lang="en-US" dirty="0" smtClean="0"/>
+              <a:rPr lang="en-US" dirty="0"/>
               <a:t>Database Maintenance</a:t>
             </a:r>
-            <a:endParaRPr lang="en-US" dirty="0"/>
           </a:p>
         </p:txBody>
       </p:sp>
@@ -6525,10 +7378,9 @@
           <a:lstStyle/>
           <a:p>
             <a:r>
-              <a:rPr lang="en-US" dirty="0" smtClean="0"/>
+              <a:rPr lang="en-US" dirty="0"/>
               <a:t>Database Migrations</a:t>
             </a:r>
-            <a:endParaRPr lang="en-US" dirty="0"/>
           </a:p>
         </p:txBody>
       </p:sp>
@@ -6553,45 +7405,44 @@
           <a:lstStyle/>
           <a:p>
             <a:r>
-              <a:rPr lang="en-US" dirty="0" smtClean="0"/>
+              <a:rPr lang="en-US" dirty="0"/>
               <a:t>So far, by configuring “</a:t>
             </a:r>
             <a:r>
-              <a:rPr lang="en-US" i="1" dirty="0" smtClean="0"/>
+              <a:rPr lang="en-US" i="1" dirty="0"/>
               <a:t>create-drop</a:t>
             </a:r>
             <a:r>
-              <a:rPr lang="en-US" dirty="0" smtClean="0"/>
+              <a:rPr lang="en-US" dirty="0"/>
               <a:t>” in Hibernate, we were always recreating the schema of the database</a:t>
             </a:r>
           </a:p>
           <a:p>
             <a:r>
-              <a:rPr lang="en-US" dirty="0" smtClean="0"/>
+              <a:rPr lang="en-US" dirty="0"/>
               <a:t>This of course does not work in production… you do not want to delete your database at each application restart!!!</a:t>
             </a:r>
           </a:p>
           <a:p>
             <a:r>
-              <a:rPr lang="en-US" dirty="0" smtClean="0"/>
+              <a:rPr lang="en-US" dirty="0"/>
               <a:t>A possible (but not good) solution is to use “</a:t>
             </a:r>
             <a:r>
-              <a:rPr lang="en-US" i="1" dirty="0" smtClean="0"/>
+              <a:rPr lang="en-US" i="1" dirty="0"/>
               <a:t>update</a:t>
             </a:r>
             <a:r>
-              <a:rPr lang="en-US" dirty="0" smtClean="0"/>
+              <a:rPr lang="en-US" dirty="0"/>
               <a:t>”</a:t>
             </a:r>
           </a:p>
           <a:p>
             <a:pPr lvl="1"/>
             <a:r>
-              <a:rPr lang="en-US" dirty="0" smtClean="0"/>
+              <a:rPr lang="en-US" dirty="0"/>
               <a:t>It will create a database (based on your entities) if not existing, otherwise will try to update the current one</a:t>
             </a:r>
-            <a:endParaRPr lang="en-US" dirty="0"/>
           </a:p>
         </p:txBody>
       </p:sp>

</xml_diff>

<commit_message>
info on logging module
</commit_message>
<xml_diff>
--- a/doc/intro/slides/lesson_11_ci.pptx
+++ b/doc/intro/slides/lesson_11_ci.pptx
@@ -227,7 +227,7 @@
           <a:p>
             <a:fld id="{9B5B52BA-3295-0343-9E28-A260A811DD10}" type="datetimeFigureOut">
               <a:rPr lang="en-US" smtClean="0"/>
-              <a:t>3/13/19</a:t>
+              <a:t>3/27/19</a:t>
             </a:fld>
             <a:endParaRPr lang="en-US"/>
           </a:p>
@@ -623,7 +623,7 @@
           <a:p>
             <a:fld id="{04F1D4A2-813C-F741-B481-C92B3A596030}" type="datetimeFigureOut">
               <a:rPr lang="en-US" smtClean="0"/>
-              <a:t>3/13/19</a:t>
+              <a:t>3/27/19</a:t>
             </a:fld>
             <a:endParaRPr lang="en-US"/>
           </a:p>
@@ -791,7 +791,7 @@
           <a:p>
             <a:fld id="{04F1D4A2-813C-F741-B481-C92B3A596030}" type="datetimeFigureOut">
               <a:rPr lang="en-US" smtClean="0"/>
-              <a:t>3/13/19</a:t>
+              <a:t>3/27/19</a:t>
             </a:fld>
             <a:endParaRPr lang="en-US"/>
           </a:p>
@@ -969,7 +969,7 @@
           <a:p>
             <a:fld id="{04F1D4A2-813C-F741-B481-C92B3A596030}" type="datetimeFigureOut">
               <a:rPr lang="en-US" smtClean="0"/>
-              <a:t>3/13/19</a:t>
+              <a:t>3/27/19</a:t>
             </a:fld>
             <a:endParaRPr lang="en-US"/>
           </a:p>
@@ -1148,7 +1148,7 @@
           <a:p>
             <a:fld id="{04F1D4A2-813C-F741-B481-C92B3A596030}" type="datetimeFigureOut">
               <a:rPr lang="en-US" smtClean="0"/>
-              <a:t>3/13/19</a:t>
+              <a:t>3/27/19</a:t>
             </a:fld>
             <a:endParaRPr lang="en-US"/>
           </a:p>
@@ -1393,7 +1393,7 @@
           <a:p>
             <a:fld id="{04F1D4A2-813C-F741-B481-C92B3A596030}" type="datetimeFigureOut">
               <a:rPr lang="en-US" smtClean="0"/>
-              <a:t>3/13/19</a:t>
+              <a:t>3/27/19</a:t>
             </a:fld>
             <a:endParaRPr lang="en-US"/>
           </a:p>
@@ -1622,7 +1622,7 @@
           <a:p>
             <a:fld id="{04F1D4A2-813C-F741-B481-C92B3A596030}" type="datetimeFigureOut">
               <a:rPr lang="en-US" smtClean="0"/>
-              <a:t>3/13/19</a:t>
+              <a:t>3/27/19</a:t>
             </a:fld>
             <a:endParaRPr lang="en-US"/>
           </a:p>
@@ -1986,7 +1986,7 @@
           <a:p>
             <a:fld id="{04F1D4A2-813C-F741-B481-C92B3A596030}" type="datetimeFigureOut">
               <a:rPr lang="en-US" smtClean="0"/>
-              <a:t>3/13/19</a:t>
+              <a:t>3/27/19</a:t>
             </a:fld>
             <a:endParaRPr lang="en-US"/>
           </a:p>
@@ -2103,7 +2103,7 @@
           <a:p>
             <a:fld id="{04F1D4A2-813C-F741-B481-C92B3A596030}" type="datetimeFigureOut">
               <a:rPr lang="en-US" smtClean="0"/>
-              <a:t>3/13/19</a:t>
+              <a:t>3/27/19</a:t>
             </a:fld>
             <a:endParaRPr lang="en-US"/>
           </a:p>
@@ -2198,7 +2198,7 @@
           <a:p>
             <a:fld id="{04F1D4A2-813C-F741-B481-C92B3A596030}" type="datetimeFigureOut">
               <a:rPr lang="en-US" smtClean="0"/>
-              <a:t>3/13/19</a:t>
+              <a:t>3/27/19</a:t>
             </a:fld>
             <a:endParaRPr lang="en-US"/>
           </a:p>
@@ -2473,7 +2473,7 @@
           <a:p>
             <a:fld id="{04F1D4A2-813C-F741-B481-C92B3A596030}" type="datetimeFigureOut">
               <a:rPr lang="en-US" smtClean="0"/>
-              <a:t>3/13/19</a:t>
+              <a:t>3/27/19</a:t>
             </a:fld>
             <a:endParaRPr lang="en-US"/>
           </a:p>
@@ -2725,7 +2725,7 @@
           <a:p>
             <a:fld id="{04F1D4A2-813C-F741-B481-C92B3A596030}" type="datetimeFigureOut">
               <a:rPr lang="en-US" smtClean="0"/>
-              <a:t>3/13/19</a:t>
+              <a:t>3/27/19</a:t>
             </a:fld>
             <a:endParaRPr lang="en-US"/>
           </a:p>
@@ -2936,7 +2936,7 @@
           <a:p>
             <a:fld id="{04F1D4A2-813C-F741-B481-C92B3A596030}" type="datetimeFigureOut">
               <a:rPr lang="en-US" smtClean="0"/>
-              <a:t>3/13/19</a:t>
+              <a:t>3/27/19</a:t>
             </a:fld>
             <a:endParaRPr lang="en-US"/>
           </a:p>
@@ -6656,6 +6656,17 @@
               <a:rPr lang="en-US" b="1" dirty="0"/>
               <a:t>intro/spring/flyway</a:t>
             </a:r>
+          </a:p>
+          <a:p>
+            <a:r>
+              <a:rPr lang="en-US" b="1" dirty="0"/>
+              <a:t>intro/spring</a:t>
+            </a:r>
+            <a:r>
+              <a:rPr lang="en-US" b="1"/>
+              <a:t>/logging</a:t>
+            </a:r>
+            <a:endParaRPr lang="en-US" b="1" dirty="0"/>
           </a:p>
           <a:p>
             <a:r>

</xml_diff>

<commit_message>
replaced Travis in slides
</commit_message>
<xml_diff>
--- a/doc/intro/slides/lesson_11_ci.pptx
+++ b/doc/intro/slides/lesson_11_ci.pptx
@@ -5,7 +5,7 @@
     <p:sldMasterId id="2147483648" r:id="rId1"/>
   </p:sldMasterIdLst>
   <p:notesMasterIdLst>
-    <p:notesMasterId r:id="rId34"/>
+    <p:notesMasterId r:id="rId35"/>
   </p:notesMasterIdLst>
   <p:sldIdLst>
     <p:sldId id="256" r:id="rId2"/>
@@ -14,32 +14,33 @@
     <p:sldId id="273" r:id="rId5"/>
     <p:sldId id="274" r:id="rId6"/>
     <p:sldId id="275" r:id="rId7"/>
-    <p:sldId id="276" r:id="rId8"/>
-    <p:sldId id="283" r:id="rId9"/>
-    <p:sldId id="277" r:id="rId10"/>
-    <p:sldId id="278" r:id="rId11"/>
-    <p:sldId id="279" r:id="rId12"/>
-    <p:sldId id="280" r:id="rId13"/>
-    <p:sldId id="302" r:id="rId14"/>
-    <p:sldId id="296" r:id="rId15"/>
-    <p:sldId id="295" r:id="rId16"/>
-    <p:sldId id="297" r:id="rId17"/>
-    <p:sldId id="298" r:id="rId18"/>
-    <p:sldId id="299" r:id="rId19"/>
-    <p:sldId id="300" r:id="rId20"/>
-    <p:sldId id="301" r:id="rId21"/>
-    <p:sldId id="284" r:id="rId22"/>
-    <p:sldId id="281" r:id="rId23"/>
-    <p:sldId id="285" r:id="rId24"/>
-    <p:sldId id="286" r:id="rId25"/>
-    <p:sldId id="287" r:id="rId26"/>
-    <p:sldId id="288" r:id="rId27"/>
-    <p:sldId id="290" r:id="rId28"/>
-    <p:sldId id="289" r:id="rId29"/>
-    <p:sldId id="291" r:id="rId30"/>
-    <p:sldId id="292" r:id="rId31"/>
-    <p:sldId id="293" r:id="rId32"/>
-    <p:sldId id="271" r:id="rId33"/>
+    <p:sldId id="303" r:id="rId8"/>
+    <p:sldId id="304" r:id="rId9"/>
+    <p:sldId id="283" r:id="rId10"/>
+    <p:sldId id="277" r:id="rId11"/>
+    <p:sldId id="278" r:id="rId12"/>
+    <p:sldId id="279" r:id="rId13"/>
+    <p:sldId id="280" r:id="rId14"/>
+    <p:sldId id="302" r:id="rId15"/>
+    <p:sldId id="296" r:id="rId16"/>
+    <p:sldId id="295" r:id="rId17"/>
+    <p:sldId id="297" r:id="rId18"/>
+    <p:sldId id="298" r:id="rId19"/>
+    <p:sldId id="299" r:id="rId20"/>
+    <p:sldId id="300" r:id="rId21"/>
+    <p:sldId id="301" r:id="rId22"/>
+    <p:sldId id="284" r:id="rId23"/>
+    <p:sldId id="281" r:id="rId24"/>
+    <p:sldId id="285" r:id="rId25"/>
+    <p:sldId id="286" r:id="rId26"/>
+    <p:sldId id="287" r:id="rId27"/>
+    <p:sldId id="288" r:id="rId28"/>
+    <p:sldId id="290" r:id="rId29"/>
+    <p:sldId id="289" r:id="rId30"/>
+    <p:sldId id="291" r:id="rId31"/>
+    <p:sldId id="292" r:id="rId32"/>
+    <p:sldId id="293" r:id="rId33"/>
+    <p:sldId id="271" r:id="rId34"/>
   </p:sldIdLst>
   <p:sldSz cx="12192000" cy="6858000"/>
   <p:notesSz cx="6858000" cy="9144000"/>
@@ -228,7 +229,7 @@
           <a:p>
             <a:fld id="{9B5B52BA-3295-0343-9E28-A260A811DD10}" type="datetimeFigureOut">
               <a:rPr lang="en-US" smtClean="0"/>
-              <a:t>20-Dec-19</a:t>
+              <a:t>12/30/2020</a:t>
             </a:fld>
             <a:endParaRPr lang="en-US"/>
           </a:p>
@@ -624,7 +625,7 @@
           <a:p>
             <a:fld id="{04F1D4A2-813C-F741-B481-C92B3A596030}" type="datetimeFigureOut">
               <a:rPr lang="en-US" smtClean="0"/>
-              <a:t>20-Dec-19</a:t>
+              <a:t>12/30/2020</a:t>
             </a:fld>
             <a:endParaRPr lang="en-US"/>
           </a:p>
@@ -792,7 +793,7 @@
           <a:p>
             <a:fld id="{04F1D4A2-813C-F741-B481-C92B3A596030}" type="datetimeFigureOut">
               <a:rPr lang="en-US" smtClean="0"/>
-              <a:t>20-Dec-19</a:t>
+              <a:t>12/30/2020</a:t>
             </a:fld>
             <a:endParaRPr lang="en-US"/>
           </a:p>
@@ -970,7 +971,7 @@
           <a:p>
             <a:fld id="{04F1D4A2-813C-F741-B481-C92B3A596030}" type="datetimeFigureOut">
               <a:rPr lang="en-US" smtClean="0"/>
-              <a:t>20-Dec-19</a:t>
+              <a:t>12/30/2020</a:t>
             </a:fld>
             <a:endParaRPr lang="en-US"/>
           </a:p>
@@ -1149,7 +1150,7 @@
           <a:p>
             <a:fld id="{04F1D4A2-813C-F741-B481-C92B3A596030}" type="datetimeFigureOut">
               <a:rPr lang="en-US" smtClean="0"/>
-              <a:t>20-Dec-19</a:t>
+              <a:t>12/30/2020</a:t>
             </a:fld>
             <a:endParaRPr lang="en-US"/>
           </a:p>
@@ -1394,7 +1395,7 @@
           <a:p>
             <a:fld id="{04F1D4A2-813C-F741-B481-C92B3A596030}" type="datetimeFigureOut">
               <a:rPr lang="en-US" smtClean="0"/>
-              <a:t>20-Dec-19</a:t>
+              <a:t>12/30/2020</a:t>
             </a:fld>
             <a:endParaRPr lang="en-US"/>
           </a:p>
@@ -1623,7 +1624,7 @@
           <a:p>
             <a:fld id="{04F1D4A2-813C-F741-B481-C92B3A596030}" type="datetimeFigureOut">
               <a:rPr lang="en-US" smtClean="0"/>
-              <a:t>20-Dec-19</a:t>
+              <a:t>12/30/2020</a:t>
             </a:fld>
             <a:endParaRPr lang="en-US"/>
           </a:p>
@@ -1987,7 +1988,7 @@
           <a:p>
             <a:fld id="{04F1D4A2-813C-F741-B481-C92B3A596030}" type="datetimeFigureOut">
               <a:rPr lang="en-US" smtClean="0"/>
-              <a:t>20-Dec-19</a:t>
+              <a:t>12/30/2020</a:t>
             </a:fld>
             <a:endParaRPr lang="en-US"/>
           </a:p>
@@ -2104,7 +2105,7 @@
           <a:p>
             <a:fld id="{04F1D4A2-813C-F741-B481-C92B3A596030}" type="datetimeFigureOut">
               <a:rPr lang="en-US" smtClean="0"/>
-              <a:t>20-Dec-19</a:t>
+              <a:t>12/30/2020</a:t>
             </a:fld>
             <a:endParaRPr lang="en-US"/>
           </a:p>
@@ -2199,7 +2200,7 @@
           <a:p>
             <a:fld id="{04F1D4A2-813C-F741-B481-C92B3A596030}" type="datetimeFigureOut">
               <a:rPr lang="en-US" smtClean="0"/>
-              <a:t>20-Dec-19</a:t>
+              <a:t>12/30/2020</a:t>
             </a:fld>
             <a:endParaRPr lang="en-US"/>
           </a:p>
@@ -2474,7 +2475,7 @@
           <a:p>
             <a:fld id="{04F1D4A2-813C-F741-B481-C92B3A596030}" type="datetimeFigureOut">
               <a:rPr lang="en-US" smtClean="0"/>
-              <a:t>20-Dec-19</a:t>
+              <a:t>12/30/2020</a:t>
             </a:fld>
             <a:endParaRPr lang="en-US"/>
           </a:p>
@@ -2726,7 +2727,7 @@
           <a:p>
             <a:fld id="{04F1D4A2-813C-F741-B481-C92B3A596030}" type="datetimeFigureOut">
               <a:rPr lang="en-US" smtClean="0"/>
-              <a:t>20-Dec-19</a:t>
+              <a:t>12/30/2020</a:t>
             </a:fld>
             <a:endParaRPr lang="en-US"/>
           </a:p>
@@ -2937,7 +2938,7 @@
           <a:p>
             <a:fld id="{04F1D4A2-813C-F741-B481-C92B3A596030}" type="datetimeFigureOut">
               <a:rPr lang="en-US" smtClean="0"/>
-              <a:t>20-Dec-19</a:t>
+              <a:t>12/30/2020</a:t>
             </a:fld>
             <a:endParaRPr lang="en-US"/>
           </a:p>
@@ -3380,10 +3381,6 @@
             <a:br>
               <a:rPr lang="en-US" dirty="0"/>
             </a:br>
-            <a:r>
-              <a:rPr lang="en-US" dirty="0"/>
-              <a:t/>
-            </a:r>
             <a:br>
               <a:rPr lang="en-US" dirty="0"/>
             </a:br>
@@ -3475,7 +3472,7 @@
           <a:p>
             <a:r>
               <a:rPr lang="en-US" dirty="0"/>
-              <a:t>Issues with “update”</a:t>
+              <a:t>Database Migrations</a:t>
             </a:r>
           </a:p>
         </p:txBody>
@@ -3492,8 +3489,8 @@
         </p:nvSpPr>
         <p:spPr>
           <a:xfrm>
-            <a:off x="197963" y="1825624"/>
-            <a:ext cx="11745798" cy="4876833"/>
+            <a:off x="235670" y="1825624"/>
+            <a:ext cx="11821212" cy="4876833"/>
           </a:xfrm>
         </p:spPr>
         <p:txBody>
@@ -3502,63 +3499,50 @@
           <a:p>
             <a:r>
               <a:rPr lang="en-US" dirty="0"/>
-              <a:t>What if you are adding a new column in a </a:t>
+              <a:t>So far, by configuring “</a:t>
             </a:r>
             <a:r>
               <a:rPr lang="en-US" i="1" dirty="0"/>
-              <a:t>@Entity</a:t>
-            </a:r>
-            <a:r>
-              <a:rPr lang="en-US" dirty="0"/>
-              <a:t>?</a:t>
-            </a:r>
-          </a:p>
-          <a:p>
-            <a:r>
-              <a:rPr lang="en-US" dirty="0"/>
-              <a:t>What if you are changing the schema by refactoring some </a:t>
+              <a:t>create-drop</a:t>
+            </a:r>
+            <a:r>
+              <a:rPr lang="en-US" dirty="0"/>
+              <a:t>” in Hibernate, we were always recreating the schema of the database</a:t>
+            </a:r>
+          </a:p>
+          <a:p>
+            <a:r>
+              <a:rPr lang="en-US" dirty="0"/>
+              <a:t>This of course does not work in production… you do not want to delete your database at each application restart!!!</a:t>
+            </a:r>
+          </a:p>
+          <a:p>
+            <a:r>
+              <a:rPr lang="en-US" dirty="0"/>
+              <a:t>A possible (but not good) solution is to use “</a:t>
             </a:r>
             <a:r>
               <a:rPr lang="en-US" i="1" dirty="0"/>
-              <a:t>@Entity</a:t>
-            </a:r>
-            <a:r>
-              <a:rPr lang="en-US" dirty="0"/>
-              <a:t> classes (e.g., split one in two)?</a:t>
-            </a:r>
-          </a:p>
-          <a:p>
-            <a:r>
-              <a:rPr lang="en-US" dirty="0"/>
-              <a:t>What if by mistake/bug some </a:t>
-            </a:r>
-            <a:r>
-              <a:rPr lang="en-US" i="1" dirty="0"/>
-              <a:t>@Entity</a:t>
-            </a:r>
-            <a:r>
-              <a:rPr lang="en-US" dirty="0"/>
-              <a:t> classes are deleted?</a:t>
-            </a:r>
-          </a:p>
-          <a:p>
-            <a:r>
-              <a:rPr lang="en-US" i="1" dirty="0"/>
-              <a:t>What will happen to the current rows in such tables in the database?</a:t>
-            </a:r>
-          </a:p>
-          <a:p>
-            <a:endParaRPr lang="en-US" dirty="0"/>
-          </a:p>
-          <a:p>
-            <a:endParaRPr lang="en-US" dirty="0"/>
+              <a:t>update</a:t>
+            </a:r>
+            <a:r>
+              <a:rPr lang="en-US" dirty="0"/>
+              <a:t>”</a:t>
+            </a:r>
+          </a:p>
+          <a:p>
+            <a:pPr lvl="1"/>
+            <a:r>
+              <a:rPr lang="en-US" dirty="0"/>
+              <a:t>It will create a database (based on your entities) if not existing, otherwise will try to update the current one</a:t>
+            </a:r>
           </a:p>
         </p:txBody>
       </p:sp>
     </p:spTree>
     <p:extLst>
       <p:ext uri="{BB962C8B-B14F-4D97-AF65-F5344CB8AC3E}">
-        <p14:creationId xmlns:p14="http://schemas.microsoft.com/office/powerpoint/2010/main" val="3851250845"/>
+        <p14:creationId xmlns:p14="http://schemas.microsoft.com/office/powerpoint/2010/main" val="1467358015"/>
       </p:ext>
     </p:extLst>
   </p:cSld>
@@ -3602,7 +3586,7 @@
           <a:p>
             <a:r>
               <a:rPr lang="en-US" dirty="0"/>
-              <a:t>Solution</a:t>
+              <a:t>Issues with “update”</a:t>
             </a:r>
           </a:p>
         </p:txBody>
@@ -3619,8 +3603,8 @@
         </p:nvSpPr>
         <p:spPr>
           <a:xfrm>
-            <a:off x="179109" y="1825625"/>
-            <a:ext cx="11840066" cy="4867406"/>
+            <a:off x="197963" y="1825624"/>
+            <a:ext cx="11745798" cy="4876833"/>
           </a:xfrm>
         </p:spPr>
         <p:txBody>
@@ -3629,88 +3613,63 @@
           <a:p>
             <a:r>
               <a:rPr lang="en-US" dirty="0"/>
-              <a:t>The evolution of a database has to be handled with special tools</a:t>
-            </a:r>
-          </a:p>
-          <a:p>
+              <a:t>What if you are adding a new column in a </a:t>
+            </a:r>
             <a:r>
               <a:rPr lang="en-US" i="1" dirty="0"/>
-              <a:t>@Entity </a:t>
-            </a:r>
-            <a:r>
-              <a:rPr lang="en-US" dirty="0"/>
-              <a:t>classes should just map what is currently in the database, not driving its schema creation/update</a:t>
-            </a:r>
-          </a:p>
-          <a:p>
-            <a:pPr lvl="1"/>
-            <a:r>
-              <a:rPr lang="en-US" dirty="0"/>
-              <a:t>apart from the very beginning before doing a first production release</a:t>
-            </a:r>
-          </a:p>
-          <a:p>
-            <a:r>
-              <a:rPr lang="en-US" dirty="0"/>
-              <a:t>No “</a:t>
+              <a:t>@Entity</a:t>
+            </a:r>
+            <a:r>
+              <a:rPr lang="en-US" dirty="0"/>
+              <a:t>?</a:t>
+            </a:r>
+          </a:p>
+          <a:p>
+            <a:r>
+              <a:rPr lang="en-US" dirty="0"/>
+              <a:t>What if you are changing the schema by refactoring some </a:t>
             </a:r>
             <a:r>
               <a:rPr lang="en-US" i="1" dirty="0"/>
-              <a:t>create-drop</a:t>
-            </a:r>
-            <a:r>
-              <a:rPr lang="en-US" dirty="0"/>
-              <a:t>”, nor “</a:t>
+              <a:t>@Entity</a:t>
+            </a:r>
+            <a:r>
+              <a:rPr lang="en-US" dirty="0"/>
+              <a:t> classes (e.g., split one in two)?</a:t>
+            </a:r>
+          </a:p>
+          <a:p>
+            <a:r>
+              <a:rPr lang="en-US" dirty="0"/>
+              <a:t>What if by mistake/bug some </a:t>
             </a:r>
             <a:r>
               <a:rPr lang="en-US" i="1" dirty="0"/>
-              <a:t>update</a:t>
-            </a:r>
-            <a:r>
-              <a:rPr lang="en-US" dirty="0"/>
-              <a:t>”, but rather “</a:t>
-            </a:r>
-            <a:r>
-              <a:rPr lang="en-US" b="1" dirty="0"/>
-              <a:t>validate</a:t>
-            </a:r>
-            <a:r>
-              <a:rPr lang="en-US" dirty="0"/>
-              <a:t>”</a:t>
-            </a:r>
-          </a:p>
-          <a:p>
-            <a:pPr lvl="1"/>
-            <a:r>
-              <a:rPr lang="en-US" dirty="0"/>
-              <a:t>throw exception if @Entity classes do not match what in database schema</a:t>
-            </a:r>
-          </a:p>
-          <a:p>
-            <a:r>
-              <a:rPr lang="en-US" dirty="0"/>
-              <a:t>Tools to use: </a:t>
-            </a:r>
+              <a:t>@Entity</a:t>
+            </a:r>
+            <a:r>
+              <a:rPr lang="en-US" dirty="0"/>
+              <a:t> classes are deleted?</a:t>
+            </a:r>
+          </a:p>
+          <a:p>
             <a:r>
               <a:rPr lang="en-US" i="1" dirty="0"/>
-              <a:t>Flyway</a:t>
-            </a:r>
-            <a:r>
-              <a:rPr lang="en-US" dirty="0"/>
-              <a:t> or </a:t>
-            </a:r>
-            <a:r>
-              <a:rPr lang="en-US" i="1" dirty="0" err="1"/>
-              <a:t>Liquibase</a:t>
-            </a:r>
-            <a:endParaRPr lang="en-US" i="1" dirty="0"/>
+              <a:t>What will happen to the current rows in such tables in the database?</a:t>
+            </a:r>
+          </a:p>
+          <a:p>
+            <a:endParaRPr lang="en-US" dirty="0"/>
+          </a:p>
+          <a:p>
+            <a:endParaRPr lang="en-US" dirty="0"/>
           </a:p>
         </p:txBody>
       </p:sp>
     </p:spTree>
     <p:extLst>
       <p:ext uri="{BB962C8B-B14F-4D97-AF65-F5344CB8AC3E}">
-        <p14:creationId xmlns:p14="http://schemas.microsoft.com/office/powerpoint/2010/main" val="868343760"/>
+        <p14:creationId xmlns:p14="http://schemas.microsoft.com/office/powerpoint/2010/main" val="3851250845"/>
       </p:ext>
     </p:extLst>
   </p:cSld>
@@ -3754,7 +3713,7 @@
           <a:p>
             <a:r>
               <a:rPr lang="en-US" dirty="0"/>
-              <a:t>Flyway</a:t>
+              <a:t>Solution</a:t>
             </a:r>
           </a:p>
         </p:txBody>
@@ -3771,8 +3730,8 @@
         </p:nvSpPr>
         <p:spPr>
           <a:xfrm>
-            <a:off x="188536" y="1825625"/>
-            <a:ext cx="11887200" cy="4942820"/>
+            <a:off x="179109" y="1825625"/>
+            <a:ext cx="11840066" cy="4867406"/>
           </a:xfrm>
         </p:spPr>
         <p:txBody>
@@ -3781,72 +3740,88 @@
           <a:p>
             <a:r>
               <a:rPr lang="en-US" dirty="0"/>
-              <a:t>All operations are done on SQL files, by writing SQL commands</a:t>
-            </a:r>
-          </a:p>
-          <a:p>
-            <a:r>
-              <a:rPr lang="en-US" dirty="0"/>
-              <a:t>Each migration file has a version number, in increasing order</a:t>
-            </a:r>
-          </a:p>
-          <a:p>
+              <a:t>The evolution of a database has to be handled with special tools</a:t>
+            </a:r>
+          </a:p>
+          <a:p>
+            <a:r>
+              <a:rPr lang="en-US" i="1" dirty="0"/>
+              <a:t>@Entity </a:t>
+            </a:r>
+            <a:r>
+              <a:rPr lang="en-US" dirty="0"/>
+              <a:t>classes should just map what is currently in the database, not driving its schema creation/update</a:t>
+            </a:r>
+          </a:p>
+          <a:p>
+            <a:pPr lvl="1"/>
+            <a:r>
+              <a:rPr lang="en-US" dirty="0"/>
+              <a:t>apart from the very beginning before doing a first production release</a:t>
+            </a:r>
+          </a:p>
+          <a:p>
+            <a:r>
+              <a:rPr lang="en-US" dirty="0"/>
+              <a:t>No “</a:t>
+            </a:r>
+            <a:r>
+              <a:rPr lang="en-US" i="1" dirty="0"/>
+              <a:t>create-drop</a:t>
+            </a:r>
+            <a:r>
+              <a:rPr lang="en-US" dirty="0"/>
+              <a:t>”, nor “</a:t>
+            </a:r>
+            <a:r>
+              <a:rPr lang="en-US" i="1" dirty="0"/>
+              <a:t>update</a:t>
+            </a:r>
+            <a:r>
+              <a:rPr lang="en-US" dirty="0"/>
+              <a:t>”, but rather “</a:t>
+            </a:r>
+            <a:r>
+              <a:rPr lang="en-US" b="1" dirty="0"/>
+              <a:t>validate</a:t>
+            </a:r>
+            <a:r>
+              <a:rPr lang="en-US" dirty="0"/>
+              <a:t>”</a:t>
+            </a:r>
+          </a:p>
+          <a:p>
+            <a:pPr lvl="1"/>
+            <a:r>
+              <a:rPr lang="en-US" dirty="0"/>
+              <a:t>throw exception if @Entity classes do not match what in database schema</a:t>
+            </a:r>
+          </a:p>
+          <a:p>
+            <a:r>
+              <a:rPr lang="en-US" dirty="0"/>
+              <a:t>Tools to use: </a:t>
+            </a:r>
             <a:r>
               <a:rPr lang="en-US" i="1" dirty="0"/>
               <a:t>Flyway</a:t>
             </a:r>
             <a:r>
               <a:rPr lang="en-US" dirty="0"/>
-              <a:t> will check if any new migration has not been applied yet, and apply them otherwise, just </a:t>
-            </a:r>
-            <a:r>
-              <a:rPr lang="en-US" i="1" dirty="0"/>
-              <a:t>once</a:t>
-            </a:r>
-          </a:p>
-          <a:p>
-            <a:r>
-              <a:rPr lang="en-US" dirty="0"/>
-              <a:t>It creates its own table to keep track of which migrations have been applied so far on a database</a:t>
-            </a:r>
-          </a:p>
-          <a:p>
-            <a:r>
-              <a:rPr lang="en-US" dirty="0" err="1"/>
-              <a:t>SpringBoot</a:t>
-            </a:r>
-            <a:r>
-              <a:rPr lang="en-US" dirty="0"/>
-              <a:t> </a:t>
-            </a:r>
-            <a:r>
-              <a:rPr lang="en-US" i="1" dirty="0"/>
-              <a:t>automatically</a:t>
-            </a:r>
-            <a:r>
-              <a:rPr lang="en-US" dirty="0"/>
-              <a:t> runs </a:t>
-            </a:r>
-            <a:r>
-              <a:rPr lang="en-US" i="1" dirty="0"/>
-              <a:t>Flyway</a:t>
-            </a:r>
-            <a:r>
-              <a:rPr lang="en-US" dirty="0"/>
-              <a:t> if found on </a:t>
-            </a:r>
-            <a:r>
-              <a:rPr lang="en-US" dirty="0" err="1"/>
-              <a:t>classpath</a:t>
-            </a:r>
-            <a:endParaRPr lang="en-US" dirty="0"/>
+              <a:t> or </a:t>
+            </a:r>
+            <a:r>
+              <a:rPr lang="en-US" i="1" dirty="0" err="1"/>
+              <a:t>Liquibase</a:t>
+            </a:r>
+            <a:endParaRPr lang="en-US" i="1" dirty="0"/>
           </a:p>
         </p:txBody>
       </p:sp>
     </p:spTree>
     <p:extLst>
       <p:ext uri="{BB962C8B-B14F-4D97-AF65-F5344CB8AC3E}">
-        <p14:creationId xmlns:p14="http://schemas.microsoft.com/office/powerpoint/2010/main" val="3643780216"/>
+        <p14:creationId xmlns:p14="http://schemas.microsoft.com/office/powerpoint/2010/main" val="868343760"/>
       </p:ext>
     </p:extLst>
   </p:cSld>
@@ -3883,6 +3858,142 @@
             <p:ph type="title"/>
           </p:nvPr>
         </p:nvSpPr>
+        <p:spPr/>
+        <p:txBody>
+          <a:bodyPr/>
+          <a:lstStyle/>
+          <a:p>
+            <a:r>
+              <a:rPr lang="en-US" dirty="0"/>
+              <a:t>Flyway</a:t>
+            </a:r>
+          </a:p>
+        </p:txBody>
+      </p:sp>
+      <p:sp>
+        <p:nvSpPr>
+          <p:cNvPr id="3" name="Content Placeholder 2"/>
+          <p:cNvSpPr>
+            <a:spLocks noGrp="1"/>
+          </p:cNvSpPr>
+          <p:nvPr>
+            <p:ph idx="1"/>
+          </p:nvPr>
+        </p:nvSpPr>
+        <p:spPr>
+          <a:xfrm>
+            <a:off x="188536" y="1825625"/>
+            <a:ext cx="11887200" cy="4942820"/>
+          </a:xfrm>
+        </p:spPr>
+        <p:txBody>
+          <a:bodyPr/>
+          <a:lstStyle/>
+          <a:p>
+            <a:r>
+              <a:rPr lang="en-US" dirty="0"/>
+              <a:t>All operations are done on SQL files, by writing SQL commands</a:t>
+            </a:r>
+          </a:p>
+          <a:p>
+            <a:r>
+              <a:rPr lang="en-US" dirty="0"/>
+              <a:t>Each migration file has a version number, in increasing order</a:t>
+            </a:r>
+          </a:p>
+          <a:p>
+            <a:r>
+              <a:rPr lang="en-US" i="1" dirty="0"/>
+              <a:t>Flyway</a:t>
+            </a:r>
+            <a:r>
+              <a:rPr lang="en-US" dirty="0"/>
+              <a:t> will check if any new migration has not been applied yet, and apply them otherwise, just </a:t>
+            </a:r>
+            <a:r>
+              <a:rPr lang="en-US" i="1" dirty="0"/>
+              <a:t>once</a:t>
+            </a:r>
+          </a:p>
+          <a:p>
+            <a:r>
+              <a:rPr lang="en-US" dirty="0"/>
+              <a:t>It creates its own table to keep track of which migrations have been applied so far on a database</a:t>
+            </a:r>
+          </a:p>
+          <a:p>
+            <a:r>
+              <a:rPr lang="en-US" dirty="0" err="1"/>
+              <a:t>SpringBoot</a:t>
+            </a:r>
+            <a:r>
+              <a:rPr lang="en-US" dirty="0"/>
+              <a:t> </a:t>
+            </a:r>
+            <a:r>
+              <a:rPr lang="en-US" i="1" dirty="0"/>
+              <a:t>automatically</a:t>
+            </a:r>
+            <a:r>
+              <a:rPr lang="en-US" dirty="0"/>
+              <a:t> runs </a:t>
+            </a:r>
+            <a:r>
+              <a:rPr lang="en-US" i="1" dirty="0"/>
+              <a:t>Flyway</a:t>
+            </a:r>
+            <a:r>
+              <a:rPr lang="en-US" dirty="0"/>
+              <a:t> if found on </a:t>
+            </a:r>
+            <a:r>
+              <a:rPr lang="en-US" dirty="0" err="1"/>
+              <a:t>classpath</a:t>
+            </a:r>
+            <a:endParaRPr lang="en-US" dirty="0"/>
+          </a:p>
+        </p:txBody>
+      </p:sp>
+    </p:spTree>
+    <p:extLst>
+      <p:ext uri="{BB962C8B-B14F-4D97-AF65-F5344CB8AC3E}">
+        <p14:creationId xmlns:p14="http://schemas.microsoft.com/office/powerpoint/2010/main" val="3643780216"/>
+      </p:ext>
+    </p:extLst>
+  </p:cSld>
+  <p:clrMapOvr>
+    <a:masterClrMapping/>
+  </p:clrMapOvr>
+</p:sld>
+</file>
+
+<file path=ppt/slides/slide14.xml><?xml version="1.0" encoding="utf-8"?>
+<p:sld xmlns:a="http://schemas.openxmlformats.org/drawingml/2006/main" xmlns:r="http://schemas.openxmlformats.org/officeDocument/2006/relationships" xmlns:p="http://schemas.openxmlformats.org/presentationml/2006/main">
+  <p:cSld>
+    <p:spTree>
+      <p:nvGrpSpPr>
+        <p:cNvPr id="1" name=""/>
+        <p:cNvGrpSpPr/>
+        <p:nvPr/>
+      </p:nvGrpSpPr>
+      <p:grpSpPr>
+        <a:xfrm>
+          <a:off x="0" y="0"/>
+          <a:ext cx="0" cy="0"/>
+          <a:chOff x="0" y="0"/>
+          <a:chExt cx="0" cy="0"/>
+        </a:xfrm>
+      </p:grpSpPr>
+      <p:sp>
+        <p:nvSpPr>
+          <p:cNvPr id="2" name="Title 1"/>
+          <p:cNvSpPr>
+            <a:spLocks noGrp="1"/>
+          </p:cNvSpPr>
+          <p:nvPr>
+            <p:ph type="title"/>
+          </p:nvPr>
+        </p:nvSpPr>
         <p:spPr>
           <a:xfrm>
             <a:off x="759823" y="77742"/>
@@ -3898,11 +4009,11 @@
               <a:t>Folder </a:t>
             </a:r>
             <a:r>
-              <a:rPr lang="en-US" b="1" dirty="0" err="1" smtClean="0"/>
+              <a:rPr lang="en-US" b="1" dirty="0" err="1"/>
               <a:t>db</a:t>
             </a:r>
             <a:r>
-              <a:rPr lang="en-US" b="1" dirty="0" smtClean="0"/>
+              <a:rPr lang="en-US" b="1" dirty="0"/>
               <a:t>/migration</a:t>
             </a:r>
             <a:endParaRPr lang="en-US" dirty="0"/>
@@ -3930,86 +4041,85 @@
           <a:lstStyle/>
           <a:p>
             <a:r>
-              <a:rPr lang="en-US" dirty="0" smtClean="0"/>
+              <a:rPr lang="en-US" dirty="0"/>
               <a:t>Migration files in the form </a:t>
             </a:r>
             <a:r>
-              <a:rPr lang="en-US" i="1" dirty="0" err="1" smtClean="0"/>
+              <a:rPr lang="en-US" i="1" dirty="0" err="1"/>
               <a:t>Vx.y_someName.sql</a:t>
             </a:r>
-            <a:endParaRPr lang="en-US" i="1" dirty="0" smtClean="0"/>
-          </a:p>
-          <a:p>
-            <a:r>
-              <a:rPr lang="en-US" dirty="0" smtClean="0"/>
+            <a:endParaRPr lang="en-US" i="1" dirty="0"/>
+          </a:p>
+          <a:p>
+            <a:r>
+              <a:rPr lang="en-US" dirty="0"/>
               <a:t>Executed in version order, </a:t>
             </a:r>
             <a:r>
-              <a:rPr lang="en-US" dirty="0" err="1" smtClean="0"/>
+              <a:rPr lang="en-US" dirty="0" err="1"/>
               <a:t>eg</a:t>
             </a:r>
             <a:r>
-              <a:rPr lang="en-US" dirty="0" smtClean="0"/>
+              <a:rPr lang="en-US" dirty="0"/>
               <a:t> </a:t>
             </a:r>
             <a:r>
-              <a:rPr lang="en-US" i="1" dirty="0" smtClean="0"/>
+              <a:rPr lang="en-US" i="1" dirty="0"/>
               <a:t>V1.0</a:t>
             </a:r>
             <a:r>
-              <a:rPr lang="en-US" dirty="0" smtClean="0"/>
+              <a:rPr lang="en-US" dirty="0"/>
               <a:t> executed before </a:t>
             </a:r>
             <a:r>
-              <a:rPr lang="en-US" i="1" dirty="0" smtClean="0"/>
+              <a:rPr lang="en-US" i="1" dirty="0"/>
               <a:t>V1.1</a:t>
             </a:r>
           </a:p>
           <a:p>
             <a:r>
-              <a:rPr lang="en-US" dirty="0" smtClean="0"/>
+              <a:rPr lang="en-US" dirty="0"/>
               <a:t>Recall that IntelliJ will represent folders inside </a:t>
             </a:r>
             <a:r>
-              <a:rPr lang="en-US" b="1" dirty="0" smtClean="0"/>
+              <a:rPr lang="en-US" b="1" dirty="0"/>
               <a:t>/resources</a:t>
             </a:r>
             <a:r>
-              <a:rPr lang="en-US" dirty="0" smtClean="0"/>
+              <a:rPr lang="en-US" dirty="0"/>
               <a:t> as packages</a:t>
             </a:r>
           </a:p>
           <a:p>
             <a:pPr lvl="1"/>
             <a:r>
-              <a:rPr lang="en-US" dirty="0" err="1" smtClean="0"/>
+              <a:rPr lang="en-US" dirty="0" err="1"/>
               <a:t>eg</a:t>
             </a:r>
             <a:r>
-              <a:rPr lang="en-US" dirty="0" smtClean="0"/>
+              <a:rPr lang="en-US" dirty="0"/>
               <a:t>, there is no “</a:t>
             </a:r>
             <a:r>
-              <a:rPr lang="en-US" i="1" dirty="0" err="1" smtClean="0"/>
+              <a:rPr lang="en-US" i="1" dirty="0" err="1"/>
               <a:t>db.migration</a:t>
             </a:r>
             <a:r>
-              <a:rPr lang="en-US" dirty="0" smtClean="0"/>
+              <a:rPr lang="en-US" dirty="0"/>
               <a:t>” folder, but rather “</a:t>
             </a:r>
             <a:r>
-              <a:rPr lang="en-US" i="1" dirty="0" err="1" smtClean="0"/>
+              <a:rPr lang="en-US" i="1" dirty="0" err="1"/>
               <a:t>db</a:t>
             </a:r>
             <a:r>
-              <a:rPr lang="en-US" i="1" dirty="0" smtClean="0"/>
+              <a:rPr lang="en-US" i="1" dirty="0"/>
               <a:t>/migration</a:t>
             </a:r>
             <a:r>
-              <a:rPr lang="en-US" dirty="0" smtClean="0"/>
+              <a:rPr lang="en-US" dirty="0"/>
               <a:t>”</a:t>
             </a:r>
-            <a:endParaRPr lang="en-US" dirty="0"/>
           </a:p>
         </p:txBody>
       </p:sp>
@@ -4050,64 +4160,6 @@
 </p:sld>
 </file>
 
-<file path=ppt/slides/slide14.xml><?xml version="1.0" encoding="utf-8"?>
-<p:sld xmlns:a="http://schemas.openxmlformats.org/drawingml/2006/main" xmlns:r="http://schemas.openxmlformats.org/officeDocument/2006/relationships" xmlns:p="http://schemas.openxmlformats.org/presentationml/2006/main">
-  <p:cSld>
-    <p:spTree>
-      <p:nvGrpSpPr>
-        <p:cNvPr id="1" name=""/>
-        <p:cNvGrpSpPr/>
-        <p:nvPr/>
-      </p:nvGrpSpPr>
-      <p:grpSpPr>
-        <a:xfrm>
-          <a:off x="0" y="0"/>
-          <a:ext cx="0" cy="0"/>
-          <a:chOff x="0" y="0"/>
-          <a:chExt cx="0" cy="0"/>
-        </a:xfrm>
-      </p:grpSpPr>
-      <p:sp>
-        <p:nvSpPr>
-          <p:cNvPr id="2" name="Title 1">
-            <a:extLst>
-              <a:ext uri="{FF2B5EF4-FFF2-40B4-BE49-F238E27FC236}">
-                <a16:creationId xmlns:a16="http://schemas.microsoft.com/office/drawing/2014/main" id="{B4D6E163-79C8-974B-8F60-5FE2196AD815}"/>
-              </a:ext>
-            </a:extLst>
-          </p:cNvPr>
-          <p:cNvSpPr>
-            <a:spLocks noGrp="1"/>
-          </p:cNvSpPr>
-          <p:nvPr>
-            <p:ph type="title"/>
-          </p:nvPr>
-        </p:nvSpPr>
-        <p:spPr/>
-        <p:txBody>
-          <a:bodyPr/>
-          <a:lstStyle/>
-          <a:p>
-            <a:r>
-              <a:rPr lang="en-US" dirty="0"/>
-              <a:t>Logging</a:t>
-            </a:r>
-          </a:p>
-        </p:txBody>
-      </p:sp>
-    </p:spTree>
-    <p:extLst>
-      <p:ext uri="{BB962C8B-B14F-4D97-AF65-F5344CB8AC3E}">
-        <p14:creationId xmlns:p14="http://schemas.microsoft.com/office/powerpoint/2010/main" val="2266761520"/>
-      </p:ext>
-    </p:extLst>
-  </p:cSld>
-  <p:clrMapOvr>
-    <a:masterClrMapping/>
-  </p:clrMapOvr>
-</p:sld>
-</file>
-
 <file path=ppt/slides/slide15.xml><?xml version="1.0" encoding="utf-8"?>
 <p:sld xmlns:a="http://schemas.openxmlformats.org/drawingml/2006/main" xmlns:r="http://schemas.openxmlformats.org/officeDocument/2006/relationships" xmlns:p="http://schemas.openxmlformats.org/presentationml/2006/main">
   <p:cSld>
@@ -4130,7 +4182,7 @@
           <p:cNvPr id="2" name="Title 1">
             <a:extLst>
               <a:ext uri="{FF2B5EF4-FFF2-40B4-BE49-F238E27FC236}">
-                <a16:creationId xmlns:a16="http://schemas.microsoft.com/office/drawing/2014/main" id="{948D2D41-5B69-224D-827E-A126080E8408}"/>
+                <a16:creationId xmlns:a16="http://schemas.microsoft.com/office/drawing/2014/main" id="{B4D6E163-79C8-974B-8F60-5FE2196AD815}"/>
               </a:ext>
             </a:extLst>
           </p:cNvPr>
@@ -4141,80 +4193,14 @@
             <p:ph type="title"/>
           </p:nvPr>
         </p:nvSpPr>
-        <p:spPr>
-          <a:xfrm>
-            <a:off x="224725" y="365125"/>
-            <a:ext cx="11801959" cy="1325563"/>
-          </a:xfrm>
-        </p:spPr>
-        <p:txBody>
-          <a:bodyPr/>
-          <a:lstStyle/>
-          <a:p>
-            <a:r>
-              <a:rPr lang="en-US" dirty="0"/>
-              <a:t>Log Statements</a:t>
-            </a:r>
-          </a:p>
-        </p:txBody>
-      </p:sp>
-      <p:sp>
-        <p:nvSpPr>
-          <p:cNvPr id="3" name="Content Placeholder 2">
-            <a:extLst>
-              <a:ext uri="{FF2B5EF4-FFF2-40B4-BE49-F238E27FC236}">
-                <a16:creationId xmlns:a16="http://schemas.microsoft.com/office/drawing/2014/main" id="{C70C83C6-23F2-D447-9A7C-6B61AC308188}"/>
-              </a:ext>
-            </a:extLst>
-          </p:cNvPr>
-          <p:cNvSpPr>
-            <a:spLocks noGrp="1"/>
-          </p:cNvSpPr>
-          <p:nvPr>
-            <p:ph idx="1"/>
-          </p:nvPr>
-        </p:nvSpPr>
-        <p:spPr>
-          <a:xfrm>
-            <a:off x="224725" y="1825625"/>
-            <a:ext cx="11801960" cy="4900640"/>
-          </a:xfrm>
-        </p:spPr>
-        <p:txBody>
-          <a:bodyPr>
-            <a:normAutofit lnSpcReduction="10000"/>
-          </a:bodyPr>
-          <a:lstStyle/>
-          <a:p>
-            <a:r>
-              <a:rPr lang="en-US" dirty="0"/>
-              <a:t>It is important to keep track of what is going on in an application</a:t>
-            </a:r>
-          </a:p>
-          <a:p>
-            <a:r>
-              <a:rPr lang="en-US" dirty="0"/>
-              <a:t>Especially important when there are bugs, and you want to save the stack-trace of the exceptions</a:t>
-            </a:r>
-          </a:p>
-          <a:p>
-            <a:pPr lvl="1"/>
-            <a:r>
-              <a:rPr lang="en-US" dirty="0"/>
-              <a:t>needed for example to help debugging such possible bugs</a:t>
-            </a:r>
-          </a:p>
-          <a:p>
-            <a:r>
-              <a:rPr lang="en-US" dirty="0"/>
-              <a:t>Logging is a bit tricky, and so there are several libraries that help doing it</a:t>
-            </a:r>
-          </a:p>
-          <a:p>
-            <a:pPr lvl="1"/>
-            <a:r>
-              <a:rPr lang="en-US" dirty="0"/>
-              <a:t>e.g., because doing I/O, it can impact the JIT compiler… and you could have optimizations in which a logging framework writes on a buffer, and then another thread reads from it to do the I/O…</a:t>
+        <p:spPr/>
+        <p:txBody>
+          <a:bodyPr/>
+          <a:lstStyle/>
+          <a:p>
+            <a:r>
+              <a:rPr lang="en-US" dirty="0"/>
+              <a:t>Logging</a:t>
             </a:r>
           </a:p>
         </p:txBody>
@@ -4222,7 +4208,7 @@
     </p:spTree>
     <p:extLst>
       <p:ext uri="{BB962C8B-B14F-4D97-AF65-F5344CB8AC3E}">
-        <p14:creationId xmlns:p14="http://schemas.microsoft.com/office/powerpoint/2010/main" val="3575741525"/>
+        <p14:creationId xmlns:p14="http://schemas.microsoft.com/office/powerpoint/2010/main" val="2266761520"/>
       </p:ext>
     </p:extLst>
   </p:cSld>
@@ -4254,7 +4240,7 @@
           <p:cNvPr id="2" name="Title 1">
             <a:extLst>
               <a:ext uri="{FF2B5EF4-FFF2-40B4-BE49-F238E27FC236}">
-                <a16:creationId xmlns:a16="http://schemas.microsoft.com/office/drawing/2014/main" id="{34ADBF1B-B757-364C-960A-0F97509EDCC6}"/>
+                <a16:creationId xmlns:a16="http://schemas.microsoft.com/office/drawing/2014/main" id="{948D2D41-5B69-224D-827E-A126080E8408}"/>
               </a:ext>
             </a:extLst>
           </p:cNvPr>
@@ -4265,20 +4251,20 @@
             <p:ph type="title"/>
           </p:nvPr>
         </p:nvSpPr>
-        <p:spPr/>
-        <p:txBody>
-          <a:bodyPr/>
-          <a:lstStyle/>
-          <a:p>
-            <a:r>
-              <a:rPr lang="en-US" dirty="0"/>
-              <a:t>SLF4J and </a:t>
-            </a:r>
-            <a:r>
-              <a:rPr lang="en-US" dirty="0" err="1"/>
-              <a:t>Logback</a:t>
-            </a:r>
-            <a:endParaRPr lang="en-US" dirty="0"/>
+        <p:spPr>
+          <a:xfrm>
+            <a:off x="224725" y="365125"/>
+            <a:ext cx="11801959" cy="1325563"/>
+          </a:xfrm>
+        </p:spPr>
+        <p:txBody>
+          <a:bodyPr/>
+          <a:lstStyle/>
+          <a:p>
+            <a:r>
+              <a:rPr lang="en-US" dirty="0"/>
+              <a:t>Log Statements</a:t>
+            </a:r>
           </a:p>
         </p:txBody>
       </p:sp>
@@ -4287,7 +4273,7 @@
           <p:cNvPr id="3" name="Content Placeholder 2">
             <a:extLst>
               <a:ext uri="{FF2B5EF4-FFF2-40B4-BE49-F238E27FC236}">
-                <a16:creationId xmlns:a16="http://schemas.microsoft.com/office/drawing/2014/main" id="{92BFC660-58ED-844C-ABEB-D022ABA06FDF}"/>
+                <a16:creationId xmlns:a16="http://schemas.microsoft.com/office/drawing/2014/main" id="{C70C83C6-23F2-D447-9A7C-6B61AC308188}"/>
               </a:ext>
             </a:extLst>
           </p:cNvPr>
@@ -4300,114 +4286,45 @@
         </p:nvSpPr>
         <p:spPr>
           <a:xfrm>
-            <a:off x="263471" y="1825625"/>
-            <a:ext cx="11724468" cy="4916138"/>
+            <a:off x="224725" y="1825625"/>
+            <a:ext cx="11801960" cy="4900640"/>
           </a:xfrm>
         </p:spPr>
         <p:txBody>
           <a:bodyPr>
-            <a:normAutofit fontScale="92500" lnSpcReduction="10000"/>
+            <a:normAutofit lnSpcReduction="10000"/>
           </a:bodyPr>
           <a:lstStyle/>
           <a:p>
             <a:r>
-              <a:rPr lang="en-US" i="1" dirty="0"/>
-              <a:t>SLF4J</a:t>
-            </a:r>
-            <a:r>
-              <a:rPr lang="en-US" dirty="0"/>
-              <a:t> is the most common library for logging in Java</a:t>
-            </a:r>
-          </a:p>
-          <a:p>
-            <a:r>
-              <a:rPr lang="en-US" dirty="0"/>
-              <a:t>It is a “</a:t>
-            </a:r>
-            <a:r>
-              <a:rPr lang="en-US" i="1" dirty="0"/>
-              <a:t>facade</a:t>
-            </a:r>
-            <a:r>
-              <a:rPr lang="en-US" dirty="0"/>
-              <a:t>”, i.e., set of base classes/interfaces, where the actual implementation is in a different library, and it is abstracted away</a:t>
+              <a:rPr lang="en-US" dirty="0"/>
+              <a:t>It is important to keep track of what is going on in an application</a:t>
+            </a:r>
+          </a:p>
+          <a:p>
+            <a:r>
+              <a:rPr lang="en-US" dirty="0"/>
+              <a:t>Especially important when there are bugs, and you want to save the stack-trace of the exceptions</a:t>
             </a:r>
           </a:p>
           <a:p>
             <a:pPr lvl="1"/>
             <a:r>
               <a:rPr lang="en-US" dirty="0"/>
-              <a:t>i.e., you only import classes from SLF4J in your code</a:t>
-            </a:r>
-          </a:p>
-          <a:p>
-            <a:r>
-              <a:rPr lang="en-US" dirty="0"/>
-              <a:t>Can use different logging framework bindings for SLF4J, where </a:t>
-            </a:r>
-            <a:r>
-              <a:rPr lang="en-US" i="1" dirty="0" err="1"/>
-              <a:t>Logback</a:t>
-            </a:r>
-            <a:r>
-              <a:rPr lang="en-US" dirty="0"/>
-              <a:t> is the most popular</a:t>
+              <a:t>needed for example to help debugging such possible bugs</a:t>
+            </a:r>
+          </a:p>
+          <a:p>
+            <a:r>
+              <a:rPr lang="en-US" dirty="0"/>
+              <a:t>Logging is a bit tricky, and so there are several libraries that help doing it</a:t>
             </a:r>
           </a:p>
           <a:p>
             <a:pPr lvl="1"/>
             <a:r>
               <a:rPr lang="en-US" dirty="0"/>
-              <a:t>for example, think of </a:t>
-            </a:r>
-            <a:r>
-              <a:rPr lang="en-US" i="1" dirty="0"/>
-              <a:t>SLF4J</a:t>
-            </a:r>
-            <a:r>
-              <a:rPr lang="en-US" dirty="0"/>
-              <a:t> as </a:t>
-            </a:r>
-            <a:r>
-              <a:rPr lang="en-US" i="1" dirty="0"/>
-              <a:t>JPA</a:t>
-            </a:r>
-            <a:r>
-              <a:rPr lang="en-US" dirty="0"/>
-              <a:t>, and </a:t>
-            </a:r>
-            <a:r>
-              <a:rPr lang="en-US" i="1" dirty="0" err="1"/>
-              <a:t>Logback</a:t>
-            </a:r>
-            <a:r>
-              <a:rPr lang="en-US" dirty="0"/>
-              <a:t> as </a:t>
-            </a:r>
-            <a:r>
-              <a:rPr lang="en-US" i="1" dirty="0"/>
-              <a:t>Hibernate</a:t>
-            </a:r>
-          </a:p>
-          <a:p>
-            <a:r>
-              <a:rPr lang="en-US" dirty="0"/>
-              <a:t>Many third-party libraries use SLF4J, but will not provide a binding</a:t>
-            </a:r>
-          </a:p>
-          <a:p>
-            <a:pPr lvl="1"/>
-            <a:r>
-              <a:rPr lang="en-US" dirty="0"/>
-              <a:t>this enables you to have a single binding for your whole app, including the 3</a:t>
-            </a:r>
-            <a:r>
-              <a:rPr lang="en-US" baseline="30000" dirty="0"/>
-              <a:t>rd</a:t>
-            </a:r>
-            <a:r>
-              <a:rPr lang="en-US" dirty="0"/>
-              <a:t>-party libraries</a:t>
+              <a:t>e.g., because doing I/O, it can impact the JIT compiler… and you could have optimizations in which a logging framework writes on a buffer, and then another thread reads from it to do the I/O…</a:t>
             </a:r>
           </a:p>
         </p:txBody>
@@ -4415,7 +4332,7 @@
     </p:spTree>
     <p:extLst>
       <p:ext uri="{BB962C8B-B14F-4D97-AF65-F5344CB8AC3E}">
-        <p14:creationId xmlns:p14="http://schemas.microsoft.com/office/powerpoint/2010/main" val="363991301"/>
+        <p14:creationId xmlns:p14="http://schemas.microsoft.com/office/powerpoint/2010/main" val="3575741525"/>
       </p:ext>
     </p:extLst>
   </p:cSld>
@@ -4447,7 +4364,7 @@
           <p:cNvPr id="2" name="Title 1">
             <a:extLst>
               <a:ext uri="{FF2B5EF4-FFF2-40B4-BE49-F238E27FC236}">
-                <a16:creationId xmlns:a16="http://schemas.microsoft.com/office/drawing/2014/main" id="{10CA7A48-80D2-8B42-92D9-B8EFC68667CC}"/>
+                <a16:creationId xmlns:a16="http://schemas.microsoft.com/office/drawing/2014/main" id="{34ADBF1B-B757-364C-960A-0F97509EDCC6}"/>
               </a:ext>
             </a:extLst>
           </p:cNvPr>
@@ -4465,8 +4382,13 @@
           <a:p>
             <a:r>
               <a:rPr lang="en-US" dirty="0"/>
-              <a:t>Loggers</a:t>
-            </a:r>
+              <a:t>SLF4J and </a:t>
+            </a:r>
+            <a:r>
+              <a:rPr lang="en-US" dirty="0" err="1"/>
+              <a:t>Logback</a:t>
+            </a:r>
+            <a:endParaRPr lang="en-US" dirty="0"/>
           </a:p>
         </p:txBody>
       </p:sp>
@@ -4475,7 +4397,7 @@
           <p:cNvPr id="3" name="Content Placeholder 2">
             <a:extLst>
               <a:ext uri="{FF2B5EF4-FFF2-40B4-BE49-F238E27FC236}">
-                <a16:creationId xmlns:a16="http://schemas.microsoft.com/office/drawing/2014/main" id="{B3A74718-5FB4-9040-98BD-DD16870BFB07}"/>
+                <a16:creationId xmlns:a16="http://schemas.microsoft.com/office/drawing/2014/main" id="{92BFC660-58ED-844C-ABEB-D022ABA06FDF}"/>
               </a:ext>
             </a:extLst>
           </p:cNvPr>
@@ -4488,91 +4410,114 @@
         </p:nvSpPr>
         <p:spPr>
           <a:xfrm>
-            <a:off x="193729" y="1825624"/>
-            <a:ext cx="11770963" cy="4885142"/>
+            <a:off x="263471" y="1825625"/>
+            <a:ext cx="11724468" cy="4916138"/>
           </a:xfrm>
         </p:spPr>
         <p:txBody>
           <a:bodyPr>
-            <a:normAutofit lnSpcReduction="10000"/>
+            <a:normAutofit fontScale="92500" lnSpcReduction="10000"/>
           </a:bodyPr>
           <a:lstStyle/>
           <a:p>
             <a:r>
-              <a:rPr lang="en-US" dirty="0"/>
-              <a:t>Usually creating one logger per class, named with the full name of the class itself (including the package)</a:t>
+              <a:rPr lang="en-US" i="1" dirty="0"/>
+              <a:t>SLF4J</a:t>
+            </a:r>
+            <a:r>
+              <a:rPr lang="en-US" dirty="0"/>
+              <a:t> is the most common library for logging in Java</a:t>
+            </a:r>
+          </a:p>
+          <a:p>
+            <a:r>
+              <a:rPr lang="en-US" dirty="0"/>
+              <a:t>It is a “</a:t>
+            </a:r>
+            <a:r>
+              <a:rPr lang="en-US" i="1" dirty="0"/>
+              <a:t>facade</a:t>
+            </a:r>
+            <a:r>
+              <a:rPr lang="en-US" dirty="0"/>
+              <a:t>”, i.e., set of base classes/interfaces, where the actual implementation is in a different library, and it is abstracted away</a:t>
             </a:r>
           </a:p>
           <a:p>
             <a:pPr lvl="1"/>
             <a:r>
               <a:rPr lang="en-US" dirty="0"/>
-              <a:t>created using </a:t>
+              <a:t>i.e., you only import classes from SLF4J in your code</a:t>
+            </a:r>
+          </a:p>
+          <a:p>
+            <a:r>
+              <a:rPr lang="en-US" dirty="0"/>
+              <a:t>Can use different logging framework bindings for SLF4J, where </a:t>
             </a:r>
             <a:r>
               <a:rPr lang="en-US" i="1" dirty="0" err="1"/>
-              <a:t>LoggerFactory.getLogger</a:t>
+              <a:t>Logback</a:t>
+            </a:r>
+            <a:r>
+              <a:rPr lang="en-US" dirty="0"/>
+              <a:t> is the most popular</a:t>
+            </a:r>
+          </a:p>
+          <a:p>
+            <a:pPr lvl="1"/>
+            <a:r>
+              <a:rPr lang="en-US" dirty="0"/>
+              <a:t>for example, think of </a:t>
             </a:r>
             <a:r>
               <a:rPr lang="en-US" i="1" dirty="0"/>
-              <a:t>(name)</a:t>
-            </a:r>
-            <a:r>
-              <a:rPr lang="en-US" dirty="0"/>
-              <a:t>, and typically stored in a final static variable</a:t>
-            </a:r>
-          </a:p>
-          <a:p>
-            <a:r>
-              <a:rPr lang="en-US" dirty="0"/>
-              <a:t>Configurations will be in a </a:t>
+              <a:t>SLF4J</a:t>
+            </a:r>
+            <a:r>
+              <a:rPr lang="en-US" dirty="0"/>
+              <a:t> as </a:t>
+            </a:r>
+            <a:r>
+              <a:rPr lang="en-US" i="1" dirty="0"/>
+              <a:t>JPA</a:t>
+            </a:r>
+            <a:r>
+              <a:rPr lang="en-US" dirty="0"/>
+              <a:t>, and </a:t>
             </a:r>
             <a:r>
               <a:rPr lang="en-US" i="1" dirty="0" err="1"/>
-              <a:t>logback.xml</a:t>
+              <a:t>Logback</a:t>
+            </a:r>
+            <a:r>
+              <a:rPr lang="en-US" dirty="0"/>
+              <a:t> as </a:t>
             </a:r>
             <a:r>
               <a:rPr lang="en-US" i="1" dirty="0"/>
-              <a:t> </a:t>
-            </a:r>
-            <a:r>
-              <a:rPr lang="en-US" dirty="0"/>
-              <a:t>file</a:t>
-            </a:r>
-          </a:p>
-          <a:p>
-            <a:r>
-              <a:rPr lang="en-US" dirty="0"/>
-              <a:t>For testing, can have a different </a:t>
-            </a:r>
-            <a:r>
-              <a:rPr lang="en-US" i="1" dirty="0" err="1"/>
-              <a:t>logback-test.xml</a:t>
-            </a:r>
-            <a:r>
-              <a:rPr lang="en-US" i="1" dirty="0"/>
-              <a:t> </a:t>
-            </a:r>
-            <a:r>
-              <a:rPr lang="en-US" dirty="0"/>
-              <a:t>file which will have precedence</a:t>
-            </a:r>
-          </a:p>
-          <a:p>
-            <a:r>
-              <a:rPr lang="en-US" dirty="0"/>
-              <a:t>Many possible configurations</a:t>
+              <a:t>Hibernate</a:t>
+            </a:r>
+          </a:p>
+          <a:p>
+            <a:r>
+              <a:rPr lang="en-US" dirty="0"/>
+              <a:t>Many third-party libraries use SLF4J, but will not provide a binding</a:t>
             </a:r>
           </a:p>
           <a:p>
             <a:pPr lvl="1"/>
             <a:r>
-              <a:rPr lang="en-US" dirty="0" err="1"/>
-              <a:t>eg</a:t>
-            </a:r>
-            <a:r>
-              <a:rPr lang="en-US" dirty="0"/>
-              <a:t>, what to do with the logs? Should just be on the console? Should be written to a file? Should be sent to a remote server? Etc. </a:t>
+              <a:rPr lang="en-US" dirty="0"/>
+              <a:t>this enables you to have a single binding for your whole app, including the 3</a:t>
+            </a:r>
+            <a:r>
+              <a:rPr lang="en-US" baseline="30000" dirty="0"/>
+              <a:t>rd</a:t>
+            </a:r>
+            <a:r>
+              <a:rPr lang="en-US" dirty="0"/>
+              <a:t>-party libraries</a:t>
             </a:r>
           </a:p>
         </p:txBody>
@@ -4580,7 +4525,7 @@
     </p:spTree>
     <p:extLst>
       <p:ext uri="{BB962C8B-B14F-4D97-AF65-F5344CB8AC3E}">
-        <p14:creationId xmlns:p14="http://schemas.microsoft.com/office/powerpoint/2010/main" val="3372328965"/>
+        <p14:creationId xmlns:p14="http://schemas.microsoft.com/office/powerpoint/2010/main" val="363991301"/>
       </p:ext>
     </p:extLst>
   </p:cSld>
@@ -4612,7 +4557,7 @@
           <p:cNvPr id="2" name="Title 1">
             <a:extLst>
               <a:ext uri="{FF2B5EF4-FFF2-40B4-BE49-F238E27FC236}">
-                <a16:creationId xmlns:a16="http://schemas.microsoft.com/office/drawing/2014/main" id="{0DFB71F8-9C0F-4944-950A-5571AC221882}"/>
+                <a16:creationId xmlns:a16="http://schemas.microsoft.com/office/drawing/2014/main" id="{10CA7A48-80D2-8B42-92D9-B8EFC68667CC}"/>
               </a:ext>
             </a:extLst>
           </p:cNvPr>
@@ -4630,7 +4575,7 @@
           <a:p>
             <a:r>
               <a:rPr lang="en-US" dirty="0"/>
-              <a:t>Log Statements and Levels</a:t>
+              <a:t>Loggers</a:t>
             </a:r>
           </a:p>
         </p:txBody>
@@ -4640,7 +4585,7 @@
           <p:cNvPr id="3" name="Content Placeholder 2">
             <a:extLst>
               <a:ext uri="{FF2B5EF4-FFF2-40B4-BE49-F238E27FC236}">
-                <a16:creationId xmlns:a16="http://schemas.microsoft.com/office/drawing/2014/main" id="{5AE60A25-FF38-4741-A038-58CB2C530281}"/>
+                <a16:creationId xmlns:a16="http://schemas.microsoft.com/office/drawing/2014/main" id="{B3A74718-5FB4-9040-98BD-DD16870BFB07}"/>
               </a:ext>
             </a:extLst>
           </p:cNvPr>
@@ -4653,133 +4598,91 @@
         </p:nvSpPr>
         <p:spPr>
           <a:xfrm>
-            <a:off x="241515" y="1690687"/>
-            <a:ext cx="11792919" cy="5027827"/>
+            <a:off x="193729" y="1825624"/>
+            <a:ext cx="11770963" cy="4885142"/>
           </a:xfrm>
         </p:spPr>
         <p:txBody>
-          <a:bodyPr/>
-          <a:lstStyle/>
-          <a:p>
-            <a:r>
-              <a:rPr lang="en-US" dirty="0"/>
-              <a:t>Different methods: </a:t>
-            </a:r>
+          <a:bodyPr>
+            <a:normAutofit lnSpcReduction="10000"/>
+          </a:bodyPr>
+          <a:lstStyle/>
+          <a:p>
+            <a:r>
+              <a:rPr lang="en-US" dirty="0"/>
+              <a:t>Usually creating one logger per class, named with the full name of the class itself (including the package)</a:t>
+            </a:r>
+          </a:p>
+          <a:p>
+            <a:pPr lvl="1"/>
+            <a:r>
+              <a:rPr lang="en-US" dirty="0"/>
+              <a:t>created using </a:t>
+            </a:r>
+            <a:r>
+              <a:rPr lang="en-US" i="1" dirty="0" err="1"/>
+              <a:t>LoggerFactory.getLogger</a:t>
+            </a:r>
+            <a:r>
+              <a:rPr lang="en-US" i="1" dirty="0"/>
+              <a:t>(name)</a:t>
+            </a:r>
+            <a:r>
+              <a:rPr lang="en-US" dirty="0"/>
+              <a:t>, and typically stored in a final static variable</a:t>
+            </a:r>
+          </a:p>
+          <a:p>
+            <a:r>
+              <a:rPr lang="en-US" dirty="0"/>
+              <a:t>Configurations will be in a </a:t>
+            </a:r>
+            <a:r>
+              <a:rPr lang="en-US" i="1" dirty="0" err="1"/>
+              <a:t>logback.xml</a:t>
+            </a:r>
+            <a:r>
+              <a:rPr lang="en-US" i="1" dirty="0"/>
+              <a:t> </a:t>
+            </a:r>
+            <a:r>
+              <a:rPr lang="en-US" dirty="0"/>
+              <a:t>file</a:t>
+            </a:r>
+          </a:p>
+          <a:p>
+            <a:r>
+              <a:rPr lang="en-US" dirty="0"/>
+              <a:t>For testing, can have a different </a:t>
+            </a:r>
+            <a:r>
+              <a:rPr lang="en-US" i="1" dirty="0" err="1"/>
+              <a:t>logback-test.xml</a:t>
+            </a:r>
+            <a:r>
+              <a:rPr lang="en-US" i="1" dirty="0"/>
+              <a:t> </a:t>
+            </a:r>
+            <a:r>
+              <a:rPr lang="en-US" dirty="0"/>
+              <a:t>file which will have precedence</a:t>
+            </a:r>
+          </a:p>
+          <a:p>
+            <a:r>
+              <a:rPr lang="en-US" dirty="0"/>
+              <a:t>Many possible configurations</a:t>
+            </a:r>
+          </a:p>
+          <a:p>
+            <a:pPr lvl="1"/>
             <a:r>
               <a:rPr lang="en-US" dirty="0" err="1"/>
               <a:t>eg</a:t>
             </a:r>
             <a:r>
               <a:rPr lang="en-US" dirty="0"/>
-              <a:t>, </a:t>
-            </a:r>
-            <a:r>
-              <a:rPr lang="en-US" b="1" dirty="0" err="1"/>
-              <a:t>log.debug</a:t>
-            </a:r>
-            <a:r>
-              <a:rPr lang="en-US" b="1" dirty="0"/>
-              <a:t>(</a:t>
-            </a:r>
-            <a:r>
-              <a:rPr lang="en-US" b="1" dirty="0" err="1"/>
-              <a:t>msg</a:t>
-            </a:r>
-            <a:r>
-              <a:rPr lang="en-US" b="1" dirty="0"/>
-              <a:t>) </a:t>
-            </a:r>
-            <a:r>
-              <a:rPr lang="en-US" dirty="0"/>
-              <a:t>and </a:t>
-            </a:r>
-            <a:r>
-              <a:rPr lang="en-US" b="1" dirty="0" err="1"/>
-              <a:t>log.error</a:t>
-            </a:r>
-            <a:r>
-              <a:rPr lang="en-US" b="1" dirty="0"/>
-              <a:t>(</a:t>
-            </a:r>
-            <a:r>
-              <a:rPr lang="en-US" b="1" dirty="0" err="1"/>
-              <a:t>msg</a:t>
-            </a:r>
-            <a:r>
-              <a:rPr lang="en-US" b="1" dirty="0"/>
-              <a:t>)</a:t>
-            </a:r>
-          </a:p>
-          <a:p>
-            <a:r>
-              <a:rPr lang="en-US" dirty="0"/>
-              <a:t>Based on the LEVEL of logging, some messages can be discarded</a:t>
-            </a:r>
-          </a:p>
-          <a:p>
-            <a:pPr lvl="1"/>
-            <a:r>
-              <a:rPr lang="en-US" dirty="0"/>
-              <a:t>for example, you could tell the system to discard DEBUG logs, have WARN only on console, and ERROR on console and also saved on a file</a:t>
-            </a:r>
-          </a:p>
-          <a:p>
-            <a:r>
-              <a:rPr lang="en-US" dirty="0"/>
-              <a:t>Levels: </a:t>
-            </a:r>
-            <a:r>
-              <a:rPr lang="en-US" b="1" dirty="0"/>
-              <a:t>TRACE</a:t>
-            </a:r>
-            <a:r>
-              <a:rPr lang="en-US" dirty="0"/>
-              <a:t>, </a:t>
-            </a:r>
-            <a:r>
-              <a:rPr lang="en-US" b="1" dirty="0"/>
-              <a:t>DEBUG</a:t>
-            </a:r>
-            <a:r>
-              <a:rPr lang="en-US" dirty="0"/>
-              <a:t>, </a:t>
-            </a:r>
-            <a:r>
-              <a:rPr lang="en-US" b="1" dirty="0"/>
-              <a:t>INFO</a:t>
-            </a:r>
-            <a:r>
-              <a:rPr lang="en-US" dirty="0"/>
-              <a:t>, </a:t>
-            </a:r>
-            <a:r>
-              <a:rPr lang="en-US" b="1" dirty="0"/>
-              <a:t>WARN</a:t>
-            </a:r>
-            <a:r>
-              <a:rPr lang="en-US" dirty="0"/>
-              <a:t> and </a:t>
-            </a:r>
-            <a:r>
-              <a:rPr lang="en-US" b="1" dirty="0"/>
-              <a:t>ERROR</a:t>
-            </a:r>
-          </a:p>
-          <a:p>
-            <a:r>
-              <a:rPr lang="en-US" dirty="0"/>
-              <a:t>Those are in order: when you activate a level, all levels above it are activated as well</a:t>
-            </a:r>
-          </a:p>
-          <a:p>
-            <a:pPr lvl="1"/>
-            <a:r>
-              <a:rPr lang="en-US" dirty="0" err="1"/>
-              <a:t>eg</a:t>
-            </a:r>
-            <a:r>
-              <a:rPr lang="en-US" dirty="0"/>
-              <a:t>, activating DEBUG does activate everything but TRACE</a:t>
+              <a:t>, what to do with the logs? Should just be on the console? Should be written to a file? Should be sent to a remote server? Etc. </a:t>
             </a:r>
           </a:p>
         </p:txBody>
@@ -4787,7 +4690,7 @@
     </p:spTree>
     <p:extLst>
       <p:ext uri="{BB962C8B-B14F-4D97-AF65-F5344CB8AC3E}">
-        <p14:creationId xmlns:p14="http://schemas.microsoft.com/office/powerpoint/2010/main" val="1474049871"/>
+        <p14:creationId xmlns:p14="http://schemas.microsoft.com/office/powerpoint/2010/main" val="3372328965"/>
       </p:ext>
     </p:extLst>
   </p:cSld>
@@ -4819,7 +4722,7 @@
           <p:cNvPr id="2" name="Title 1">
             <a:extLst>
               <a:ext uri="{FF2B5EF4-FFF2-40B4-BE49-F238E27FC236}">
-                <a16:creationId xmlns:a16="http://schemas.microsoft.com/office/drawing/2014/main" id="{DE7DA950-C40B-2845-92CA-BE408B38CC44}"/>
+                <a16:creationId xmlns:a16="http://schemas.microsoft.com/office/drawing/2014/main" id="{0DFB71F8-9C0F-4944-950A-5571AC221882}"/>
               </a:ext>
             </a:extLst>
           </p:cNvPr>
@@ -4837,7 +4740,7 @@
           <a:p>
             <a:r>
               <a:rPr lang="en-US" dirty="0"/>
-              <a:t>Setting Log Levels</a:t>
+              <a:t>Log Statements and Levels</a:t>
             </a:r>
           </a:p>
         </p:txBody>
@@ -4847,7 +4750,7 @@
           <p:cNvPr id="3" name="Content Placeholder 2">
             <a:extLst>
               <a:ext uri="{FF2B5EF4-FFF2-40B4-BE49-F238E27FC236}">
-                <a16:creationId xmlns:a16="http://schemas.microsoft.com/office/drawing/2014/main" id="{589855C8-2A1B-384B-9B83-C2E3393DD0C1}"/>
+                <a16:creationId xmlns:a16="http://schemas.microsoft.com/office/drawing/2014/main" id="{5AE60A25-FF38-4741-A038-58CB2C530281}"/>
               </a:ext>
             </a:extLst>
           </p:cNvPr>
@@ -4860,8 +4763,8 @@
         </p:nvSpPr>
         <p:spPr>
           <a:xfrm>
-            <a:off x="317715" y="1825624"/>
-            <a:ext cx="11639227" cy="4830898"/>
+            <a:off x="241515" y="1690687"/>
+            <a:ext cx="11792919" cy="5027827"/>
           </a:xfrm>
         </p:spPr>
         <p:txBody>
@@ -4870,40 +4773,123 @@
           <a:p>
             <a:r>
               <a:rPr lang="en-US" dirty="0"/>
-              <a:t>Levels can be fine-tuned</a:t>
-            </a:r>
-          </a:p>
-          <a:p>
-            <a:r>
-              <a:rPr lang="en-US" dirty="0"/>
-              <a:t>You can a have a log-level for the whole application, e.g. typically WARN or ERROR</a:t>
-            </a:r>
-          </a:p>
-          <a:p>
-            <a:r>
-              <a:rPr lang="en-US" dirty="0"/>
-              <a:t>Then, can override the level for some specific loggers</a:t>
+              <a:t>Different methods: </a:t>
+            </a:r>
+            <a:r>
+              <a:rPr lang="en-US" dirty="0" err="1"/>
+              <a:t>eg</a:t>
+            </a:r>
+            <a:r>
+              <a:rPr lang="en-US" dirty="0"/>
+              <a:t>, </a:t>
+            </a:r>
+            <a:r>
+              <a:rPr lang="en-US" b="1" dirty="0" err="1"/>
+              <a:t>log.debug</a:t>
+            </a:r>
+            <a:r>
+              <a:rPr lang="en-US" b="1" dirty="0"/>
+              <a:t>(</a:t>
+            </a:r>
+            <a:r>
+              <a:rPr lang="en-US" b="1" dirty="0" err="1"/>
+              <a:t>msg</a:t>
+            </a:r>
+            <a:r>
+              <a:rPr lang="en-US" b="1" dirty="0"/>
+              <a:t>) </a:t>
+            </a:r>
+            <a:r>
+              <a:rPr lang="en-US" dirty="0"/>
+              <a:t>and </a:t>
+            </a:r>
+            <a:r>
+              <a:rPr lang="en-US" b="1" dirty="0" err="1"/>
+              <a:t>log.error</a:t>
+            </a:r>
+            <a:r>
+              <a:rPr lang="en-US" b="1" dirty="0"/>
+              <a:t>(</a:t>
+            </a:r>
+            <a:r>
+              <a:rPr lang="en-US" b="1" dirty="0" err="1"/>
+              <a:t>msg</a:t>
+            </a:r>
+            <a:r>
+              <a:rPr lang="en-US" b="1" dirty="0"/>
+              <a:t>)</a:t>
+            </a:r>
+          </a:p>
+          <a:p>
+            <a:r>
+              <a:rPr lang="en-US" dirty="0"/>
+              <a:t>Based on the LEVEL of logging, some messages can be discarded</a:t>
             </a:r>
           </a:p>
           <a:p>
             <a:pPr lvl="1"/>
             <a:r>
               <a:rPr lang="en-US" dirty="0"/>
-              <a:t>e.g., you could put it to INFO for your classes, but not the ones of the 3</a:t>
-            </a:r>
-            <a:r>
-              <a:rPr lang="en-US" baseline="30000" dirty="0"/>
-              <a:t>rd</a:t>
-            </a:r>
-            <a:r>
-              <a:rPr lang="en-US" dirty="0"/>
-              <a:t>-party libraries</a:t>
-            </a:r>
-          </a:p>
-          <a:p>
-            <a:r>
-              <a:rPr lang="en-US" dirty="0"/>
-              <a:t>When testing/debugging some classes, you could put DEBUG for just those </a:t>
+              <a:t>for example, you could tell the system to discard DEBUG logs, have WARN only on console, and ERROR on console and also saved on a file</a:t>
+            </a:r>
+          </a:p>
+          <a:p>
+            <a:r>
+              <a:rPr lang="en-US" dirty="0"/>
+              <a:t>Levels: </a:t>
+            </a:r>
+            <a:r>
+              <a:rPr lang="en-US" b="1" dirty="0"/>
+              <a:t>TRACE</a:t>
+            </a:r>
+            <a:r>
+              <a:rPr lang="en-US" dirty="0"/>
+              <a:t>, </a:t>
+            </a:r>
+            <a:r>
+              <a:rPr lang="en-US" b="1" dirty="0"/>
+              <a:t>DEBUG</a:t>
+            </a:r>
+            <a:r>
+              <a:rPr lang="en-US" dirty="0"/>
+              <a:t>, </a:t>
+            </a:r>
+            <a:r>
+              <a:rPr lang="en-US" b="1" dirty="0"/>
+              <a:t>INFO</a:t>
+            </a:r>
+            <a:r>
+              <a:rPr lang="en-US" dirty="0"/>
+              <a:t>, </a:t>
+            </a:r>
+            <a:r>
+              <a:rPr lang="en-US" b="1" dirty="0"/>
+              <a:t>WARN</a:t>
+            </a:r>
+            <a:r>
+              <a:rPr lang="en-US" dirty="0"/>
+              <a:t> and </a:t>
+            </a:r>
+            <a:r>
+              <a:rPr lang="en-US" b="1" dirty="0"/>
+              <a:t>ERROR</a:t>
+            </a:r>
+          </a:p>
+          <a:p>
+            <a:r>
+              <a:rPr lang="en-US" dirty="0"/>
+              <a:t>Those are in order: when you activate a level, all levels above it are activated as well</a:t>
+            </a:r>
+          </a:p>
+          <a:p>
+            <a:pPr lvl="1"/>
+            <a:r>
+              <a:rPr lang="en-US" dirty="0" err="1"/>
+              <a:t>eg</a:t>
+            </a:r>
+            <a:r>
+              <a:rPr lang="en-US" dirty="0"/>
+              <a:t>, activating DEBUG does activate everything but TRACE</a:t>
             </a:r>
           </a:p>
         </p:txBody>
@@ -4911,7 +4897,7 @@
     </p:spTree>
     <p:extLst>
       <p:ext uri="{BB962C8B-B14F-4D97-AF65-F5344CB8AC3E}">
-        <p14:creationId xmlns:p14="http://schemas.microsoft.com/office/powerpoint/2010/main" val="2411363819"/>
+        <p14:creationId xmlns:p14="http://schemas.microsoft.com/office/powerpoint/2010/main" val="1474049871"/>
       </p:ext>
     </p:extLst>
   </p:cSld>
@@ -5031,7 +5017,7 @@
           <p:cNvPr id="2" name="Title 1">
             <a:extLst>
               <a:ext uri="{FF2B5EF4-FFF2-40B4-BE49-F238E27FC236}">
-                <a16:creationId xmlns:a16="http://schemas.microsoft.com/office/drawing/2014/main" id="{44081350-3FFE-B740-855A-B01F10E17AEB}"/>
+                <a16:creationId xmlns:a16="http://schemas.microsoft.com/office/drawing/2014/main" id="{DE7DA950-C40B-2845-92CA-BE408B38CC44}"/>
               </a:ext>
             </a:extLst>
           </p:cNvPr>
@@ -5049,7 +5035,7 @@
           <a:p>
             <a:r>
               <a:rPr lang="en-US" dirty="0"/>
-              <a:t>String Concatenation</a:t>
+              <a:t>Setting Log Levels</a:t>
             </a:r>
           </a:p>
         </p:txBody>
@@ -5059,7 +5045,7 @@
           <p:cNvPr id="3" name="Content Placeholder 2">
             <a:extLst>
               <a:ext uri="{FF2B5EF4-FFF2-40B4-BE49-F238E27FC236}">
-                <a16:creationId xmlns:a16="http://schemas.microsoft.com/office/drawing/2014/main" id="{0E44CBFF-5F88-C340-B2C6-3755F9D691B0}"/>
+                <a16:creationId xmlns:a16="http://schemas.microsoft.com/office/drawing/2014/main" id="{589855C8-2A1B-384B-9B83-C2E3393DD0C1}"/>
               </a:ext>
             </a:extLst>
           </p:cNvPr>
@@ -5072,106 +5058,58 @@
         </p:nvSpPr>
         <p:spPr>
           <a:xfrm>
-            <a:off x="255721" y="1825625"/>
-            <a:ext cx="11677973" cy="4861894"/>
+            <a:off x="317715" y="1825624"/>
+            <a:ext cx="11639227" cy="4830898"/>
           </a:xfrm>
         </p:spPr>
         <p:txBody>
-          <a:bodyPr>
-            <a:normAutofit fontScale="92500" lnSpcReduction="10000"/>
-          </a:bodyPr>
-          <a:lstStyle/>
-          <a:p>
-            <a:r>
-              <a:rPr lang="en-US" dirty="0"/>
-              <a:t>Consider: </a:t>
-            </a:r>
-            <a:r>
-              <a:rPr lang="en-US" i="1" dirty="0" err="1"/>
-              <a:t>log.debug</a:t>
-            </a:r>
-            <a:r>
-              <a:rPr lang="en-US" i="1" dirty="0"/>
-              <a:t>(“” + x + “=” + y)</a:t>
-            </a:r>
-          </a:p>
-          <a:p>
-            <a:r>
-              <a:rPr lang="en-US" dirty="0"/>
-              <a:t>That would be bad: often debug-level logs are ignored (especially in production), and so computing </a:t>
-            </a:r>
-            <a:r>
-              <a:rPr lang="en-US" b="1" i="1" dirty="0"/>
-              <a:t>“” + x + “=” + y </a:t>
-            </a:r>
-            <a:r>
-              <a:rPr lang="en-US" i="1" dirty="0"/>
-              <a:t> </a:t>
-            </a:r>
-            <a:r>
-              <a:rPr lang="en-US" dirty="0"/>
-              <a:t>would be a total waste of CPU cycles</a:t>
-            </a:r>
-          </a:p>
-          <a:p>
-            <a:r>
-              <a:rPr lang="en-US" dirty="0"/>
-              <a:t>String concatenation is </a:t>
-            </a:r>
-            <a:r>
-              <a:rPr lang="en-US" b="1" dirty="0"/>
-              <a:t>expensive</a:t>
-            </a:r>
-            <a:r>
-              <a:rPr lang="en-US" dirty="0"/>
-              <a:t>: recall that Strings are immutable, and at each + we create a completely new String object</a:t>
-            </a:r>
-          </a:p>
-          <a:p>
-            <a:r>
-              <a:rPr lang="en-US" dirty="0"/>
-              <a:t>Solution: </a:t>
-            </a:r>
-            <a:r>
-              <a:rPr lang="en-US" i="1" dirty="0" err="1"/>
-              <a:t>log.debug</a:t>
-            </a:r>
-            <a:r>
-              <a:rPr lang="en-US" i="1" dirty="0"/>
-              <a:t>(“{}={}”, x, y)</a:t>
+          <a:bodyPr/>
+          <a:lstStyle/>
+          <a:p>
+            <a:r>
+              <a:rPr lang="en-US" dirty="0"/>
+              <a:t>Levels can be fine-tuned</a:t>
+            </a:r>
+          </a:p>
+          <a:p>
+            <a:r>
+              <a:rPr lang="en-US" dirty="0"/>
+              <a:t>You can a have a log-level for the whole application, e.g. typically WARN or ERROR</a:t>
+            </a:r>
+          </a:p>
+          <a:p>
+            <a:r>
+              <a:rPr lang="en-US" dirty="0"/>
+              <a:t>Then, can override the level for some specific loggers</a:t>
             </a:r>
           </a:p>
           <a:p>
             <a:pPr lvl="1"/>
             <a:r>
               <a:rPr lang="en-US" dirty="0"/>
-              <a:t>log statements allow string interpolation, with {} as placeholder</a:t>
-            </a:r>
-          </a:p>
-          <a:p>
-            <a:pPr lvl="1"/>
-            <a:r>
-              <a:rPr lang="en-US" dirty="0"/>
-              <a:t>if a log is ignored (</a:t>
-            </a:r>
-            <a:r>
-              <a:rPr lang="en-US" dirty="0" err="1"/>
-              <a:t>eg</a:t>
-            </a:r>
-            <a:r>
-              <a:rPr lang="en-US" dirty="0"/>
-              <a:t> level WARN), then the string is discarded without the need to interpolate it</a:t>
-            </a:r>
-          </a:p>
-          <a:p>
-            <a:endParaRPr lang="en-US" dirty="0"/>
+              <a:t>e.g., you could put it to INFO for your classes, but not the ones of the 3</a:t>
+            </a:r>
+            <a:r>
+              <a:rPr lang="en-US" baseline="30000" dirty="0"/>
+              <a:t>rd</a:t>
+            </a:r>
+            <a:r>
+              <a:rPr lang="en-US" dirty="0"/>
+              <a:t>-party libraries</a:t>
+            </a:r>
+          </a:p>
+          <a:p>
+            <a:r>
+              <a:rPr lang="en-US" dirty="0"/>
+              <a:t>When testing/debugging some classes, you could put DEBUG for just those </a:t>
+            </a:r>
           </a:p>
         </p:txBody>
       </p:sp>
     </p:spTree>
     <p:extLst>
       <p:ext uri="{BB962C8B-B14F-4D97-AF65-F5344CB8AC3E}">
-        <p14:creationId xmlns:p14="http://schemas.microsoft.com/office/powerpoint/2010/main" val="1345937559"/>
+        <p14:creationId xmlns:p14="http://schemas.microsoft.com/office/powerpoint/2010/main" val="2411363819"/>
       </p:ext>
     </p:extLst>
   </p:cSld>
@@ -5200,7 +5138,13 @@
       </p:grpSpPr>
       <p:sp>
         <p:nvSpPr>
-          <p:cNvPr id="4" name="Title 3"/>
+          <p:cNvPr id="2" name="Title 1">
+            <a:extLst>
+              <a:ext uri="{FF2B5EF4-FFF2-40B4-BE49-F238E27FC236}">
+                <a16:creationId xmlns:a16="http://schemas.microsoft.com/office/drawing/2014/main" id="{44081350-3FFE-B740-855A-B01F10E17AEB}"/>
+              </a:ext>
+            </a:extLst>
+          </p:cNvPr>
           <p:cNvSpPr>
             <a:spLocks noGrp="1"/>
           </p:cNvSpPr>
@@ -5215,34 +5159,129 @@
           <a:p>
             <a:r>
               <a:rPr lang="en-US" dirty="0"/>
-              <a:t>Cloud Deployment</a:t>
-            </a:r>
-          </a:p>
-        </p:txBody>
-      </p:sp>
-      <p:sp>
-        <p:nvSpPr>
-          <p:cNvPr id="5" name="Text Placeholder 4"/>
-          <p:cNvSpPr>
-            <a:spLocks noGrp="1"/>
-          </p:cNvSpPr>
-          <p:nvPr>
-            <p:ph type="body" idx="1"/>
-          </p:nvPr>
-        </p:nvSpPr>
-        <p:spPr/>
-        <p:txBody>
-          <a:bodyPr/>
-          <a:lstStyle/>
-          <a:p>
-            <a:endParaRPr lang="en-US"/>
+              <a:t>String Concatenation</a:t>
+            </a:r>
+          </a:p>
+        </p:txBody>
+      </p:sp>
+      <p:sp>
+        <p:nvSpPr>
+          <p:cNvPr id="3" name="Content Placeholder 2">
+            <a:extLst>
+              <a:ext uri="{FF2B5EF4-FFF2-40B4-BE49-F238E27FC236}">
+                <a16:creationId xmlns:a16="http://schemas.microsoft.com/office/drawing/2014/main" id="{0E44CBFF-5F88-C340-B2C6-3755F9D691B0}"/>
+              </a:ext>
+            </a:extLst>
+          </p:cNvPr>
+          <p:cNvSpPr>
+            <a:spLocks noGrp="1"/>
+          </p:cNvSpPr>
+          <p:nvPr>
+            <p:ph idx="1"/>
+          </p:nvPr>
+        </p:nvSpPr>
+        <p:spPr>
+          <a:xfrm>
+            <a:off x="255721" y="1825625"/>
+            <a:ext cx="11677973" cy="4861894"/>
+          </a:xfrm>
+        </p:spPr>
+        <p:txBody>
+          <a:bodyPr>
+            <a:normAutofit fontScale="92500" lnSpcReduction="10000"/>
+          </a:bodyPr>
+          <a:lstStyle/>
+          <a:p>
+            <a:r>
+              <a:rPr lang="en-US" dirty="0"/>
+              <a:t>Consider: </a:t>
+            </a:r>
+            <a:r>
+              <a:rPr lang="en-US" i="1" dirty="0" err="1"/>
+              <a:t>log.debug</a:t>
+            </a:r>
+            <a:r>
+              <a:rPr lang="en-US" i="1" dirty="0"/>
+              <a:t>(“” + x + “=” + y)</a:t>
+            </a:r>
+          </a:p>
+          <a:p>
+            <a:r>
+              <a:rPr lang="en-US" dirty="0"/>
+              <a:t>That would be bad: often debug-level logs are ignored (especially in production), and so computing </a:t>
+            </a:r>
+            <a:r>
+              <a:rPr lang="en-US" b="1" i="1" dirty="0"/>
+              <a:t>“” + x + “=” + y </a:t>
+            </a:r>
+            <a:r>
+              <a:rPr lang="en-US" i="1" dirty="0"/>
+              <a:t> </a:t>
+            </a:r>
+            <a:r>
+              <a:rPr lang="en-US" dirty="0"/>
+              <a:t>would be a total waste of CPU cycles</a:t>
+            </a:r>
+          </a:p>
+          <a:p>
+            <a:r>
+              <a:rPr lang="en-US" dirty="0"/>
+              <a:t>String concatenation is </a:t>
+            </a:r>
+            <a:r>
+              <a:rPr lang="en-US" b="1" dirty="0"/>
+              <a:t>expensive</a:t>
+            </a:r>
+            <a:r>
+              <a:rPr lang="en-US" dirty="0"/>
+              <a:t>: recall that Strings are immutable, and at each + we create a completely new String object</a:t>
+            </a:r>
+          </a:p>
+          <a:p>
+            <a:r>
+              <a:rPr lang="en-US" dirty="0"/>
+              <a:t>Solution: </a:t>
+            </a:r>
+            <a:r>
+              <a:rPr lang="en-US" i="1" dirty="0" err="1"/>
+              <a:t>log.debug</a:t>
+            </a:r>
+            <a:r>
+              <a:rPr lang="en-US" i="1" dirty="0"/>
+              <a:t>(“{}={}”, x, y)</a:t>
+            </a:r>
+          </a:p>
+          <a:p>
+            <a:pPr lvl="1"/>
+            <a:r>
+              <a:rPr lang="en-US" dirty="0"/>
+              <a:t>log statements allow string interpolation, with {} as placeholder</a:t>
+            </a:r>
+          </a:p>
+          <a:p>
+            <a:pPr lvl="1"/>
+            <a:r>
+              <a:rPr lang="en-US" dirty="0"/>
+              <a:t>if a log is ignored (</a:t>
+            </a:r>
+            <a:r>
+              <a:rPr lang="en-US" dirty="0" err="1"/>
+              <a:t>eg</a:t>
+            </a:r>
+            <a:r>
+              <a:rPr lang="en-US" dirty="0"/>
+              <a:t> level WARN), then the string is discarded without the need to interpolate it</a:t>
+            </a:r>
+          </a:p>
+          <a:p>
+            <a:endParaRPr lang="en-US" dirty="0"/>
           </a:p>
         </p:txBody>
       </p:sp>
     </p:spTree>
     <p:extLst>
       <p:ext uri="{BB962C8B-B14F-4D97-AF65-F5344CB8AC3E}">
-        <p14:creationId xmlns:p14="http://schemas.microsoft.com/office/powerpoint/2010/main" val="2329627873"/>
+        <p14:creationId xmlns:p14="http://schemas.microsoft.com/office/powerpoint/2010/main" val="1345937559"/>
       </p:ext>
     </p:extLst>
   </p:cSld>
@@ -5271,7 +5310,7 @@
       </p:grpSpPr>
       <p:sp>
         <p:nvSpPr>
-          <p:cNvPr id="2" name="Title 1"/>
+          <p:cNvPr id="4" name="Title 3"/>
           <p:cNvSpPr>
             <a:spLocks noGrp="1"/>
           </p:cNvSpPr>
@@ -5286,75 +5325,34 @@
           <a:p>
             <a:r>
               <a:rPr lang="en-US" dirty="0"/>
-              <a:t>Deployment</a:t>
-            </a:r>
-          </a:p>
-        </p:txBody>
-      </p:sp>
-      <p:sp>
-        <p:nvSpPr>
-          <p:cNvPr id="3" name="Content Placeholder 2"/>
-          <p:cNvSpPr>
-            <a:spLocks noGrp="1"/>
-          </p:cNvSpPr>
-          <p:nvPr>
-            <p:ph idx="1"/>
-          </p:nvPr>
-        </p:nvSpPr>
-        <p:spPr>
-          <a:xfrm>
-            <a:off x="282804" y="1825625"/>
-            <a:ext cx="11070996" cy="4914540"/>
-          </a:xfrm>
-        </p:spPr>
-        <p:txBody>
-          <a:bodyPr/>
-          <a:lstStyle/>
-          <a:p>
-            <a:r>
-              <a:rPr lang="en-US" dirty="0"/>
-              <a:t>When your application is ready, you need to </a:t>
-            </a:r>
-            <a:r>
-              <a:rPr lang="en-US" i="1" dirty="0"/>
-              <a:t>deploy</a:t>
-            </a:r>
-            <a:r>
-              <a:rPr lang="en-US" dirty="0"/>
-              <a:t> it</a:t>
-            </a:r>
-          </a:p>
-          <a:p>
-            <a:r>
-              <a:rPr lang="en-US" dirty="0"/>
-              <a:t>But where?</a:t>
-            </a:r>
-          </a:p>
-          <a:p>
-            <a:r>
-              <a:rPr lang="en-US" dirty="0"/>
-              <a:t>You can host your own servers, but then you need to handle everything by yourself</a:t>
-            </a:r>
-          </a:p>
-          <a:p>
-            <a:pPr lvl="1"/>
-            <a:r>
-              <a:rPr lang="en-US" dirty="0"/>
-              <a:t>hardware (purchasing and maintenance), backups, DNS, etc.</a:t>
-            </a:r>
-          </a:p>
-          <a:p>
-            <a:r>
-              <a:rPr lang="en-US" dirty="0"/>
-              <a:t>Many companies do it, but can be difficult for startups and private individuals</a:t>
-            </a:r>
+              <a:t>Cloud Deployment</a:t>
+            </a:r>
+          </a:p>
+        </p:txBody>
+      </p:sp>
+      <p:sp>
+        <p:nvSpPr>
+          <p:cNvPr id="5" name="Text Placeholder 4"/>
+          <p:cNvSpPr>
+            <a:spLocks noGrp="1"/>
+          </p:cNvSpPr>
+          <p:nvPr>
+            <p:ph type="body" idx="1"/>
+          </p:nvPr>
+        </p:nvSpPr>
+        <p:spPr/>
+        <p:txBody>
+          <a:bodyPr/>
+          <a:lstStyle/>
+          <a:p>
+            <a:endParaRPr lang="en-US"/>
           </a:p>
         </p:txBody>
       </p:sp>
     </p:spTree>
     <p:extLst>
       <p:ext uri="{BB962C8B-B14F-4D97-AF65-F5344CB8AC3E}">
-        <p14:creationId xmlns:p14="http://schemas.microsoft.com/office/powerpoint/2010/main" val="892869614"/>
+        <p14:creationId xmlns:p14="http://schemas.microsoft.com/office/powerpoint/2010/main" val="2329627873"/>
       </p:ext>
     </p:extLst>
   </p:cSld>
@@ -5398,6 +5396,118 @@
           <a:p>
             <a:r>
               <a:rPr lang="en-US" dirty="0"/>
+              <a:t>Deployment</a:t>
+            </a:r>
+          </a:p>
+        </p:txBody>
+      </p:sp>
+      <p:sp>
+        <p:nvSpPr>
+          <p:cNvPr id="3" name="Content Placeholder 2"/>
+          <p:cNvSpPr>
+            <a:spLocks noGrp="1"/>
+          </p:cNvSpPr>
+          <p:nvPr>
+            <p:ph idx="1"/>
+          </p:nvPr>
+        </p:nvSpPr>
+        <p:spPr>
+          <a:xfrm>
+            <a:off x="282804" y="1825625"/>
+            <a:ext cx="11070996" cy="4914540"/>
+          </a:xfrm>
+        </p:spPr>
+        <p:txBody>
+          <a:bodyPr/>
+          <a:lstStyle/>
+          <a:p>
+            <a:r>
+              <a:rPr lang="en-US" dirty="0"/>
+              <a:t>When your application is ready, you need to </a:t>
+            </a:r>
+            <a:r>
+              <a:rPr lang="en-US" i="1" dirty="0"/>
+              <a:t>deploy</a:t>
+            </a:r>
+            <a:r>
+              <a:rPr lang="en-US" dirty="0"/>
+              <a:t> it</a:t>
+            </a:r>
+          </a:p>
+          <a:p>
+            <a:r>
+              <a:rPr lang="en-US" dirty="0"/>
+              <a:t>But where?</a:t>
+            </a:r>
+          </a:p>
+          <a:p>
+            <a:r>
+              <a:rPr lang="en-US" dirty="0"/>
+              <a:t>You can host your own servers, but then you need to handle everything by yourself</a:t>
+            </a:r>
+          </a:p>
+          <a:p>
+            <a:pPr lvl="1"/>
+            <a:r>
+              <a:rPr lang="en-US" dirty="0"/>
+              <a:t>hardware (purchasing and maintenance), backups, DNS, etc.</a:t>
+            </a:r>
+          </a:p>
+          <a:p>
+            <a:r>
+              <a:rPr lang="en-US" dirty="0"/>
+              <a:t>Many companies do it, but can be difficult for startups and private individuals</a:t>
+            </a:r>
+          </a:p>
+        </p:txBody>
+      </p:sp>
+    </p:spTree>
+    <p:extLst>
+      <p:ext uri="{BB962C8B-B14F-4D97-AF65-F5344CB8AC3E}">
+        <p14:creationId xmlns:p14="http://schemas.microsoft.com/office/powerpoint/2010/main" val="892869614"/>
+      </p:ext>
+    </p:extLst>
+  </p:cSld>
+  <p:clrMapOvr>
+    <a:masterClrMapping/>
+  </p:clrMapOvr>
+</p:sld>
+</file>
+
+<file path=ppt/slides/slide24.xml><?xml version="1.0" encoding="utf-8"?>
+<p:sld xmlns:a="http://schemas.openxmlformats.org/drawingml/2006/main" xmlns:r="http://schemas.openxmlformats.org/officeDocument/2006/relationships" xmlns:p="http://schemas.openxmlformats.org/presentationml/2006/main">
+  <p:cSld>
+    <p:spTree>
+      <p:nvGrpSpPr>
+        <p:cNvPr id="1" name=""/>
+        <p:cNvGrpSpPr/>
+        <p:nvPr/>
+      </p:nvGrpSpPr>
+      <p:grpSpPr>
+        <a:xfrm>
+          <a:off x="0" y="0"/>
+          <a:ext cx="0" cy="0"/>
+          <a:chOff x="0" y="0"/>
+          <a:chExt cx="0" cy="0"/>
+        </a:xfrm>
+      </p:grpSpPr>
+      <p:sp>
+        <p:nvSpPr>
+          <p:cNvPr id="2" name="Title 1"/>
+          <p:cNvSpPr>
+            <a:spLocks noGrp="1"/>
+          </p:cNvSpPr>
+          <p:nvPr>
+            <p:ph type="title"/>
+          </p:nvPr>
+        </p:nvSpPr>
+        <p:spPr/>
+        <p:txBody>
+          <a:bodyPr/>
+          <a:lstStyle/>
+          <a:p>
+            <a:r>
+              <a:rPr lang="en-US" dirty="0"/>
               <a:t>Cloud Deployment</a:t>
             </a:r>
           </a:p>
@@ -5507,7 +5617,7 @@
 </p:sld>
 </file>
 
-<file path=ppt/slides/slide24.xml><?xml version="1.0" encoding="utf-8"?>
+<file path=ppt/slides/slide25.xml><?xml version="1.0" encoding="utf-8"?>
 <p:sld xmlns:a="http://schemas.openxmlformats.org/drawingml/2006/main" xmlns:r="http://schemas.openxmlformats.org/officeDocument/2006/relationships" xmlns:p="http://schemas.openxmlformats.org/presentationml/2006/main">
   <p:cSld>
     <p:spTree>
@@ -5605,155 +5715,6 @@
 </p:sld>
 </file>
 
-<file path=ppt/slides/slide25.xml><?xml version="1.0" encoding="utf-8"?>
-<p:sld xmlns:a="http://schemas.openxmlformats.org/drawingml/2006/main" xmlns:r="http://schemas.openxmlformats.org/officeDocument/2006/relationships" xmlns:p="http://schemas.openxmlformats.org/presentationml/2006/main">
-  <p:cSld>
-    <p:spTree>
-      <p:nvGrpSpPr>
-        <p:cNvPr id="1" name=""/>
-        <p:cNvGrpSpPr/>
-        <p:nvPr/>
-      </p:nvGrpSpPr>
-      <p:grpSpPr>
-        <a:xfrm>
-          <a:off x="0" y="0"/>
-          <a:ext cx="0" cy="0"/>
-          <a:chOff x="0" y="0"/>
-          <a:chExt cx="0" cy="0"/>
-        </a:xfrm>
-      </p:grpSpPr>
-      <p:sp>
-        <p:nvSpPr>
-          <p:cNvPr id="2" name="Title 1"/>
-          <p:cNvSpPr>
-            <a:spLocks noGrp="1"/>
-          </p:cNvSpPr>
-          <p:nvPr>
-            <p:ph type="title"/>
-          </p:nvPr>
-        </p:nvSpPr>
-        <p:spPr/>
-        <p:txBody>
-          <a:bodyPr/>
-          <a:lstStyle/>
-          <a:p>
-            <a:r>
-              <a:rPr lang="en-US" dirty="0" err="1"/>
-              <a:t>Heroku</a:t>
-            </a:r>
-            <a:endParaRPr lang="en-US" dirty="0"/>
-          </a:p>
-        </p:txBody>
-      </p:sp>
-      <p:sp>
-        <p:nvSpPr>
-          <p:cNvPr id="3" name="Content Placeholder 2"/>
-          <p:cNvSpPr>
-            <a:spLocks noGrp="1"/>
-          </p:cNvSpPr>
-          <p:nvPr>
-            <p:ph idx="1"/>
-          </p:nvPr>
-        </p:nvSpPr>
-        <p:spPr>
-          <a:xfrm>
-            <a:off x="188535" y="1825624"/>
-            <a:ext cx="11830639" cy="4857979"/>
-          </a:xfrm>
-        </p:spPr>
-        <p:txBody>
-          <a:bodyPr>
-            <a:normAutofit lnSpcReduction="10000"/>
-          </a:bodyPr>
-          <a:lstStyle/>
-          <a:p>
-            <a:r>
-              <a:rPr lang="en-US" dirty="0"/>
-              <a:t>One of the main cloud providers</a:t>
-            </a:r>
-          </a:p>
-          <a:p>
-            <a:r>
-              <a:rPr lang="en-US" dirty="0"/>
-              <a:t>Using this one in the examples because, at the time of this writing, it provides </a:t>
-            </a:r>
-            <a:r>
-              <a:rPr lang="en-US" i="1" dirty="0"/>
-              <a:t>easy</a:t>
-            </a:r>
-            <a:r>
-              <a:rPr lang="en-US" dirty="0"/>
-              <a:t> to use </a:t>
-            </a:r>
-            <a:r>
-              <a:rPr lang="en-US" i="1" dirty="0"/>
-              <a:t>free</a:t>
-            </a:r>
-            <a:r>
-              <a:rPr lang="en-US" dirty="0"/>
-              <a:t> hosting</a:t>
-            </a:r>
-          </a:p>
-          <a:p>
-            <a:pPr lvl="1"/>
-            <a:r>
-              <a:rPr lang="en-US" dirty="0"/>
-              <a:t>note, this might change at any time </a:t>
-            </a:r>
-          </a:p>
-          <a:p>
-            <a:r>
-              <a:rPr lang="en-US" dirty="0"/>
-              <a:t>Supporting Java and </a:t>
-            </a:r>
-            <a:r>
-              <a:rPr lang="en-US" dirty="0" err="1"/>
-              <a:t>SpringBoot</a:t>
-            </a:r>
-            <a:r>
-              <a:rPr lang="en-US" dirty="0"/>
-              <a:t> applications</a:t>
-            </a:r>
-          </a:p>
-          <a:p>
-            <a:r>
-              <a:rPr lang="en-US" dirty="0"/>
-              <a:t>Maven plugin to deploy your self-executable JAR  by command line</a:t>
-            </a:r>
-          </a:p>
-          <a:p>
-            <a:r>
-              <a:rPr lang="en-US" i="1" dirty="0"/>
-              <a:t>Automatically</a:t>
-            </a:r>
-            <a:r>
-              <a:rPr lang="en-US" dirty="0"/>
-              <a:t> setting up environment variables to configure Spring to use </a:t>
-            </a:r>
-            <a:r>
-              <a:rPr lang="en-US" dirty="0" err="1"/>
-              <a:t>Heroku’s</a:t>
-            </a:r>
-            <a:r>
-              <a:rPr lang="en-US" dirty="0"/>
-              <a:t> databases</a:t>
-            </a:r>
-          </a:p>
-        </p:txBody>
-      </p:sp>
-    </p:spTree>
-    <p:extLst>
-      <p:ext uri="{BB962C8B-B14F-4D97-AF65-F5344CB8AC3E}">
-        <p14:creationId xmlns:p14="http://schemas.microsoft.com/office/powerpoint/2010/main" val="3602663906"/>
-      </p:ext>
-    </p:extLst>
-  </p:cSld>
-  <p:clrMapOvr>
-    <a:masterClrMapping/>
-  </p:clrMapOvr>
-</p:sld>
-</file>
-
 <file path=ppt/slides/slide26.xml><?xml version="1.0" encoding="utf-8"?>
 <p:sld xmlns:a="http://schemas.openxmlformats.org/drawingml/2006/main" xmlns:r="http://schemas.openxmlformats.org/officeDocument/2006/relationships" xmlns:p="http://schemas.openxmlformats.org/presentationml/2006/main">
   <p:cSld>
@@ -5787,10 +5748,6 @@
           <a:lstStyle/>
           <a:p>
             <a:r>
-              <a:rPr lang="en-US" dirty="0"/>
-              <a:t>Using </a:t>
-            </a:r>
-            <a:r>
               <a:rPr lang="en-US" dirty="0" err="1"/>
               <a:t>Heroku</a:t>
             </a:r>
@@ -5810,85 +5767,94 @@
         </p:nvSpPr>
         <p:spPr>
           <a:xfrm>
-            <a:off x="179109" y="1825625"/>
-            <a:ext cx="11736371" cy="4867406"/>
+            <a:off x="188535" y="1825624"/>
+            <a:ext cx="11830639" cy="4857979"/>
           </a:xfrm>
         </p:spPr>
         <p:txBody>
-          <a:bodyPr/>
-          <a:lstStyle/>
-          <a:p>
-            <a:r>
-              <a:rPr lang="en-US" dirty="0"/>
-              <a:t>First you need to create an account at </a:t>
-            </a:r>
-            <a:r>
-              <a:rPr lang="en-US" dirty="0">
-                <a:hlinkClick r:id="rId2"/>
-              </a:rPr>
-              <a:t>www.heroku.com</a:t>
-            </a:r>
-            <a:endParaRPr lang="en-US" dirty="0"/>
-          </a:p>
-          <a:p>
-            <a:r>
-              <a:rPr lang="en-US" dirty="0"/>
-              <a:t>Install </a:t>
-            </a:r>
-            <a:r>
-              <a:rPr lang="en-US" i="1" dirty="0" err="1"/>
-              <a:t>Heroku</a:t>
+          <a:bodyPr>
+            <a:normAutofit lnSpcReduction="10000"/>
+          </a:bodyPr>
+          <a:lstStyle/>
+          <a:p>
+            <a:r>
+              <a:rPr lang="en-US" dirty="0"/>
+              <a:t>One of the main cloud providers</a:t>
+            </a:r>
+          </a:p>
+          <a:p>
+            <a:r>
+              <a:rPr lang="en-US" dirty="0"/>
+              <a:t>Using this one in the examples because, at the time of this writing, it provides </a:t>
             </a:r>
             <a:r>
               <a:rPr lang="en-US" i="1" dirty="0"/>
-              <a:t> CLI</a:t>
-            </a:r>
-            <a:r>
-              <a:rPr lang="en-US" dirty="0"/>
-              <a:t>, which allows you to interact with </a:t>
+              <a:t>easy</a:t>
+            </a:r>
+            <a:r>
+              <a:rPr lang="en-US" dirty="0"/>
+              <a:t> to use </a:t>
+            </a:r>
+            <a:r>
+              <a:rPr lang="en-US" i="1" dirty="0"/>
+              <a:t>free</a:t>
+            </a:r>
+            <a:r>
+              <a:rPr lang="en-US" dirty="0"/>
+              <a:t> hosting</a:t>
+            </a:r>
+          </a:p>
+          <a:p>
+            <a:pPr lvl="1"/>
+            <a:r>
+              <a:rPr lang="en-US" dirty="0"/>
+              <a:t>note, this might change at any time </a:t>
+            </a:r>
+          </a:p>
+          <a:p>
+            <a:r>
+              <a:rPr lang="en-US" dirty="0"/>
+              <a:t>Supporting Java and </a:t>
             </a:r>
             <a:r>
               <a:rPr lang="en-US" dirty="0" err="1"/>
-              <a:t>Heroku</a:t>
-            </a:r>
-            <a:r>
-              <a:rPr lang="en-US" dirty="0"/>
-              <a:t> from command line</a:t>
-            </a:r>
-          </a:p>
-          <a:p>
-            <a:r>
-              <a:rPr lang="en-US" dirty="0"/>
-              <a:t>On the web interface, create an “app” with a name of your choice. In these slides, I will use “</a:t>
-            </a:r>
+              <a:t>SpringBoot</a:t>
+            </a:r>
+            <a:r>
+              <a:rPr lang="en-US" dirty="0"/>
+              <a:t> applications</a:t>
+            </a:r>
+          </a:p>
+          <a:p>
+            <a:r>
+              <a:rPr lang="en-US" dirty="0"/>
+              <a:t>Maven plugin to deploy your self-executable JAR  by command line</a:t>
+            </a:r>
+          </a:p>
+          <a:p>
             <a:r>
               <a:rPr lang="en-US" i="1" dirty="0"/>
-              <a:t>quizgame-pg5100</a:t>
-            </a:r>
-            <a:r>
-              <a:rPr lang="en-US" dirty="0"/>
-              <a:t>”</a:t>
-            </a:r>
-          </a:p>
-          <a:p>
-            <a:pPr lvl="1"/>
-            <a:r>
-              <a:rPr lang="en-US" dirty="0"/>
-              <a:t>as names are unique, you will need to choose a different name</a:t>
-            </a:r>
-          </a:p>
-          <a:p>
-            <a:pPr marL="0" indent="0">
-              <a:buNone/>
-            </a:pPr>
-            <a:endParaRPr lang="en-US" dirty="0"/>
+              <a:t>Automatically</a:t>
+            </a:r>
+            <a:r>
+              <a:rPr lang="en-US" dirty="0"/>
+              <a:t> setting up environment variables to configure Spring to use </a:t>
+            </a:r>
+            <a:r>
+              <a:rPr lang="en-US" dirty="0" err="1"/>
+              <a:t>Heroku’s</a:t>
+            </a:r>
+            <a:r>
+              <a:rPr lang="en-US" dirty="0"/>
+              <a:t> databases</a:t>
+            </a:r>
           </a:p>
         </p:txBody>
       </p:sp>
     </p:spTree>
     <p:extLst>
       <p:ext uri="{BB962C8B-B14F-4D97-AF65-F5344CB8AC3E}">
-        <p14:creationId xmlns:p14="http://schemas.microsoft.com/office/powerpoint/2010/main" val="3754014603"/>
+        <p14:creationId xmlns:p14="http://schemas.microsoft.com/office/powerpoint/2010/main" val="3602663906"/>
       </p:ext>
     </p:extLst>
   </p:cSld>
@@ -5932,8 +5898,13 @@
           <a:p>
             <a:r>
               <a:rPr lang="en-US" dirty="0"/>
-              <a:t>Jar Deployment</a:t>
-            </a:r>
+              <a:t>Using </a:t>
+            </a:r>
+            <a:r>
+              <a:rPr lang="en-US" dirty="0" err="1"/>
+              <a:t>Heroku</a:t>
+            </a:r>
+            <a:endParaRPr lang="en-US" dirty="0"/>
           </a:p>
         </p:txBody>
       </p:sp>
@@ -5949,101 +5920,85 @@
         </p:nvSpPr>
         <p:spPr>
           <a:xfrm>
-            <a:off x="169682" y="1825625"/>
-            <a:ext cx="11830640" cy="4867406"/>
+            <a:off x="179109" y="1825625"/>
+            <a:ext cx="11736371" cy="4867406"/>
           </a:xfrm>
         </p:spPr>
         <p:txBody>
-          <a:bodyPr>
-            <a:normAutofit/>
-          </a:bodyPr>
-          <a:lstStyle/>
-          <a:p>
-            <a:r>
-              <a:rPr lang="en-US" sz="3200" dirty="0"/>
-              <a:t>Configure the </a:t>
-            </a:r>
-            <a:r>
-              <a:rPr lang="en-US" sz="3200" i="1" dirty="0" err="1"/>
-              <a:t>heroku</a:t>
-            </a:r>
-            <a:r>
-              <a:rPr lang="en-US" sz="3200" i="1" dirty="0"/>
-              <a:t>-maven-plugin</a:t>
-            </a:r>
-          </a:p>
-          <a:p>
-            <a:r>
-              <a:rPr lang="en-US" sz="3200" dirty="0"/>
-              <a:t>Need to run Maven </a:t>
-            </a:r>
-          </a:p>
-          <a:p>
-            <a:r>
-              <a:rPr lang="en-US" sz="3200" b="1" dirty="0" err="1"/>
-              <a:t>mvn</a:t>
-            </a:r>
-            <a:r>
-              <a:rPr lang="en-US" sz="3200" b="1" dirty="0"/>
-              <a:t> clean package </a:t>
-            </a:r>
-            <a:r>
-              <a:rPr lang="en-US" sz="3200" b="1" dirty="0" err="1"/>
-              <a:t>heroku:deploy</a:t>
-            </a:r>
-            <a:r>
-              <a:rPr lang="en-US" sz="3200" b="1" dirty="0"/>
-              <a:t> -</a:t>
-            </a:r>
-            <a:r>
-              <a:rPr lang="en-US" sz="3200" b="1" dirty="0" err="1"/>
-              <a:t>Dheroku.logProgress</a:t>
-            </a:r>
-            <a:r>
-              <a:rPr lang="en-US" sz="3200" b="1" dirty="0"/>
-              <a:t>=true</a:t>
-            </a:r>
-          </a:p>
-          <a:p>
-            <a:r>
-              <a:rPr lang="en-US" sz="3200" dirty="0"/>
-              <a:t>The application will then be available online at </a:t>
-            </a:r>
-            <a:r>
-              <a:rPr lang="en-US" sz="3200" dirty="0">
+          <a:bodyPr/>
+          <a:lstStyle/>
+          <a:p>
+            <a:r>
+              <a:rPr lang="en-US" dirty="0"/>
+              <a:t>First you need to create an account at </a:t>
+            </a:r>
+            <a:r>
+              <a:rPr lang="en-US" dirty="0">
                 <a:hlinkClick r:id="rId2"/>
               </a:rPr>
-              <a:t>https://quizgame-pg5100.herokuapp.com</a:t>
-            </a:r>
-            <a:endParaRPr lang="en-US" sz="3200" dirty="0"/>
+              <a:t>www.heroku.com</a:t>
+            </a:r>
+            <a:endParaRPr lang="en-US" dirty="0"/>
+          </a:p>
+          <a:p>
+            <a:r>
+              <a:rPr lang="en-US" dirty="0"/>
+              <a:t>Install </a:t>
+            </a:r>
+            <a:r>
+              <a:rPr lang="en-US" i="1" dirty="0" err="1"/>
+              <a:t>Heroku</a:t>
+            </a:r>
+            <a:r>
+              <a:rPr lang="en-US" i="1" dirty="0"/>
+              <a:t> CLI</a:t>
+            </a:r>
+            <a:r>
+              <a:rPr lang="en-US" dirty="0"/>
+              <a:t>, which allows you to interact with </a:t>
+            </a:r>
+            <a:r>
+              <a:rPr lang="en-US" dirty="0" err="1"/>
+              <a:t>Heroku</a:t>
+            </a:r>
+            <a:r>
+              <a:rPr lang="en-US" dirty="0"/>
+              <a:t> from command line</a:t>
+            </a:r>
+          </a:p>
+          <a:p>
+            <a:r>
+              <a:rPr lang="en-US" dirty="0"/>
+              <a:t>On the web interface, create an “app” with a name of your choice. In these slides, I will use “</a:t>
+            </a:r>
+            <a:r>
+              <a:rPr lang="en-US" i="1" dirty="0"/>
+              <a:t>quizgame-pg5100</a:t>
+            </a:r>
+            <a:r>
+              <a:rPr lang="en-US" dirty="0"/>
+              <a:t>”</a:t>
+            </a:r>
           </a:p>
           <a:p>
             <a:pPr lvl="1"/>
             <a:r>
-              <a:rPr lang="en-US" sz="2400" dirty="0"/>
-              <a:t>Note the HTTPS protocol, </a:t>
-            </a:r>
-            <a:r>
-              <a:rPr lang="en-US" sz="2400" dirty="0" err="1"/>
-              <a:t>ie</a:t>
-            </a:r>
-            <a:r>
-              <a:rPr lang="en-US" sz="2400" dirty="0"/>
-              <a:t> encrypted</a:t>
-            </a:r>
-          </a:p>
-          <a:p>
-            <a:r>
-              <a:rPr lang="en-US" sz="3200" dirty="0"/>
-              <a:t>But before accessing it, you need to configure its environment</a:t>
-            </a:r>
+              <a:rPr lang="en-US" dirty="0"/>
+              <a:t>as names are unique, you will need to choose a different name</a:t>
+            </a:r>
+          </a:p>
+          <a:p>
+            <a:pPr marL="0" indent="0">
+              <a:buNone/>
+            </a:pPr>
+            <a:endParaRPr lang="en-US" dirty="0"/>
           </a:p>
         </p:txBody>
       </p:sp>
     </p:spTree>
     <p:extLst>
       <p:ext uri="{BB962C8B-B14F-4D97-AF65-F5344CB8AC3E}">
-        <p14:creationId xmlns:p14="http://schemas.microsoft.com/office/powerpoint/2010/main" val="1639485938"/>
+        <p14:creationId xmlns:p14="http://schemas.microsoft.com/office/powerpoint/2010/main" val="3754014603"/>
       </p:ext>
     </p:extLst>
   </p:cSld>
@@ -6087,6 +6042,161 @@
           <a:p>
             <a:r>
               <a:rPr lang="en-US" dirty="0"/>
+              <a:t>Jar Deployment</a:t>
+            </a:r>
+          </a:p>
+        </p:txBody>
+      </p:sp>
+      <p:sp>
+        <p:nvSpPr>
+          <p:cNvPr id="3" name="Content Placeholder 2"/>
+          <p:cNvSpPr>
+            <a:spLocks noGrp="1"/>
+          </p:cNvSpPr>
+          <p:nvPr>
+            <p:ph idx="1"/>
+          </p:nvPr>
+        </p:nvSpPr>
+        <p:spPr>
+          <a:xfrm>
+            <a:off x="169682" y="1825625"/>
+            <a:ext cx="11830640" cy="4867406"/>
+          </a:xfrm>
+        </p:spPr>
+        <p:txBody>
+          <a:bodyPr>
+            <a:normAutofit/>
+          </a:bodyPr>
+          <a:lstStyle/>
+          <a:p>
+            <a:r>
+              <a:rPr lang="en-US" sz="3200" dirty="0"/>
+              <a:t>Configure the </a:t>
+            </a:r>
+            <a:r>
+              <a:rPr lang="en-US" sz="3200" i="1" dirty="0" err="1"/>
+              <a:t>heroku</a:t>
+            </a:r>
+            <a:r>
+              <a:rPr lang="en-US" sz="3200" i="1" dirty="0"/>
+              <a:t>-maven-plugin</a:t>
+            </a:r>
+          </a:p>
+          <a:p>
+            <a:r>
+              <a:rPr lang="en-US" sz="3200" dirty="0"/>
+              <a:t>Need to run Maven </a:t>
+            </a:r>
+          </a:p>
+          <a:p>
+            <a:r>
+              <a:rPr lang="en-US" sz="3200" b="1" dirty="0" err="1"/>
+              <a:t>mvn</a:t>
+            </a:r>
+            <a:r>
+              <a:rPr lang="en-US" sz="3200" b="1" dirty="0"/>
+              <a:t> clean package </a:t>
+            </a:r>
+            <a:r>
+              <a:rPr lang="en-US" sz="3200" b="1" dirty="0" err="1"/>
+              <a:t>heroku:deploy</a:t>
+            </a:r>
+            <a:r>
+              <a:rPr lang="en-US" sz="3200" b="1" dirty="0"/>
+              <a:t> -</a:t>
+            </a:r>
+            <a:r>
+              <a:rPr lang="en-US" sz="3200" b="1" dirty="0" err="1"/>
+              <a:t>Dheroku.logProgress</a:t>
+            </a:r>
+            <a:r>
+              <a:rPr lang="en-US" sz="3200" b="1" dirty="0"/>
+              <a:t>=true</a:t>
+            </a:r>
+          </a:p>
+          <a:p>
+            <a:r>
+              <a:rPr lang="en-US" sz="3200" dirty="0"/>
+              <a:t>The application will then be available online at </a:t>
+            </a:r>
+            <a:r>
+              <a:rPr lang="en-US" sz="3200" dirty="0">
+                <a:hlinkClick r:id="rId2"/>
+              </a:rPr>
+              <a:t>https://quizgame-pg5100.herokuapp.com</a:t>
+            </a:r>
+            <a:endParaRPr lang="en-US" sz="3200" dirty="0"/>
+          </a:p>
+          <a:p>
+            <a:pPr lvl="1"/>
+            <a:r>
+              <a:rPr lang="en-US" sz="2400" dirty="0"/>
+              <a:t>Note the HTTPS protocol, </a:t>
+            </a:r>
+            <a:r>
+              <a:rPr lang="en-US" sz="2400" dirty="0" err="1"/>
+              <a:t>ie</a:t>
+            </a:r>
+            <a:r>
+              <a:rPr lang="en-US" sz="2400" dirty="0"/>
+              <a:t> encrypted</a:t>
+            </a:r>
+          </a:p>
+          <a:p>
+            <a:r>
+              <a:rPr lang="en-US" sz="3200" dirty="0"/>
+              <a:t>But before accessing it, you need to configure its environment</a:t>
+            </a:r>
+          </a:p>
+        </p:txBody>
+      </p:sp>
+    </p:spTree>
+    <p:extLst>
+      <p:ext uri="{BB962C8B-B14F-4D97-AF65-F5344CB8AC3E}">
+        <p14:creationId xmlns:p14="http://schemas.microsoft.com/office/powerpoint/2010/main" val="1639485938"/>
+      </p:ext>
+    </p:extLst>
+  </p:cSld>
+  <p:clrMapOvr>
+    <a:masterClrMapping/>
+  </p:clrMapOvr>
+</p:sld>
+</file>
+
+<file path=ppt/slides/slide29.xml><?xml version="1.0" encoding="utf-8"?>
+<p:sld xmlns:a="http://schemas.openxmlformats.org/drawingml/2006/main" xmlns:r="http://schemas.openxmlformats.org/officeDocument/2006/relationships" xmlns:p="http://schemas.openxmlformats.org/presentationml/2006/main">
+  <p:cSld>
+    <p:spTree>
+      <p:nvGrpSpPr>
+        <p:cNvPr id="1" name=""/>
+        <p:cNvGrpSpPr/>
+        <p:nvPr/>
+      </p:nvGrpSpPr>
+      <p:grpSpPr>
+        <a:xfrm>
+          <a:off x="0" y="0"/>
+          <a:ext cx="0" cy="0"/>
+          <a:chOff x="0" y="0"/>
+          <a:chExt cx="0" cy="0"/>
+        </a:xfrm>
+      </p:grpSpPr>
+      <p:sp>
+        <p:nvSpPr>
+          <p:cNvPr id="2" name="Title 1"/>
+          <p:cNvSpPr>
+            <a:spLocks noGrp="1"/>
+          </p:cNvSpPr>
+          <p:nvPr>
+            <p:ph type="title"/>
+          </p:nvPr>
+        </p:nvSpPr>
+        <p:spPr/>
+        <p:txBody>
+          <a:bodyPr/>
+          <a:lstStyle/>
+          <a:p>
+            <a:r>
+              <a:rPr lang="en-US" dirty="0"/>
               <a:t>From Command Line (CLI)</a:t>
             </a:r>
           </a:p>
@@ -6284,7 +6394,59 @@
 </p:sld>
 </file>
 
-<file path=ppt/slides/slide29.xml><?xml version="1.0" encoding="utf-8"?>
+<file path=ppt/slides/slide3.xml><?xml version="1.0" encoding="utf-8"?>
+<p:sld xmlns:a="http://schemas.openxmlformats.org/drawingml/2006/main" xmlns:r="http://schemas.openxmlformats.org/officeDocument/2006/relationships" xmlns:p="http://schemas.openxmlformats.org/presentationml/2006/main">
+  <p:cSld>
+    <p:spTree>
+      <p:nvGrpSpPr>
+        <p:cNvPr id="1" name=""/>
+        <p:cNvGrpSpPr/>
+        <p:nvPr/>
+      </p:nvGrpSpPr>
+      <p:grpSpPr>
+        <a:xfrm>
+          <a:off x="0" y="0"/>
+          <a:ext cx="0" cy="0"/>
+          <a:chOff x="0" y="0"/>
+          <a:chExt cx="0" cy="0"/>
+        </a:xfrm>
+      </p:grpSpPr>
+      <p:sp>
+        <p:nvSpPr>
+          <p:cNvPr id="4" name="Title 3"/>
+          <p:cNvSpPr>
+            <a:spLocks noGrp="1"/>
+          </p:cNvSpPr>
+          <p:nvPr>
+            <p:ph type="title"/>
+          </p:nvPr>
+        </p:nvSpPr>
+        <p:spPr/>
+        <p:txBody>
+          <a:bodyPr/>
+          <a:lstStyle/>
+          <a:p>
+            <a:r>
+              <a:rPr lang="en-US" dirty="0"/>
+              <a:t>Continuous Integration (CI)</a:t>
+            </a:r>
+          </a:p>
+        </p:txBody>
+      </p:sp>
+    </p:spTree>
+    <p:extLst>
+      <p:ext uri="{BB962C8B-B14F-4D97-AF65-F5344CB8AC3E}">
+        <p14:creationId xmlns:p14="http://schemas.microsoft.com/office/powerpoint/2010/main" val="978586533"/>
+      </p:ext>
+    </p:extLst>
+  </p:cSld>
+  <p:clrMapOvr>
+    <a:masterClrMapping/>
+  </p:clrMapOvr>
+</p:sld>
+</file>
+
+<file path=ppt/slides/slide30.xml><?xml version="1.0" encoding="utf-8"?>
 <p:sld xmlns:a="http://schemas.openxmlformats.org/drawingml/2006/main" xmlns:r="http://schemas.openxmlformats.org/officeDocument/2006/relationships" xmlns:p="http://schemas.openxmlformats.org/presentationml/2006/main">
   <p:cSld>
     <p:spTree>
@@ -6378,239 +6540,6 @@
 </p:sld>
 </file>
 
-<file path=ppt/slides/slide3.xml><?xml version="1.0" encoding="utf-8"?>
-<p:sld xmlns:a="http://schemas.openxmlformats.org/drawingml/2006/main" xmlns:r="http://schemas.openxmlformats.org/officeDocument/2006/relationships" xmlns:p="http://schemas.openxmlformats.org/presentationml/2006/main">
-  <p:cSld>
-    <p:spTree>
-      <p:nvGrpSpPr>
-        <p:cNvPr id="1" name=""/>
-        <p:cNvGrpSpPr/>
-        <p:nvPr/>
-      </p:nvGrpSpPr>
-      <p:grpSpPr>
-        <a:xfrm>
-          <a:off x="0" y="0"/>
-          <a:ext cx="0" cy="0"/>
-          <a:chOff x="0" y="0"/>
-          <a:chExt cx="0" cy="0"/>
-        </a:xfrm>
-      </p:grpSpPr>
-      <p:sp>
-        <p:nvSpPr>
-          <p:cNvPr id="4" name="Title 3"/>
-          <p:cNvSpPr>
-            <a:spLocks noGrp="1"/>
-          </p:cNvSpPr>
-          <p:nvPr>
-            <p:ph type="title"/>
-          </p:nvPr>
-        </p:nvSpPr>
-        <p:spPr/>
-        <p:txBody>
-          <a:bodyPr/>
-          <a:lstStyle/>
-          <a:p>
-            <a:r>
-              <a:rPr lang="en-US" dirty="0"/>
-              <a:t>Continuous Integration (CI)</a:t>
-            </a:r>
-          </a:p>
-        </p:txBody>
-      </p:sp>
-    </p:spTree>
-    <p:extLst>
-      <p:ext uri="{BB962C8B-B14F-4D97-AF65-F5344CB8AC3E}">
-        <p14:creationId xmlns:p14="http://schemas.microsoft.com/office/powerpoint/2010/main" val="978586533"/>
-      </p:ext>
-    </p:extLst>
-  </p:cSld>
-  <p:clrMapOvr>
-    <a:masterClrMapping/>
-  </p:clrMapOvr>
-</p:sld>
-</file>
-
-<file path=ppt/slides/slide30.xml><?xml version="1.0" encoding="utf-8"?>
-<p:sld xmlns:a="http://schemas.openxmlformats.org/drawingml/2006/main" xmlns:r="http://schemas.openxmlformats.org/officeDocument/2006/relationships" xmlns:p="http://schemas.openxmlformats.org/presentationml/2006/main">
-  <p:cSld>
-    <p:spTree>
-      <p:nvGrpSpPr>
-        <p:cNvPr id="1" name=""/>
-        <p:cNvGrpSpPr/>
-        <p:nvPr/>
-      </p:nvGrpSpPr>
-      <p:grpSpPr>
-        <a:xfrm>
-          <a:off x="0" y="0"/>
-          <a:ext cx="0" cy="0"/>
-          <a:chOff x="0" y="0"/>
-          <a:chExt cx="0" cy="0"/>
-        </a:xfrm>
-      </p:grpSpPr>
-      <p:sp>
-        <p:nvSpPr>
-          <p:cNvPr id="2" name="Title 1"/>
-          <p:cNvSpPr>
-            <a:spLocks noGrp="1"/>
-          </p:cNvSpPr>
-          <p:nvPr>
-            <p:ph type="title"/>
-          </p:nvPr>
-        </p:nvSpPr>
-        <p:spPr/>
-        <p:txBody>
-          <a:bodyPr/>
-          <a:lstStyle/>
-          <a:p>
-            <a:r>
-              <a:rPr lang="en-US" dirty="0"/>
-              <a:t>Continuous Delivery (CD)</a:t>
-            </a:r>
-          </a:p>
-        </p:txBody>
-      </p:sp>
-      <p:sp>
-        <p:nvSpPr>
-          <p:cNvPr id="3" name="Content Placeholder 2"/>
-          <p:cNvSpPr>
-            <a:spLocks noGrp="1"/>
-          </p:cNvSpPr>
-          <p:nvPr>
-            <p:ph idx="1"/>
-          </p:nvPr>
-        </p:nvSpPr>
-        <p:spPr>
-          <a:xfrm>
-            <a:off x="197963" y="1825625"/>
-            <a:ext cx="11783505" cy="4867406"/>
-          </a:xfrm>
-        </p:spPr>
-        <p:txBody>
-          <a:bodyPr/>
-          <a:lstStyle/>
-          <a:p>
-            <a:r>
-              <a:rPr lang="en-US" dirty="0"/>
-              <a:t>Deployment can be done from Maven, as part of the build</a:t>
-            </a:r>
-          </a:p>
-          <a:p>
-            <a:r>
-              <a:rPr lang="en-US" dirty="0"/>
-              <a:t>You could trigger a deployment at each </a:t>
-            </a:r>
-            <a:r>
-              <a:rPr lang="en-US" dirty="0" err="1"/>
-              <a:t>Git</a:t>
-            </a:r>
-            <a:r>
-              <a:rPr lang="en-US" dirty="0"/>
-              <a:t> Push from a CI server (</a:t>
-            </a:r>
-            <a:r>
-              <a:rPr lang="en-US" dirty="0" err="1"/>
-              <a:t>eg</a:t>
-            </a:r>
-            <a:r>
-              <a:rPr lang="en-US" dirty="0"/>
-              <a:t>, Travis or Jenkins)</a:t>
-            </a:r>
-          </a:p>
-          <a:p>
-            <a:r>
-              <a:rPr lang="en-US" dirty="0"/>
-              <a:t>Of course, only if code compiles and all tests pass…</a:t>
-            </a:r>
-          </a:p>
-          <a:p>
-            <a:r>
-              <a:rPr lang="en-US" dirty="0"/>
-              <a:t>But you might want to have a special </a:t>
-            </a:r>
-            <a:r>
-              <a:rPr lang="en-US" dirty="0" err="1"/>
-              <a:t>Git</a:t>
-            </a:r>
-            <a:r>
-              <a:rPr lang="en-US" dirty="0"/>
-              <a:t> branch for deployment</a:t>
-            </a:r>
-          </a:p>
-          <a:p>
-            <a:pPr lvl="1"/>
-            <a:r>
-              <a:rPr lang="en-US" dirty="0" err="1"/>
-              <a:t>eg</a:t>
-            </a:r>
-            <a:r>
-              <a:rPr lang="en-US" dirty="0"/>
-              <a:t>, development on  a “</a:t>
-            </a:r>
-            <a:r>
-              <a:rPr lang="en-US" i="1" dirty="0"/>
-              <a:t>development</a:t>
-            </a:r>
-            <a:r>
-              <a:rPr lang="en-US" dirty="0"/>
-              <a:t>” </a:t>
-            </a:r>
-            <a:r>
-              <a:rPr lang="en-US" dirty="0" err="1"/>
-              <a:t>Git</a:t>
-            </a:r>
-            <a:r>
-              <a:rPr lang="en-US" dirty="0"/>
-              <a:t> branch and deployment on a “</a:t>
-            </a:r>
-            <a:r>
-              <a:rPr lang="en-US" i="1" dirty="0"/>
-              <a:t>deployment</a:t>
-            </a:r>
-            <a:r>
-              <a:rPr lang="en-US" dirty="0"/>
-              <a:t>” branch, done only when changes in “</a:t>
-            </a:r>
-            <a:r>
-              <a:rPr lang="en-US" i="1" dirty="0"/>
-              <a:t>development</a:t>
-            </a:r>
-            <a:r>
-              <a:rPr lang="en-US" dirty="0"/>
-              <a:t>” are </a:t>
-            </a:r>
-            <a:r>
-              <a:rPr lang="en-US" i="1" dirty="0"/>
-              <a:t>merged </a:t>
-            </a:r>
-            <a:r>
-              <a:rPr lang="en-US" dirty="0"/>
-              <a:t>into the “</a:t>
-            </a:r>
-            <a:r>
-              <a:rPr lang="en-US" i="1" dirty="0"/>
-              <a:t>deployment</a:t>
-            </a:r>
-            <a:r>
-              <a:rPr lang="en-US" dirty="0"/>
-              <a:t>” branch</a:t>
-            </a:r>
-            <a:endParaRPr lang="en-US" i="1" dirty="0"/>
-          </a:p>
-        </p:txBody>
-      </p:sp>
-    </p:spTree>
-    <p:extLst>
-      <p:ext uri="{BB962C8B-B14F-4D97-AF65-F5344CB8AC3E}">
-        <p14:creationId xmlns:p14="http://schemas.microsoft.com/office/powerpoint/2010/main" val="2625160086"/>
-      </p:ext>
-    </p:extLst>
-  </p:cSld>
-  <p:clrMapOvr>
-    <a:masterClrMapping/>
-  </p:clrMapOvr>
-</p:sld>
-</file>
-
 <file path=ppt/slides/slide31.xml><?xml version="1.0" encoding="utf-8"?>
 <p:sld xmlns:a="http://schemas.openxmlformats.org/drawingml/2006/main" xmlns:r="http://schemas.openxmlformats.org/officeDocument/2006/relationships" xmlns:p="http://schemas.openxmlformats.org/presentationml/2006/main">
   <p:cSld>
@@ -6645,6 +6574,187 @@
           <a:p>
             <a:r>
               <a:rPr lang="en-US" dirty="0"/>
+              <a:t>Continuous Delivery (CD)</a:t>
+            </a:r>
+          </a:p>
+        </p:txBody>
+      </p:sp>
+      <p:sp>
+        <p:nvSpPr>
+          <p:cNvPr id="3" name="Content Placeholder 2"/>
+          <p:cNvSpPr>
+            <a:spLocks noGrp="1"/>
+          </p:cNvSpPr>
+          <p:nvPr>
+            <p:ph idx="1"/>
+          </p:nvPr>
+        </p:nvSpPr>
+        <p:spPr>
+          <a:xfrm>
+            <a:off x="197963" y="1825625"/>
+            <a:ext cx="11783505" cy="4867406"/>
+          </a:xfrm>
+        </p:spPr>
+        <p:txBody>
+          <a:bodyPr/>
+          <a:lstStyle/>
+          <a:p>
+            <a:r>
+              <a:rPr lang="en-US" dirty="0"/>
+              <a:t>Deployment can be done from Maven, as part of the build</a:t>
+            </a:r>
+          </a:p>
+          <a:p>
+            <a:r>
+              <a:rPr lang="en-US" dirty="0"/>
+              <a:t>You could trigger a deployment at each </a:t>
+            </a:r>
+            <a:r>
+              <a:rPr lang="en-US" dirty="0" err="1"/>
+              <a:t>Git</a:t>
+            </a:r>
+            <a:r>
+              <a:rPr lang="en-US" dirty="0"/>
+              <a:t> Push from a CI server (</a:t>
+            </a:r>
+            <a:r>
+              <a:rPr lang="en-US" dirty="0" err="1"/>
+              <a:t>eg</a:t>
+            </a:r>
+            <a:r>
+              <a:rPr lang="en-US" dirty="0"/>
+              <a:t>, Travis or Jenkins)</a:t>
+            </a:r>
+          </a:p>
+          <a:p>
+            <a:r>
+              <a:rPr lang="en-US" dirty="0"/>
+              <a:t>Of course, only if code compiles and all tests pass…</a:t>
+            </a:r>
+          </a:p>
+          <a:p>
+            <a:r>
+              <a:rPr lang="en-US" dirty="0"/>
+              <a:t>But you might want to have a special </a:t>
+            </a:r>
+            <a:r>
+              <a:rPr lang="en-US" dirty="0" err="1"/>
+              <a:t>Git</a:t>
+            </a:r>
+            <a:r>
+              <a:rPr lang="en-US" dirty="0"/>
+              <a:t> branch for deployment</a:t>
+            </a:r>
+          </a:p>
+          <a:p>
+            <a:pPr lvl="1"/>
+            <a:r>
+              <a:rPr lang="en-US" dirty="0" err="1"/>
+              <a:t>eg</a:t>
+            </a:r>
+            <a:r>
+              <a:rPr lang="en-US" dirty="0"/>
+              <a:t>, development on  a “</a:t>
+            </a:r>
+            <a:r>
+              <a:rPr lang="en-US" i="1" dirty="0"/>
+              <a:t>development</a:t>
+            </a:r>
+            <a:r>
+              <a:rPr lang="en-US" dirty="0"/>
+              <a:t>” </a:t>
+            </a:r>
+            <a:r>
+              <a:rPr lang="en-US" dirty="0" err="1"/>
+              <a:t>Git</a:t>
+            </a:r>
+            <a:r>
+              <a:rPr lang="en-US" dirty="0"/>
+              <a:t> branch and deployment on a “</a:t>
+            </a:r>
+            <a:r>
+              <a:rPr lang="en-US" i="1" dirty="0"/>
+              <a:t>deployment</a:t>
+            </a:r>
+            <a:r>
+              <a:rPr lang="en-US" dirty="0"/>
+              <a:t>” branch, done only when changes in “</a:t>
+            </a:r>
+            <a:r>
+              <a:rPr lang="en-US" i="1" dirty="0"/>
+              <a:t>development</a:t>
+            </a:r>
+            <a:r>
+              <a:rPr lang="en-US" dirty="0"/>
+              <a:t>” are </a:t>
+            </a:r>
+            <a:r>
+              <a:rPr lang="en-US" i="1" dirty="0"/>
+              <a:t>merged </a:t>
+            </a:r>
+            <a:r>
+              <a:rPr lang="en-US" dirty="0"/>
+              <a:t>into the “</a:t>
+            </a:r>
+            <a:r>
+              <a:rPr lang="en-US" i="1" dirty="0"/>
+              <a:t>deployment</a:t>
+            </a:r>
+            <a:r>
+              <a:rPr lang="en-US" dirty="0"/>
+              <a:t>” branch</a:t>
+            </a:r>
+            <a:endParaRPr lang="en-US" i="1" dirty="0"/>
+          </a:p>
+        </p:txBody>
+      </p:sp>
+    </p:spTree>
+    <p:extLst>
+      <p:ext uri="{BB962C8B-B14F-4D97-AF65-F5344CB8AC3E}">
+        <p14:creationId xmlns:p14="http://schemas.microsoft.com/office/powerpoint/2010/main" val="2625160086"/>
+      </p:ext>
+    </p:extLst>
+  </p:cSld>
+  <p:clrMapOvr>
+    <a:masterClrMapping/>
+  </p:clrMapOvr>
+</p:sld>
+</file>
+
+<file path=ppt/slides/slide32.xml><?xml version="1.0" encoding="utf-8"?>
+<p:sld xmlns:a="http://schemas.openxmlformats.org/drawingml/2006/main" xmlns:r="http://schemas.openxmlformats.org/officeDocument/2006/relationships" xmlns:p="http://schemas.openxmlformats.org/presentationml/2006/main">
+  <p:cSld>
+    <p:spTree>
+      <p:nvGrpSpPr>
+        <p:cNvPr id="1" name=""/>
+        <p:cNvGrpSpPr/>
+        <p:nvPr/>
+      </p:nvGrpSpPr>
+      <p:grpSpPr>
+        <a:xfrm>
+          <a:off x="0" y="0"/>
+          <a:ext cx="0" cy="0"/>
+          <a:chOff x="0" y="0"/>
+          <a:chExt cx="0" cy="0"/>
+        </a:xfrm>
+      </p:grpSpPr>
+      <p:sp>
+        <p:nvSpPr>
+          <p:cNvPr id="2" name="Title 1"/>
+          <p:cNvSpPr>
+            <a:spLocks noGrp="1"/>
+          </p:cNvSpPr>
+          <p:nvPr>
+            <p:ph type="title"/>
+          </p:nvPr>
+        </p:nvSpPr>
+        <p:spPr/>
+        <p:txBody>
+          <a:bodyPr/>
+          <a:lstStyle/>
+          <a:p>
+            <a:r>
+              <a:rPr lang="en-US" dirty="0"/>
               <a:t>What Next?</a:t>
             </a:r>
           </a:p>
@@ -6781,7 +6891,7 @@
 </p:sld>
 </file>
 
-<file path=ppt/slides/slide32.xml><?xml version="1.0" encoding="utf-8"?>
+<file path=ppt/slides/slide33.xml><?xml version="1.0" encoding="utf-8"?>
 <p:sld xmlns:a="http://schemas.openxmlformats.org/drawingml/2006/main" xmlns:r="http://schemas.openxmlformats.org/officeDocument/2006/relationships" xmlns:p="http://schemas.openxmlformats.org/presentationml/2006/main">
   <p:cSld>
     <p:spTree>
@@ -7263,7 +7373,7 @@
           <a:p>
             <a:r>
               <a:rPr lang="en-US" dirty="0"/>
-              <a:t>Travis CI</a:t>
+              <a:t>CI Providers</a:t>
             </a:r>
           </a:p>
         </p:txBody>
@@ -7290,54 +7400,58 @@
           <a:p>
             <a:r>
               <a:rPr lang="en-US" dirty="0"/>
-              <a:t>A cloud CI provider: </a:t>
-            </a:r>
-            <a:r>
-              <a:rPr lang="en-US" dirty="0">
-                <a:hlinkClick r:id="rId2"/>
-              </a:rPr>
-              <a:t>www.travis-ci.org</a:t>
-            </a:r>
-            <a:endParaRPr lang="en-US" dirty="0"/>
-          </a:p>
-          <a:p>
-            <a:r>
-              <a:rPr lang="en-US" dirty="0"/>
-              <a:t>Free for open-source projects</a:t>
-            </a:r>
-          </a:p>
-          <a:p>
-            <a:r>
-              <a:rPr lang="en-US" dirty="0"/>
-              <a:t>Supporting many languages, not just Java</a:t>
-            </a:r>
-          </a:p>
-          <a:p>
-            <a:r>
-              <a:rPr lang="en-US" dirty="0"/>
-              <a:t>Can be integrated with GitHub, </a:t>
+              <a:t>There are some CI providers, that are </a:t>
+            </a:r>
+            <a:r>
+              <a:rPr lang="en-US" i="1" dirty="0"/>
+              <a:t>free</a:t>
+            </a:r>
+            <a:r>
+              <a:rPr lang="en-US" dirty="0"/>
+              <a:t> for </a:t>
+            </a:r>
+            <a:r>
+              <a:rPr lang="en-US" i="1" dirty="0"/>
+              <a:t>open-source</a:t>
+            </a:r>
+            <a:r>
+              <a:rPr lang="en-US" dirty="0"/>
+              <a:t> projects</a:t>
+            </a:r>
+          </a:p>
+          <a:p>
+            <a:pPr lvl="1"/>
+            <a:r>
+              <a:rPr lang="en-US" dirty="0"/>
+              <a:t>GitHub Actions, </a:t>
             </a:r>
             <a:r>
               <a:rPr lang="en-US" dirty="0" err="1"/>
-              <a:t>eg</a:t>
-            </a:r>
-            <a:r>
-              <a:rPr lang="en-US" dirty="0"/>
-              <a:t> build at each </a:t>
-            </a:r>
-            <a:r>
-              <a:rPr lang="en-US" dirty="0" err="1"/>
-              <a:t>Git</a:t>
-            </a:r>
-            <a:r>
-              <a:rPr lang="en-US" dirty="0"/>
-              <a:t> Push</a:t>
-            </a:r>
-          </a:p>
-          <a:p>
-            <a:r>
-              <a:rPr lang="en-US" dirty="0"/>
-              <a:t>Quite easy to setup: besides creating an account, in project you just need a “</a:t>
+              <a:t>CircleCI</a:t>
+            </a:r>
+            <a:r>
+              <a:rPr lang="en-US" dirty="0"/>
+              <a:t>, Travis (until 2020), etc.</a:t>
+            </a:r>
+          </a:p>
+          <a:p>
+            <a:r>
+              <a:rPr lang="en-US" b="1" dirty="0"/>
+              <a:t>GitHub Actions</a:t>
+            </a:r>
+          </a:p>
+          <a:p>
+            <a:pPr lvl="1"/>
+            <a:r>
+              <a:rPr lang="en-US" dirty="0"/>
+              <a:t>need to activate it from GUI of repository</a:t>
+            </a:r>
+          </a:p>
+          <a:p>
+            <a:pPr lvl="1"/>
+            <a:r>
+              <a:rPr lang="en-US" dirty="0"/>
+              <a:t>need configuration file, e.g., </a:t>
             </a:r>
             <a:r>
               <a:rPr lang="en-US" i="1" dirty="0"/>
@@ -7345,19 +7459,19 @@
             </a:r>
             <a:r>
               <a:rPr lang="en-US" i="1" dirty="0" err="1"/>
-              <a:t>travis.yml</a:t>
-            </a:r>
-            <a:r>
-              <a:rPr lang="en-US" dirty="0"/>
-              <a:t>” </a:t>
-            </a:r>
-            <a:r>
-              <a:rPr lang="en-US" dirty="0" err="1"/>
-              <a:t>config</a:t>
-            </a:r>
-            <a:r>
-              <a:rPr lang="en-US" dirty="0"/>
-              <a:t> file</a:t>
+              <a:t>github</a:t>
+            </a:r>
+            <a:r>
+              <a:rPr lang="en-US" i="1" dirty="0"/>
+              <a:t>/workflows/</a:t>
+            </a:r>
+            <a:r>
+              <a:rPr lang="en-US" i="1" dirty="0" err="1"/>
+              <a:t>ci.yml</a:t>
+            </a:r>
+            <a:r>
+              <a:rPr lang="en-US" dirty="0"/>
+              <a:t>   </a:t>
             </a:r>
           </a:p>
           <a:p>
@@ -7397,7 +7511,13 @@
       </p:grpSpPr>
       <p:pic>
         <p:nvPicPr>
-          <p:cNvPr id="4" name="Picture 3"/>
+          <p:cNvPr id="5" name="Picture 4">
+            <a:extLst>
+              <a:ext uri="{FF2B5EF4-FFF2-40B4-BE49-F238E27FC236}">
+                <a16:creationId xmlns:a16="http://schemas.microsoft.com/office/drawing/2014/main" id="{53A820FA-8F4E-4287-8CC4-526F7C951729}"/>
+              </a:ext>
+            </a:extLst>
+          </p:cNvPr>
           <p:cNvPicPr>
             <a:picLocks noChangeAspect="1"/>
           </p:cNvPicPr>
@@ -7411,82 +7531,18 @@
         </p:blipFill>
         <p:spPr>
           <a:xfrm>
-            <a:off x="247103" y="394636"/>
-            <a:ext cx="5312466" cy="5072513"/>
+            <a:off x="863660" y="0"/>
+            <a:ext cx="10464679" cy="6858000"/>
           </a:xfrm>
           <a:prstGeom prst="rect">
             <a:avLst/>
           </a:prstGeom>
         </p:spPr>
       </p:pic>
-      <p:pic>
-        <p:nvPicPr>
-          <p:cNvPr id="5" name="Picture 4"/>
-          <p:cNvPicPr>
-            <a:picLocks noChangeAspect="1"/>
-          </p:cNvPicPr>
-          <p:nvPr/>
-        </p:nvPicPr>
-        <p:blipFill>
-          <a:blip r:embed="rId3"/>
-          <a:stretch>
-            <a:fillRect/>
-          </a:stretch>
-        </p:blipFill>
-        <p:spPr>
-          <a:xfrm>
-            <a:off x="5993035" y="394636"/>
-            <a:ext cx="6095794" cy="4395336"/>
-          </a:xfrm>
-          <a:prstGeom prst="rect">
-            <a:avLst/>
-          </a:prstGeom>
-        </p:spPr>
-      </p:pic>
-      <p:sp>
-        <p:nvSpPr>
-          <p:cNvPr id="6" name="Right Arrow 5"/>
-          <p:cNvSpPr/>
-          <p:nvPr/>
-        </p:nvSpPr>
-        <p:spPr>
-          <a:xfrm rot="18914465">
-            <a:off x="5656151" y="1889791"/>
-            <a:ext cx="978408" cy="484632"/>
-          </a:xfrm>
-          <a:prstGeom prst="rightArrow">
-            <a:avLst/>
-          </a:prstGeom>
-        </p:spPr>
-        <p:style>
-          <a:lnRef idx="2">
-            <a:schemeClr val="accent1">
-              <a:shade val="50000"/>
-            </a:schemeClr>
-          </a:lnRef>
-          <a:fillRef idx="1">
-            <a:schemeClr val="accent1"/>
-          </a:fillRef>
-          <a:effectRef idx="0">
-            <a:schemeClr val="accent1"/>
-          </a:effectRef>
-          <a:fontRef idx="minor">
-            <a:schemeClr val="lt1"/>
-          </a:fontRef>
-        </p:style>
-        <p:txBody>
-          <a:bodyPr rtlCol="0" anchor="ctr"/>
-          <a:lstStyle/>
-          <a:p>
-            <a:pPr algn="ctr"/>
-            <a:endParaRPr lang="en-US"/>
-          </a:p>
-        </p:txBody>
-      </p:sp>
     </p:spTree>
     <p:extLst>
       <p:ext uri="{BB962C8B-B14F-4D97-AF65-F5344CB8AC3E}">
-        <p14:creationId xmlns:p14="http://schemas.microsoft.com/office/powerpoint/2010/main" val="2790283641"/>
+        <p14:creationId xmlns:p14="http://schemas.microsoft.com/office/powerpoint/2010/main" val="2396487800"/>
       </p:ext>
     </p:extLst>
   </p:cSld>
@@ -7513,24 +7569,114 @@
           <a:chExt cx="0" cy="0"/>
         </a:xfrm>
       </p:grpSpPr>
-      <p:sp>
-        <p:nvSpPr>
-          <p:cNvPr id="4" name="Title 3"/>
-          <p:cNvSpPr>
-            <a:spLocks noGrp="1"/>
-          </p:cNvSpPr>
-          <p:nvPr>
-            <p:ph type="title"/>
-          </p:nvPr>
-        </p:nvSpPr>
-        <p:spPr/>
-        <p:txBody>
-          <a:bodyPr/>
-          <a:lstStyle/>
-          <a:p>
-            <a:r>
-              <a:rPr lang="en-US" dirty="0"/>
-              <a:t>Database Maintenance</a:t>
+      <p:pic>
+        <p:nvPicPr>
+          <p:cNvPr id="7" name="Picture 6">
+            <a:extLst>
+              <a:ext uri="{FF2B5EF4-FFF2-40B4-BE49-F238E27FC236}">
+                <a16:creationId xmlns:a16="http://schemas.microsoft.com/office/drawing/2014/main" id="{2842C72A-20A4-46FA-B387-45CE531DA1F1}"/>
+              </a:ext>
+            </a:extLst>
+          </p:cNvPr>
+          <p:cNvPicPr>
+            <a:picLocks noChangeAspect="1"/>
+          </p:cNvPicPr>
+          <p:nvPr/>
+        </p:nvPicPr>
+        <p:blipFill>
+          <a:blip r:embed="rId2"/>
+          <a:stretch>
+            <a:fillRect/>
+          </a:stretch>
+        </p:blipFill>
+        <p:spPr>
+          <a:xfrm>
+            <a:off x="2603600" y="0"/>
+            <a:ext cx="6984799" cy="6858000"/>
+          </a:xfrm>
+          <a:prstGeom prst="rect">
+            <a:avLst/>
+          </a:prstGeom>
+        </p:spPr>
+      </p:pic>
+      <p:sp>
+        <p:nvSpPr>
+          <p:cNvPr id="8" name="Right Arrow 5">
+            <a:extLst>
+              <a:ext uri="{FF2B5EF4-FFF2-40B4-BE49-F238E27FC236}">
+                <a16:creationId xmlns:a16="http://schemas.microsoft.com/office/drawing/2014/main" id="{A06566C0-ECAC-4AE5-BB96-8837A4549031}"/>
+              </a:ext>
+            </a:extLst>
+          </p:cNvPr>
+          <p:cNvSpPr/>
+          <p:nvPr/>
+        </p:nvSpPr>
+        <p:spPr>
+          <a:xfrm>
+            <a:off x="2024539" y="5419375"/>
+            <a:ext cx="978408" cy="484632"/>
+          </a:xfrm>
+          <a:prstGeom prst="rightArrow">
+            <a:avLst/>
+          </a:prstGeom>
+        </p:spPr>
+        <p:style>
+          <a:lnRef idx="2">
+            <a:schemeClr val="accent1">
+              <a:shade val="50000"/>
+            </a:schemeClr>
+          </a:lnRef>
+          <a:fillRef idx="1">
+            <a:schemeClr val="accent1"/>
+          </a:fillRef>
+          <a:effectRef idx="0">
+            <a:schemeClr val="accent1"/>
+          </a:effectRef>
+          <a:fontRef idx="minor">
+            <a:schemeClr val="lt1"/>
+          </a:fontRef>
+        </p:style>
+        <p:txBody>
+          <a:bodyPr rtlCol="0" anchor="ctr"/>
+          <a:lstStyle/>
+          <a:p>
+            <a:pPr algn="ctr"/>
+            <a:endParaRPr lang="en-US"/>
+          </a:p>
+        </p:txBody>
+      </p:sp>
+      <p:sp>
+        <p:nvSpPr>
+          <p:cNvPr id="9" name="TextBox 8">
+            <a:extLst>
+              <a:ext uri="{FF2B5EF4-FFF2-40B4-BE49-F238E27FC236}">
+                <a16:creationId xmlns:a16="http://schemas.microsoft.com/office/drawing/2014/main" id="{C7AC98B7-EC03-431B-B530-A9189C325349}"/>
+              </a:ext>
+            </a:extLst>
+          </p:cNvPr>
+          <p:cNvSpPr txBox="1"/>
+          <p:nvPr/>
+        </p:nvSpPr>
+        <p:spPr>
+          <a:xfrm>
+            <a:off x="126331" y="5175691"/>
+            <a:ext cx="1840831" cy="1200329"/>
+          </a:xfrm>
+          <a:prstGeom prst="rect">
+            <a:avLst/>
+          </a:prstGeom>
+          <a:noFill/>
+        </p:spPr>
+        <p:txBody>
+          <a:bodyPr wrap="square" rtlCol="0">
+            <a:spAutoFit/>
+          </a:bodyPr>
+          <a:lstStyle/>
+          <a:p>
+            <a:pPr algn="just"/>
+            <a:r>
+              <a:rPr lang="en-US" dirty="0"/>
+              <a:t>Can add “badge” to show current status of the build</a:t>
             </a:r>
           </a:p>
         </p:txBody>
@@ -7538,7 +7684,7 @@
     </p:spTree>
     <p:extLst>
       <p:ext uri="{BB962C8B-B14F-4D97-AF65-F5344CB8AC3E}">
-        <p14:creationId xmlns:p14="http://schemas.microsoft.com/office/powerpoint/2010/main" val="4227128436"/>
+        <p14:creationId xmlns:p14="http://schemas.microsoft.com/office/powerpoint/2010/main" val="1936933122"/>
       </p:ext>
     </p:extLst>
   </p:cSld>
@@ -7567,7 +7713,7 @@
       </p:grpSpPr>
       <p:sp>
         <p:nvSpPr>
-          <p:cNvPr id="2" name="Title 1"/>
+          <p:cNvPr id="4" name="Title 3"/>
           <p:cNvSpPr>
             <a:spLocks noGrp="1"/>
           </p:cNvSpPr>
@@ -7582,69 +7728,7 @@
           <a:p>
             <a:r>
               <a:rPr lang="en-US" dirty="0"/>
-              <a:t>Database Migrations</a:t>
-            </a:r>
-          </a:p>
-        </p:txBody>
-      </p:sp>
-      <p:sp>
-        <p:nvSpPr>
-          <p:cNvPr id="3" name="Content Placeholder 2"/>
-          <p:cNvSpPr>
-            <a:spLocks noGrp="1"/>
-          </p:cNvSpPr>
-          <p:nvPr>
-            <p:ph idx="1"/>
-          </p:nvPr>
-        </p:nvSpPr>
-        <p:spPr>
-          <a:xfrm>
-            <a:off x="235670" y="1825624"/>
-            <a:ext cx="11821212" cy="4876833"/>
-          </a:xfrm>
-        </p:spPr>
-        <p:txBody>
-          <a:bodyPr/>
-          <a:lstStyle/>
-          <a:p>
-            <a:r>
-              <a:rPr lang="en-US" dirty="0"/>
-              <a:t>So far, by configuring “</a:t>
-            </a:r>
-            <a:r>
-              <a:rPr lang="en-US" i="1" dirty="0"/>
-              <a:t>create-drop</a:t>
-            </a:r>
-            <a:r>
-              <a:rPr lang="en-US" dirty="0"/>
-              <a:t>” in Hibernate, we were always recreating the schema of the database</a:t>
-            </a:r>
-          </a:p>
-          <a:p>
-            <a:r>
-              <a:rPr lang="en-US" dirty="0"/>
-              <a:t>This of course does not work in production… you do not want to delete your database at each application restart!!!</a:t>
-            </a:r>
-          </a:p>
-          <a:p>
-            <a:r>
-              <a:rPr lang="en-US" dirty="0"/>
-              <a:t>A possible (but not good) solution is to use “</a:t>
-            </a:r>
-            <a:r>
-              <a:rPr lang="en-US" i="1" dirty="0"/>
-              <a:t>update</a:t>
-            </a:r>
-            <a:r>
-              <a:rPr lang="en-US" dirty="0"/>
-              <a:t>”</a:t>
-            </a:r>
-          </a:p>
-          <a:p>
-            <a:pPr lvl="1"/>
-            <a:r>
-              <a:rPr lang="en-US" dirty="0"/>
-              <a:t>It will create a database (based on your entities) if not existing, otherwise will try to update the current one</a:t>
+              <a:t>Database Maintenance</a:t>
             </a:r>
           </a:p>
         </p:txBody>
@@ -7652,7 +7736,7 @@
     </p:spTree>
     <p:extLst>
       <p:ext uri="{BB962C8B-B14F-4D97-AF65-F5344CB8AC3E}">
-        <p14:creationId xmlns:p14="http://schemas.microsoft.com/office/powerpoint/2010/main" val="1467358015"/>
+        <p14:creationId xmlns:p14="http://schemas.microsoft.com/office/powerpoint/2010/main" val="4227128436"/>
       </p:ext>
     </p:extLst>
   </p:cSld>

</xml_diff>